<commit_message>
fixed mesh reconstruction of vision_3
</commit_message>
<xml_diff>
--- a/Homeworks/RVC_presentation.pptx
+++ b/Homeworks/RVC_presentation.pptx
@@ -5,7 +5,7 @@
     <p:sldMasterId id="2147484174" r:id="rId1"/>
   </p:sldMasterIdLst>
   <p:notesMasterIdLst>
-    <p:notesMasterId r:id="rId54"/>
+    <p:notesMasterId r:id="rId55"/>
   </p:notesMasterIdLst>
   <p:sldIdLst>
     <p:sldId id="256" r:id="rId2"/>
@@ -51,15 +51,16 @@
     <p:sldId id="300" r:id="rId42"/>
     <p:sldId id="302" r:id="rId43"/>
     <p:sldId id="303" r:id="rId44"/>
-    <p:sldId id="304" r:id="rId45"/>
-    <p:sldId id="305" r:id="rId46"/>
-    <p:sldId id="306" r:id="rId47"/>
-    <p:sldId id="307" r:id="rId48"/>
-    <p:sldId id="308" r:id="rId49"/>
-    <p:sldId id="309" r:id="rId50"/>
-    <p:sldId id="311" r:id="rId51"/>
-    <p:sldId id="312" r:id="rId52"/>
-    <p:sldId id="313" r:id="rId53"/>
+    <p:sldId id="314" r:id="rId45"/>
+    <p:sldId id="315" r:id="rId46"/>
+    <p:sldId id="316" r:id="rId47"/>
+    <p:sldId id="306" r:id="rId48"/>
+    <p:sldId id="307" r:id="rId49"/>
+    <p:sldId id="308" r:id="rId50"/>
+    <p:sldId id="309" r:id="rId51"/>
+    <p:sldId id="311" r:id="rId52"/>
+    <p:sldId id="312" r:id="rId53"/>
+    <p:sldId id="313" r:id="rId54"/>
   </p:sldIdLst>
   <p:sldSz cx="12192000" cy="6858000"/>
   <p:notesSz cx="6858000" cy="9144000"/>
@@ -248,7 +249,7 @@
           <a:p>
             <a:fld id="{955F8B66-CE5C-415D-A154-A18399BE0406}" type="datetimeFigureOut">
               <a:rPr lang="it-IT" smtClean="0"/>
-              <a:t>11/07/2021</a:t>
+              <a:t>08/02/2022</a:t>
             </a:fld>
             <a:endParaRPr lang="it-IT"/>
           </a:p>
@@ -684,7 +685,7 @@
           <a:p>
             <a:fld id="{830A977C-C6AA-4237-BAB0-78382018275C}" type="datetime1">
               <a:rPr lang="it-IT" smtClean="0"/>
-              <a:t>11/07/2021</a:t>
+              <a:t>08/02/2022</a:t>
             </a:fld>
             <a:endParaRPr lang="it-IT"/>
           </a:p>
@@ -1014,7 +1015,7 @@
           <a:p>
             <a:fld id="{7B6E2526-495F-4565-A6B3-16DBD0FD01F5}" type="datetime1">
               <a:rPr lang="it-IT" smtClean="0"/>
-              <a:t>11/07/2021</a:t>
+              <a:t>08/02/2022</a:t>
             </a:fld>
             <a:endParaRPr lang="it-IT"/>
           </a:p>
@@ -1194,7 +1195,7 @@
           <a:p>
             <a:fld id="{6119CD17-B6E4-4C9A-B3BC-2569618BB94E}" type="datetime1">
               <a:rPr lang="it-IT" smtClean="0"/>
-              <a:t>11/07/2021</a:t>
+              <a:t>08/02/2022</a:t>
             </a:fld>
             <a:endParaRPr lang="it-IT"/>
           </a:p>
@@ -1364,7 +1365,7 @@
           <a:p>
             <a:fld id="{09585017-A46B-4227-B159-7EE543EDCD82}" type="datetime1">
               <a:rPr lang="it-IT" smtClean="0"/>
-              <a:t>11/07/2021</a:t>
+              <a:t>08/02/2022</a:t>
             </a:fld>
             <a:endParaRPr lang="it-IT"/>
           </a:p>
@@ -1641,7 +1642,7 @@
           <a:p>
             <a:fld id="{89D9C247-814C-44A1-B005-27DDA41F7C7B}" type="datetime1">
               <a:rPr lang="it-IT" smtClean="0"/>
-              <a:t>11/07/2021</a:t>
+              <a:t>08/02/2022</a:t>
             </a:fld>
             <a:endParaRPr lang="it-IT"/>
           </a:p>
@@ -2035,7 +2036,7 @@
           <a:p>
             <a:fld id="{9D8A8455-29A1-4852-A314-D3AF68695AD1}" type="datetime1">
               <a:rPr lang="it-IT" smtClean="0"/>
-              <a:t>11/07/2021</a:t>
+              <a:t>08/02/2022</a:t>
             </a:fld>
             <a:endParaRPr lang="it-IT"/>
           </a:p>
@@ -2512,7 +2513,7 @@
           <a:p>
             <a:fld id="{EFA46E6C-BA16-4101-A951-9412500EE31E}" type="datetime1">
               <a:rPr lang="it-IT" smtClean="0"/>
-              <a:t>11/07/2021</a:t>
+              <a:t>08/02/2022</a:t>
             </a:fld>
             <a:endParaRPr lang="it-IT"/>
           </a:p>
@@ -2630,7 +2631,7 @@
           <a:p>
             <a:fld id="{1FD077D1-0EBE-423A-850F-73884ED1FC5C}" type="datetime1">
               <a:rPr lang="it-IT" smtClean="0"/>
-              <a:t>11/07/2021</a:t>
+              <a:t>08/02/2022</a:t>
             </a:fld>
             <a:endParaRPr lang="it-IT"/>
           </a:p>
@@ -2725,7 +2726,7 @@
           <a:p>
             <a:fld id="{97690C9B-0572-40F7-AAAC-EB47BE67D568}" type="datetime1">
               <a:rPr lang="it-IT" smtClean="0"/>
-              <a:t>11/07/2021</a:t>
+              <a:t>08/02/2022</a:t>
             </a:fld>
             <a:endParaRPr lang="it-IT"/>
           </a:p>
@@ -3071,7 +3072,7 @@
           <a:p>
             <a:fld id="{86ED2665-AD80-4F43-8A57-762F43D4FE9B}" type="datetime1">
               <a:rPr lang="it-IT" smtClean="0"/>
-              <a:t>11/07/2021</a:t>
+              <a:t>08/02/2022</a:t>
             </a:fld>
             <a:endParaRPr lang="it-IT"/>
           </a:p>
@@ -3459,7 +3460,7 @@
           <a:p>
             <a:fld id="{F371762F-2CCC-4BAF-A80C-89031DC3BF39}" type="datetime1">
               <a:rPr lang="it-IT" smtClean="0"/>
-              <a:t>11/07/2021</a:t>
+              <a:t>08/02/2022</a:t>
             </a:fld>
             <a:endParaRPr lang="it-IT"/>
           </a:p>
@@ -3737,7 +3738,7 @@
           <a:p>
             <a:fld id="{3D27D73A-FAD7-45A2-8ECB-1D172736BE66}" type="datetime1">
               <a:rPr lang="it-IT" smtClean="0"/>
-              <a:t>11/07/2021</a:t>
+              <a:t>08/02/2022</a:t>
             </a:fld>
             <a:endParaRPr lang="it-IT"/>
           </a:p>
@@ -22077,7 +22078,7 @@
           <a:p>
             <a:r>
               <a:rPr lang="it-IT" dirty="0"/>
-              <a:t>1.1: 	</a:t>
+              <a:t>1.1: </a:t>
             </a:r>
             <a:r>
               <a:rPr lang="it-IT" dirty="0" err="1"/>
@@ -22226,10 +22227,10 @@
       </p:grpSpPr>
       <p:sp>
         <p:nvSpPr>
-          <p:cNvPr id="2" name="Titolo 1">
+          <p:cNvPr id="3" name="Segnaposto contenuto 2">
             <a:extLst>
               <a:ext uri="{FF2B5EF4-FFF2-40B4-BE49-F238E27FC236}">
-                <a16:creationId xmlns:a16="http://schemas.microsoft.com/office/drawing/2014/main" id="{62107127-8278-42DE-BB0B-5A55F3D37594}"/>
+                <a16:creationId xmlns:a16="http://schemas.microsoft.com/office/drawing/2014/main" id="{EFF072E8-CB30-433C-BE34-AF644D981EE3}"/>
               </a:ext>
             </a:extLst>
           </p:cNvPr>
@@ -22237,38 +22238,85 @@
             <a:spLocks noGrp="1"/>
           </p:cNvSpPr>
           <p:nvPr>
-            <p:ph type="title"/>
+            <p:ph idx="1"/>
+          </p:nvPr>
+        </p:nvSpPr>
+        <p:spPr>
+          <a:xfrm>
+            <a:off x="829994" y="939538"/>
+            <a:ext cx="9601200" cy="1230923"/>
+          </a:xfrm>
+        </p:spPr>
+        <p:txBody>
+          <a:bodyPr/>
+          <a:lstStyle/>
+          <a:p>
+            <a:r>
+              <a:rPr lang="it-IT" dirty="0" err="1"/>
+              <a:t>Starting</a:t>
+            </a:r>
+            <a:r>
+              <a:rPr lang="it-IT" dirty="0"/>
+              <a:t> image, RGB and </a:t>
+            </a:r>
+            <a:r>
+              <a:rPr lang="it-IT" dirty="0" err="1"/>
+              <a:t>depth</a:t>
+            </a:r>
+            <a:r>
+              <a:rPr lang="it-IT" dirty="0"/>
+              <a:t> </a:t>
+            </a:r>
+            <a:r>
+              <a:rPr lang="it-IT" dirty="0" err="1"/>
+              <a:t>version</a:t>
+            </a:r>
+            <a:endParaRPr lang="it-IT" dirty="0"/>
+          </a:p>
+        </p:txBody>
+      </p:sp>
+      <p:sp>
+        <p:nvSpPr>
+          <p:cNvPr id="4" name="Segnaposto numero diapositiva 3">
+            <a:extLst>
+              <a:ext uri="{FF2B5EF4-FFF2-40B4-BE49-F238E27FC236}">
+                <a16:creationId xmlns:a16="http://schemas.microsoft.com/office/drawing/2014/main" id="{BF2DAC31-4D57-49B2-B24C-B51B2706E2D0}"/>
+              </a:ext>
+            </a:extLst>
+          </p:cNvPr>
+          <p:cNvSpPr>
+            <a:spLocks noGrp="1"/>
+          </p:cNvSpPr>
+          <p:nvPr>
+            <p:ph type="sldNum" sz="quarter" idx="12"/>
           </p:nvPr>
         </p:nvSpPr>
         <p:spPr/>
         <p:txBody>
-          <a:bodyPr>
-            <a:normAutofit/>
-          </a:bodyPr>
+          <a:bodyPr/>
           <a:lstStyle/>
           <a:p>
-            <a:r>
-              <a:rPr lang="it-IT" sz="4000" dirty="0"/>
-              <a:t>1.2:	Create a 3D cloud of points from 	a 	range image</a:t>
-            </a:r>
+            <a:fld id="{9E8ABD2E-3A5F-4DED-804B-27CF0A0D3579}" type="slidenum">
+              <a:rPr lang="it-IT" smtClean="0"/>
+              <a:t>44</a:t>
+            </a:fld>
+            <a:endParaRPr lang="it-IT" dirty="0"/>
           </a:p>
         </p:txBody>
       </p:sp>
       <p:pic>
         <p:nvPicPr>
-          <p:cNvPr id="6" name="Segnaposto contenuto 5">
+          <p:cNvPr id="5" name="Immagine 4" descr="Immagine che contiene divano, interni, pavimento, stanza&#10;&#10;Descrizione generata automaticamente">
             <a:extLst>
               <a:ext uri="{FF2B5EF4-FFF2-40B4-BE49-F238E27FC236}">
-                <a16:creationId xmlns:a16="http://schemas.microsoft.com/office/drawing/2014/main" id="{8838F17A-4EB6-4566-B55B-37763F0507FC}"/>
+                <a16:creationId xmlns:a16="http://schemas.microsoft.com/office/drawing/2014/main" id="{2EBB41E5-BEFD-4B53-B14B-1040FD99F894}"/>
               </a:ext>
             </a:extLst>
           </p:cNvPr>
           <p:cNvPicPr>
-            <a:picLocks noGrp="1" noChangeAspect="1"/>
+            <a:picLocks noChangeAspect="1"/>
           </p:cNvPicPr>
-          <p:nvPr>
-            <p:ph idx="1"/>
-          </p:nvPr>
+          <p:nvPr/>
         </p:nvPicPr>
         <p:blipFill>
           <a:blip r:embed="rId2">
@@ -22284,46 +22332,20 @@
         </p:blipFill>
         <p:spPr>
           <a:xfrm>
-            <a:off x="6583238" y="2454741"/>
-            <a:ext cx="5380295" cy="3998645"/>
+            <a:off x="829994" y="2014677"/>
+            <a:ext cx="5266006" cy="3949505"/>
           </a:xfrm>
+          <a:prstGeom prst="rect">
+            <a:avLst/>
+          </a:prstGeom>
         </p:spPr>
       </p:pic>
-      <p:sp>
-        <p:nvSpPr>
-          <p:cNvPr id="4" name="Segnaposto numero diapositiva 3">
-            <a:extLst>
-              <a:ext uri="{FF2B5EF4-FFF2-40B4-BE49-F238E27FC236}">
-                <a16:creationId xmlns:a16="http://schemas.microsoft.com/office/drawing/2014/main" id="{AAFC602A-5D25-49C3-B54A-85176BF82AFB}"/>
-              </a:ext>
-            </a:extLst>
-          </p:cNvPr>
-          <p:cNvSpPr>
-            <a:spLocks noGrp="1"/>
-          </p:cNvSpPr>
-          <p:nvPr>
-            <p:ph type="sldNum" sz="quarter" idx="12"/>
-          </p:nvPr>
-        </p:nvSpPr>
-        <p:spPr/>
-        <p:txBody>
-          <a:bodyPr/>
-          <a:lstStyle/>
-          <a:p>
-            <a:fld id="{9E8ABD2E-3A5F-4DED-804B-27CF0A0D3579}" type="slidenum">
-              <a:rPr lang="it-IT" smtClean="0"/>
-              <a:t>44</a:t>
-            </a:fld>
-            <a:endParaRPr lang="it-IT"/>
-          </a:p>
-        </p:txBody>
-      </p:sp>
       <p:pic>
         <p:nvPicPr>
-          <p:cNvPr id="8" name="Immagine 7" descr="Immagine che contiene testo, screenshot, elettronico, schermo&#10;&#10;Descrizione generata automaticamente">
+          <p:cNvPr id="8" name="Immagine 7">
             <a:extLst>
               <a:ext uri="{FF2B5EF4-FFF2-40B4-BE49-F238E27FC236}">
-                <a16:creationId xmlns:a16="http://schemas.microsoft.com/office/drawing/2014/main" id="{0CA36919-9135-442C-98E2-77BF9DD3F8F7}"/>
+                <a16:creationId xmlns:a16="http://schemas.microsoft.com/office/drawing/2014/main" id="{A46F4A73-6C59-4299-94C5-C206BF329C94}"/>
               </a:ext>
             </a:extLst>
           </p:cNvPr>
@@ -22346,8 +22368,8 @@
         </p:blipFill>
         <p:spPr>
           <a:xfrm>
-            <a:off x="960695" y="2454741"/>
-            <a:ext cx="5333559" cy="3998645"/>
+            <a:off x="6407696" y="1896766"/>
+            <a:ext cx="5621947" cy="4214854"/>
           </a:xfrm>
           <a:prstGeom prst="rect">
             <a:avLst/>
@@ -22357,7 +22379,7 @@
     </p:spTree>
     <p:extLst>
       <p:ext uri="{BB962C8B-B14F-4D97-AF65-F5344CB8AC3E}">
-        <p14:creationId xmlns:p14="http://schemas.microsoft.com/office/powerpoint/2010/main" val="705858145"/>
+        <p14:creationId xmlns:p14="http://schemas.microsoft.com/office/powerpoint/2010/main" val="1492240929"/>
       </p:ext>
     </p:extLst>
   </p:cSld>
@@ -22368,542 +22390,6 @@
 </file>
 
 <file path=ppt/slides/slide45.xml><?xml version="1.0" encoding="utf-8"?>
-<p:sld xmlns:a="http://schemas.openxmlformats.org/drawingml/2006/main" xmlns:r="http://schemas.openxmlformats.org/officeDocument/2006/relationships" xmlns:p="http://schemas.openxmlformats.org/presentationml/2006/main">
-  <p:cSld>
-    <p:spTree>
-      <p:nvGrpSpPr>
-        <p:cNvPr id="1" name=""/>
-        <p:cNvGrpSpPr/>
-        <p:nvPr/>
-      </p:nvGrpSpPr>
-      <p:grpSpPr>
-        <a:xfrm>
-          <a:off x="0" y="0"/>
-          <a:ext cx="0" cy="0"/>
-          <a:chOff x="0" y="0"/>
-          <a:chExt cx="0" cy="0"/>
-        </a:xfrm>
-      </p:grpSpPr>
-      <p:sp>
-        <p:nvSpPr>
-          <p:cNvPr id="2" name="Titolo 1">
-            <a:extLst>
-              <a:ext uri="{FF2B5EF4-FFF2-40B4-BE49-F238E27FC236}">
-                <a16:creationId xmlns:a16="http://schemas.microsoft.com/office/drawing/2014/main" id="{7DFDC7C9-A172-4071-BF73-B759187E4EA1}"/>
-              </a:ext>
-            </a:extLst>
-          </p:cNvPr>
-          <p:cNvSpPr>
-            <a:spLocks noGrp="1"/>
-          </p:cNvSpPr>
-          <p:nvPr>
-            <p:ph type="title"/>
-          </p:nvPr>
-        </p:nvSpPr>
-        <p:spPr/>
-        <p:txBody>
-          <a:bodyPr>
-            <a:normAutofit/>
-          </a:bodyPr>
-          <a:lstStyle/>
-          <a:p>
-            <a:r>
-              <a:rPr lang="it-IT" sz="4000" dirty="0"/>
-              <a:t>1.3:	Mesh </a:t>
-            </a:r>
-            <a:r>
-              <a:rPr lang="it-IT" sz="4000" dirty="0" err="1"/>
-              <a:t>reconstruction</a:t>
-            </a:r>
-            <a:r>
-              <a:rPr lang="it-IT" sz="4000" dirty="0"/>
-              <a:t> from range image </a:t>
-            </a:r>
-            <a:br>
-              <a:rPr lang="it-IT" sz="4000" dirty="0"/>
-            </a:br>
-            <a:r>
-              <a:rPr lang="it-IT" sz="4000" dirty="0"/>
-              <a:t>	</a:t>
-            </a:r>
-            <a:r>
-              <a:rPr lang="it-IT" sz="1800" dirty="0">
-                <a:latin typeface="+mn-lt"/>
-              </a:rPr>
-              <a:t>Mesh file </a:t>
-            </a:r>
-            <a:r>
-              <a:rPr lang="it-IT" sz="1800" dirty="0" err="1">
-                <a:latin typeface="+mn-lt"/>
-              </a:rPr>
-              <a:t>PC_out_range.ply</a:t>
-            </a:r>
-            <a:r>
-              <a:rPr lang="it-IT" sz="1800" dirty="0">
-                <a:latin typeface="+mn-lt"/>
-              </a:rPr>
-              <a:t>, open with </a:t>
-            </a:r>
-            <a:r>
-              <a:rPr lang="it-IT" sz="1800" dirty="0" err="1">
-                <a:latin typeface="+mn-lt"/>
-              </a:rPr>
-              <a:t>MeshLab</a:t>
-            </a:r>
-            <a:r>
-              <a:rPr lang="it-IT" sz="1800" dirty="0">
-                <a:latin typeface="+mn-lt"/>
-              </a:rPr>
-              <a:t> for </a:t>
-            </a:r>
-            <a:r>
-              <a:rPr lang="it-IT" sz="1800" dirty="0" err="1">
-                <a:latin typeface="+mn-lt"/>
-              </a:rPr>
-              <a:t>visulization</a:t>
-            </a:r>
-            <a:endParaRPr lang="it-IT" sz="4000" dirty="0">
-              <a:latin typeface="+mn-lt"/>
-            </a:endParaRPr>
-          </a:p>
-        </p:txBody>
-      </p:sp>
-      <p:pic>
-        <p:nvPicPr>
-          <p:cNvPr id="6" name="Segnaposto contenuto 5" descr="Immagine che contiene telescopio&#10;&#10;Descrizione generata automaticamente">
-            <a:extLst>
-              <a:ext uri="{FF2B5EF4-FFF2-40B4-BE49-F238E27FC236}">
-                <a16:creationId xmlns:a16="http://schemas.microsoft.com/office/drawing/2014/main" id="{3D092F48-651E-4856-8F71-BA621E6C421D}"/>
-              </a:ext>
-            </a:extLst>
-          </p:cNvPr>
-          <p:cNvPicPr>
-            <a:picLocks noGrp="1" noChangeAspect="1"/>
-          </p:cNvPicPr>
-          <p:nvPr>
-            <p:ph idx="1"/>
-          </p:nvPr>
-        </p:nvPicPr>
-        <p:blipFill>
-          <a:blip r:embed="rId2">
-            <a:extLst>
-              <a:ext uri="{28A0092B-C50C-407E-A947-70E740481C1C}">
-                <a14:useLocalDpi xmlns:a14="http://schemas.microsoft.com/office/drawing/2010/main" val="0"/>
-              </a:ext>
-            </a:extLst>
-          </a:blip>
-          <a:stretch>
-            <a:fillRect/>
-          </a:stretch>
-        </p:blipFill>
-        <p:spPr>
-          <a:xfrm>
-            <a:off x="2188662" y="2055558"/>
-            <a:ext cx="7967076" cy="4513970"/>
-          </a:xfrm>
-        </p:spPr>
-      </p:pic>
-      <p:sp>
-        <p:nvSpPr>
-          <p:cNvPr id="4" name="Segnaposto numero diapositiva 3">
-            <a:extLst>
-              <a:ext uri="{FF2B5EF4-FFF2-40B4-BE49-F238E27FC236}">
-                <a16:creationId xmlns:a16="http://schemas.microsoft.com/office/drawing/2014/main" id="{9E73FD48-381E-4796-9087-6CBD023BBD03}"/>
-              </a:ext>
-            </a:extLst>
-          </p:cNvPr>
-          <p:cNvSpPr>
-            <a:spLocks noGrp="1"/>
-          </p:cNvSpPr>
-          <p:nvPr>
-            <p:ph type="sldNum" sz="quarter" idx="12"/>
-          </p:nvPr>
-        </p:nvSpPr>
-        <p:spPr/>
-        <p:txBody>
-          <a:bodyPr/>
-          <a:lstStyle/>
-          <a:p>
-            <a:fld id="{9E8ABD2E-3A5F-4DED-804B-27CF0A0D3579}" type="slidenum">
-              <a:rPr lang="it-IT" smtClean="0"/>
-              <a:t>45</a:t>
-            </a:fld>
-            <a:endParaRPr lang="it-IT"/>
-          </a:p>
-        </p:txBody>
-      </p:sp>
-    </p:spTree>
-    <p:extLst>
-      <p:ext uri="{BB962C8B-B14F-4D97-AF65-F5344CB8AC3E}">
-        <p14:creationId xmlns:p14="http://schemas.microsoft.com/office/powerpoint/2010/main" val="807306645"/>
-      </p:ext>
-    </p:extLst>
-  </p:cSld>
-  <p:clrMapOvr>
-    <a:masterClrMapping/>
-  </p:clrMapOvr>
-</p:sld>
-</file>
-
-<file path=ppt/slides/slide46.xml><?xml version="1.0" encoding="utf-8"?>
-<p:sld xmlns:a="http://schemas.openxmlformats.org/drawingml/2006/main" xmlns:r="http://schemas.openxmlformats.org/officeDocument/2006/relationships" xmlns:p="http://schemas.openxmlformats.org/presentationml/2006/main">
-  <p:cSld>
-    <p:spTree>
-      <p:nvGrpSpPr>
-        <p:cNvPr id="1" name=""/>
-        <p:cNvGrpSpPr/>
-        <p:nvPr/>
-      </p:nvGrpSpPr>
-      <p:grpSpPr>
-        <a:xfrm>
-          <a:off x="0" y="0"/>
-          <a:ext cx="0" cy="0"/>
-          <a:chOff x="0" y="0"/>
-          <a:chExt cx="0" cy="0"/>
-        </a:xfrm>
-      </p:grpSpPr>
-      <p:sp>
-        <p:nvSpPr>
-          <p:cNvPr id="2" name="Titolo 1">
-            <a:extLst>
-              <a:ext uri="{FF2B5EF4-FFF2-40B4-BE49-F238E27FC236}">
-                <a16:creationId xmlns:a16="http://schemas.microsoft.com/office/drawing/2014/main" id="{233C87B1-734D-48CF-991A-EDF93F1C8061}"/>
-              </a:ext>
-            </a:extLst>
-          </p:cNvPr>
-          <p:cNvSpPr>
-            <a:spLocks noGrp="1"/>
-          </p:cNvSpPr>
-          <p:nvPr>
-            <p:ph type="title"/>
-          </p:nvPr>
-        </p:nvSpPr>
-        <p:spPr/>
-        <p:txBody>
-          <a:bodyPr>
-            <a:normAutofit/>
-          </a:bodyPr>
-          <a:lstStyle/>
-          <a:p>
-            <a:r>
-              <a:rPr lang="it-IT" sz="4000" dirty="0"/>
-              <a:t>2: Image </a:t>
-            </a:r>
-            <a:r>
-              <a:rPr lang="it-IT" sz="4000" dirty="0" err="1"/>
-              <a:t>analysis</a:t>
-            </a:r>
-            <a:endParaRPr lang="it-IT" sz="4000" dirty="0"/>
-          </a:p>
-        </p:txBody>
-      </p:sp>
-      <p:sp>
-        <p:nvSpPr>
-          <p:cNvPr id="3" name="Segnaposto contenuto 2">
-            <a:extLst>
-              <a:ext uri="{FF2B5EF4-FFF2-40B4-BE49-F238E27FC236}">
-                <a16:creationId xmlns:a16="http://schemas.microsoft.com/office/drawing/2014/main" id="{F0720EDD-94B2-432D-8E17-B53711CDC5B2}"/>
-              </a:ext>
-            </a:extLst>
-          </p:cNvPr>
-          <p:cNvSpPr>
-            <a:spLocks noGrp="1"/>
-          </p:cNvSpPr>
-          <p:nvPr>
-            <p:ph idx="1"/>
-          </p:nvPr>
-        </p:nvSpPr>
-        <p:spPr/>
-        <p:txBody>
-          <a:bodyPr/>
-          <a:lstStyle/>
-          <a:p>
-            <a:r>
-              <a:rPr lang="it-IT" dirty="0"/>
-              <a:t>Goal: </a:t>
-            </a:r>
-            <a:r>
-              <a:rPr lang="it-IT" dirty="0" err="1"/>
-              <a:t>Recognize</a:t>
-            </a:r>
-            <a:r>
-              <a:rPr lang="it-IT" dirty="0"/>
-              <a:t> in the </a:t>
-            </a:r>
-            <a:r>
-              <a:rPr lang="it-IT" dirty="0" err="1"/>
-              <a:t>proposed</a:t>
-            </a:r>
-            <a:r>
-              <a:rPr lang="it-IT" dirty="0"/>
-              <a:t> images </a:t>
-            </a:r>
-            <a:r>
-              <a:rPr lang="it-IT" dirty="0" err="1"/>
-              <a:t>various</a:t>
-            </a:r>
-            <a:r>
-              <a:rPr lang="it-IT" dirty="0"/>
-              <a:t> </a:t>
-            </a:r>
-            <a:r>
-              <a:rPr lang="it-IT" dirty="0" err="1"/>
-              <a:t>obejct</a:t>
-            </a:r>
-            <a:r>
-              <a:rPr lang="it-IT" dirty="0"/>
-              <a:t> </a:t>
-            </a:r>
-            <a:r>
-              <a:rPr lang="it-IT" dirty="0" err="1"/>
-              <a:t>using</a:t>
-            </a:r>
-            <a:r>
-              <a:rPr lang="it-IT" dirty="0"/>
-              <a:t> the </a:t>
-            </a:r>
-            <a:r>
-              <a:rPr lang="it-IT" dirty="0" err="1"/>
-              <a:t>tecniques</a:t>
-            </a:r>
-            <a:r>
-              <a:rPr lang="it-IT" dirty="0"/>
-              <a:t> </a:t>
-            </a:r>
-            <a:r>
-              <a:rPr lang="it-IT" dirty="0" err="1"/>
-              <a:t>seen</a:t>
-            </a:r>
-            <a:r>
-              <a:rPr lang="it-IT" dirty="0"/>
-              <a:t> in the </a:t>
-            </a:r>
-            <a:r>
-              <a:rPr lang="it-IT" dirty="0" err="1"/>
-              <a:t>lectures</a:t>
-            </a:r>
-            <a:r>
-              <a:rPr lang="it-IT" dirty="0"/>
-              <a:t> </a:t>
-            </a:r>
-            <a:r>
-              <a:rPr lang="it-IT" dirty="0" err="1"/>
-              <a:t>related</a:t>
-            </a:r>
-            <a:r>
-              <a:rPr lang="it-IT" dirty="0"/>
-              <a:t> to Image Analysis.</a:t>
-            </a:r>
-          </a:p>
-          <a:p>
-            <a:r>
-              <a:rPr lang="it-IT" dirty="0"/>
-              <a:t>The </a:t>
-            </a:r>
-            <a:r>
-              <a:rPr lang="it-IT" dirty="0" err="1"/>
-              <a:t>cited</a:t>
-            </a:r>
-            <a:r>
-              <a:rPr lang="it-IT" dirty="0"/>
-              <a:t> </a:t>
-            </a:r>
-            <a:r>
-              <a:rPr lang="it-IT" dirty="0" err="1"/>
-              <a:t>tecniques</a:t>
-            </a:r>
-            <a:r>
-              <a:rPr lang="it-IT" dirty="0"/>
-              <a:t> involve </a:t>
-            </a:r>
-            <a:r>
-              <a:rPr lang="it-IT" dirty="0" err="1"/>
-              <a:t>morphological</a:t>
-            </a:r>
-            <a:r>
-              <a:rPr lang="it-IT" dirty="0"/>
-              <a:t> </a:t>
-            </a:r>
-            <a:r>
-              <a:rPr lang="it-IT" dirty="0" err="1"/>
-              <a:t>operations</a:t>
-            </a:r>
-            <a:r>
-              <a:rPr lang="it-IT" dirty="0"/>
-              <a:t> like </a:t>
-            </a:r>
-            <a:r>
-              <a:rPr lang="it-IT" dirty="0" err="1"/>
-              <a:t>binarization</a:t>
-            </a:r>
-            <a:r>
-              <a:rPr lang="it-IT" dirty="0"/>
-              <a:t>, opening, or closing. The concepts of </a:t>
-            </a:r>
-            <a:r>
-              <a:rPr lang="it-IT" dirty="0" err="1"/>
-              <a:t>regions</a:t>
-            </a:r>
-            <a:r>
-              <a:rPr lang="it-IT" dirty="0"/>
-              <a:t>, </a:t>
-            </a:r>
-            <a:r>
-              <a:rPr lang="it-IT" dirty="0" err="1"/>
-              <a:t>connected</a:t>
-            </a:r>
-            <a:r>
-              <a:rPr lang="it-IT" dirty="0"/>
-              <a:t> </a:t>
-            </a:r>
-            <a:r>
-              <a:rPr lang="it-IT" dirty="0" err="1"/>
-              <a:t>components</a:t>
-            </a:r>
-            <a:r>
-              <a:rPr lang="it-IT" dirty="0"/>
-              <a:t>, </a:t>
-            </a:r>
-            <a:r>
-              <a:rPr lang="it-IT" dirty="0" err="1"/>
-              <a:t>bounding</a:t>
-            </a:r>
-            <a:r>
-              <a:rPr lang="it-IT" dirty="0"/>
-              <a:t> box, </a:t>
-            </a:r>
-            <a:r>
-              <a:rPr lang="it-IT" dirty="0" err="1"/>
-              <a:t>elongation</a:t>
-            </a:r>
-            <a:r>
-              <a:rPr lang="it-IT" dirty="0"/>
-              <a:t>, </a:t>
-            </a:r>
-            <a:r>
-              <a:rPr lang="it-IT" dirty="0" err="1"/>
-              <a:t>eccentricity</a:t>
-            </a:r>
-            <a:r>
-              <a:rPr lang="it-IT" dirty="0"/>
-              <a:t> and </a:t>
-            </a:r>
-            <a:r>
-              <a:rPr lang="it-IT" dirty="0" err="1"/>
-              <a:t>others</a:t>
-            </a:r>
-            <a:r>
-              <a:rPr lang="it-IT" dirty="0"/>
-              <a:t> </a:t>
-            </a:r>
-            <a:r>
-              <a:rPr lang="it-IT" dirty="0" err="1"/>
-              <a:t>have</a:t>
-            </a:r>
-            <a:r>
-              <a:rPr lang="it-IT" dirty="0"/>
-              <a:t> </a:t>
-            </a:r>
-            <a:r>
-              <a:rPr lang="it-IT" dirty="0" err="1"/>
-              <a:t>been</a:t>
-            </a:r>
-            <a:r>
-              <a:rPr lang="it-IT" dirty="0"/>
-              <a:t> </a:t>
-            </a:r>
-            <a:r>
-              <a:rPr lang="it-IT" dirty="0" err="1"/>
-              <a:t>also</a:t>
-            </a:r>
-            <a:r>
-              <a:rPr lang="it-IT" dirty="0"/>
-              <a:t> </a:t>
-            </a:r>
-            <a:r>
-              <a:rPr lang="it-IT" dirty="0" err="1"/>
-              <a:t>used</a:t>
-            </a:r>
-            <a:r>
-              <a:rPr lang="it-IT" dirty="0"/>
-              <a:t> to </a:t>
-            </a:r>
-            <a:r>
-              <a:rPr lang="it-IT" dirty="0" err="1"/>
-              <a:t>obtain</a:t>
-            </a:r>
-            <a:r>
-              <a:rPr lang="it-IT" dirty="0"/>
-              <a:t> the </a:t>
-            </a:r>
-            <a:r>
-              <a:rPr lang="it-IT" dirty="0" err="1"/>
-              <a:t>objectives</a:t>
-            </a:r>
-            <a:r>
-              <a:rPr lang="it-IT" dirty="0"/>
-              <a:t> of the </a:t>
-            </a:r>
-            <a:r>
-              <a:rPr lang="it-IT" dirty="0" err="1"/>
-              <a:t>assignments</a:t>
-            </a:r>
-            <a:r>
-              <a:rPr lang="it-IT" dirty="0"/>
-              <a:t>. </a:t>
-            </a:r>
-          </a:p>
-          <a:p>
-            <a:endParaRPr lang="it-IT" dirty="0"/>
-          </a:p>
-          <a:p>
-            <a:endParaRPr lang="it-IT" dirty="0"/>
-          </a:p>
-        </p:txBody>
-      </p:sp>
-      <p:sp>
-        <p:nvSpPr>
-          <p:cNvPr id="4" name="Segnaposto numero diapositiva 3">
-            <a:extLst>
-              <a:ext uri="{FF2B5EF4-FFF2-40B4-BE49-F238E27FC236}">
-                <a16:creationId xmlns:a16="http://schemas.microsoft.com/office/drawing/2014/main" id="{12E66E89-1F17-4BE1-950A-D0A6AAD464A6}"/>
-              </a:ext>
-            </a:extLst>
-          </p:cNvPr>
-          <p:cNvSpPr>
-            <a:spLocks noGrp="1"/>
-          </p:cNvSpPr>
-          <p:nvPr>
-            <p:ph type="sldNum" sz="quarter" idx="12"/>
-          </p:nvPr>
-        </p:nvSpPr>
-        <p:spPr/>
-        <p:txBody>
-          <a:bodyPr/>
-          <a:lstStyle/>
-          <a:p>
-            <a:fld id="{9E8ABD2E-3A5F-4DED-804B-27CF0A0D3579}" type="slidenum">
-              <a:rPr lang="it-IT" smtClean="0"/>
-              <a:t>46</a:t>
-            </a:fld>
-            <a:endParaRPr lang="it-IT"/>
-          </a:p>
-        </p:txBody>
-      </p:sp>
-    </p:spTree>
-    <p:extLst>
-      <p:ext uri="{BB962C8B-B14F-4D97-AF65-F5344CB8AC3E}">
-        <p14:creationId xmlns:p14="http://schemas.microsoft.com/office/powerpoint/2010/main" val="755570594"/>
-      </p:ext>
-    </p:extLst>
-  </p:cSld>
-  <p:clrMapOvr>
-    <a:masterClrMapping/>
-  </p:clrMapOvr>
-</p:sld>
-</file>
-
-<file path=ppt/slides/slide47.xml><?xml version="1.0" encoding="utf-8"?>
 <p:sld xmlns:a="http://schemas.openxmlformats.org/drawingml/2006/main" xmlns:r="http://schemas.openxmlformats.org/officeDocument/2006/relationships" xmlns:p="http://schemas.openxmlformats.org/presentationml/2006/main">
   <p:cSld>
     <p:bg>
@@ -22930,7 +22416,7 @@
       </p:grpSpPr>
       <p:sp useBgFill="1">
         <p:nvSpPr>
-          <p:cNvPr id="84" name="Rectangle 83">
+          <p:cNvPr id="13" name="Rectangle 12">
             <a:extLst>
               <a:ext uri="{FF2B5EF4-FFF2-40B4-BE49-F238E27FC236}">
                 <a16:creationId xmlns:a16="http://schemas.microsoft.com/office/drawing/2014/main" id="{1D868099-6145-4BC0-A5EA-74BEF1776BA9}"/>
@@ -23006,32 +22492,33 @@
         </p:nvSpPr>
         <p:spPr>
           <a:xfrm>
-            <a:off x="8471424" y="1110882"/>
-            <a:ext cx="3053039" cy="1060817"/>
+            <a:off x="8471424" y="1293766"/>
+            <a:ext cx="3053039" cy="1660453"/>
           </a:xfrm>
         </p:spPr>
         <p:txBody>
           <a:bodyPr anchor="b">
-            <a:normAutofit/>
+            <a:noAutofit/>
           </a:bodyPr>
           <a:lstStyle/>
           <a:p>
             <a:r>
-              <a:rPr lang="it-IT" sz="2800" dirty="0">
-                <a:ea typeface="Linux Biolinum G" panose="02000503000000000000" pitchFamily="2" charset="0"/>
-                <a:cs typeface="Linux Biolinum G" panose="02000503000000000000" pitchFamily="2" charset="0"/>
-              </a:rPr>
-              <a:t>Image Analysis: HW 1</a:t>
-            </a:r>
+              <a:rPr lang="it-IT" sz="2800" dirty="0"/>
+              <a:t>1.2: Create a 3D cloud of points from a range image</a:t>
+            </a:r>
+            <a:endParaRPr lang="it-IT" sz="2800" dirty="0">
+              <a:ea typeface="Linux Biolinum G" panose="02000503000000000000" pitchFamily="2" charset="0"/>
+              <a:cs typeface="Linux Biolinum G" panose="02000503000000000000" pitchFamily="2" charset="0"/>
+            </a:endParaRPr>
           </a:p>
         </p:txBody>
       </p:sp>
       <p:pic>
         <p:nvPicPr>
-          <p:cNvPr id="5" name="Immagine 4">
+          <p:cNvPr id="8" name="Immagine 7">
             <a:extLst>
               <a:ext uri="{FF2B5EF4-FFF2-40B4-BE49-F238E27FC236}">
-                <a16:creationId xmlns:a16="http://schemas.microsoft.com/office/drawing/2014/main" id="{9C45DDFD-88E2-436C-878F-C9172F8243D0}"/>
+                <a16:creationId xmlns:a16="http://schemas.microsoft.com/office/drawing/2014/main" id="{53111365-C9AF-4782-9EDE-61442C02E8D3}"/>
               </a:ext>
             </a:extLst>
           </p:cNvPr>
@@ -23064,138 +22551,7 @@
       </p:pic>
       <p:sp>
         <p:nvSpPr>
-          <p:cNvPr id="3" name="Segnaposto contenuto 2">
-            <a:extLst>
-              <a:ext uri="{FF2B5EF4-FFF2-40B4-BE49-F238E27FC236}">
-                <a16:creationId xmlns:a16="http://schemas.microsoft.com/office/drawing/2014/main" id="{E15FC3D4-7E07-472C-AC13-B45DEAD73EE5}"/>
-              </a:ext>
-            </a:extLst>
-          </p:cNvPr>
-          <p:cNvSpPr>
-            <a:spLocks noGrp="1"/>
-          </p:cNvSpPr>
-          <p:nvPr>
-            <p:ph idx="1"/>
-          </p:nvPr>
-        </p:nvSpPr>
-        <p:spPr>
-          <a:xfrm>
-            <a:off x="8471423" y="2286000"/>
-            <a:ext cx="3053039" cy="3931920"/>
-          </a:xfrm>
-        </p:spPr>
-        <p:txBody>
-          <a:bodyPr>
-            <a:normAutofit/>
-          </a:bodyPr>
-          <a:lstStyle/>
-          <a:p>
-            <a:endParaRPr lang="it-IT" sz="1600" dirty="0"/>
-          </a:p>
-          <a:p>
-            <a:endParaRPr lang="it-IT" sz="1600" dirty="0"/>
-          </a:p>
-          <a:p>
-            <a:r>
-              <a:rPr lang="it-IT" sz="1600" dirty="0" err="1"/>
-              <a:t>Obtain</a:t>
-            </a:r>
-            <a:r>
-              <a:rPr lang="it-IT" sz="1600" dirty="0"/>
-              <a:t> </a:t>
-            </a:r>
-            <a:r>
-              <a:rPr lang="it-IT" sz="1600" dirty="0" err="1"/>
-              <a:t>same</a:t>
-            </a:r>
-            <a:r>
-              <a:rPr lang="it-IT" sz="1600" dirty="0"/>
-              <a:t> </a:t>
-            </a:r>
-            <a:r>
-              <a:rPr lang="it-IT" sz="1600" dirty="0" err="1"/>
-              <a:t>results</a:t>
-            </a:r>
-            <a:r>
-              <a:rPr lang="it-IT" sz="1600" dirty="0"/>
-              <a:t> of </a:t>
-            </a:r>
-            <a:r>
-              <a:rPr lang="it-IT" sz="1600" dirty="0" err="1"/>
-              <a:t>exercise</a:t>
-            </a:r>
-            <a:r>
-              <a:rPr lang="it-IT" sz="1600" dirty="0"/>
-              <a:t> 1 (</a:t>
-            </a:r>
-            <a:r>
-              <a:rPr lang="it-IT" sz="1600" dirty="0" err="1"/>
-              <a:t>not</a:t>
-            </a:r>
-            <a:r>
-              <a:rPr lang="it-IT" sz="1600" dirty="0"/>
-              <a:t> </a:t>
-            </a:r>
-            <a:r>
-              <a:rPr lang="it-IT" sz="1600" dirty="0" err="1"/>
-              <a:t>reported</a:t>
-            </a:r>
-            <a:r>
-              <a:rPr lang="it-IT" sz="1600" dirty="0"/>
-              <a:t> </a:t>
-            </a:r>
-            <a:r>
-              <a:rPr lang="it-IT" sz="1600" dirty="0" err="1"/>
-              <a:t>here</a:t>
-            </a:r>
-            <a:r>
-              <a:rPr lang="it-IT" sz="1600" dirty="0"/>
-              <a:t>) with </a:t>
-            </a:r>
-            <a:r>
-              <a:rPr lang="it-IT" sz="1600" dirty="0" err="1"/>
-              <a:t>coins</a:t>
-            </a:r>
-            <a:r>
-              <a:rPr lang="it-IT" sz="1600" dirty="0"/>
-              <a:t> image</a:t>
-            </a:r>
-            <a:endParaRPr lang="it-IT" sz="1600" b="0" i="0" u="none" strike="noStrike" baseline="0" dirty="0"/>
-          </a:p>
-          <a:p>
-            <a:pPr lvl="1"/>
-            <a:endParaRPr lang="it-IT" sz="1600" b="0" i="0" u="none" strike="noStrike" baseline="0" dirty="0"/>
-          </a:p>
-          <a:p>
-            <a:pPr lvl="1"/>
-            <a:endParaRPr lang="it-IT" sz="1600" b="0" i="0" u="none" strike="noStrike" baseline="0" dirty="0">
-              <a:latin typeface="Courier New" panose="02070309020205020404" pitchFamily="49" charset="0"/>
-            </a:endParaRPr>
-          </a:p>
-          <a:p>
-            <a:pPr lvl="1"/>
-            <a:endParaRPr lang="it-IT" sz="1600" b="0" i="0" u="none" strike="noStrike" baseline="0" dirty="0">
-              <a:latin typeface="Courier New" panose="02070309020205020404" pitchFamily="49" charset="0"/>
-            </a:endParaRPr>
-          </a:p>
-          <a:p>
-            <a:pPr lvl="1"/>
-            <a:endParaRPr lang="pl-PL" sz="1600" b="0" i="0" u="none" strike="noStrike" baseline="0" dirty="0">
-              <a:latin typeface="Courier New" panose="02070309020205020404" pitchFamily="49" charset="0"/>
-            </a:endParaRPr>
-          </a:p>
-          <a:p>
-            <a:endParaRPr lang="it-IT" sz="1600" b="0" i="0" u="none" strike="noStrike" baseline="0" dirty="0"/>
-          </a:p>
-          <a:p>
-            <a:pPr lvl="1"/>
-            <a:endParaRPr lang="it-IT" sz="1600" b="0" i="0" u="none" strike="noStrike" baseline="0" dirty="0"/>
-          </a:p>
-        </p:txBody>
-      </p:sp>
-      <p:sp>
-        <p:nvSpPr>
-          <p:cNvPr id="86" name="Freeform 6">
+          <p:cNvPr id="15" name="Freeform 6">
             <a:extLst>
               <a:ext uri="{FF2B5EF4-FFF2-40B4-BE49-F238E27FC236}">
                 <a16:creationId xmlns:a16="http://schemas.microsoft.com/office/drawing/2014/main" id="{CC1026F7-DECB-49B4-A565-518BBA445471}"/>
@@ -23308,7 +22664,7 @@
                   <a:spcPts val="600"/>
                 </a:spcAft>
               </a:pPr>
-              <a:t>47</a:t>
+              <a:t>45</a:t>
             </a:fld>
             <a:endParaRPr lang="it-IT" dirty="0"/>
           </a:p>
@@ -23317,7 +22673,7 @@
     </p:spTree>
     <p:extLst>
       <p:ext uri="{BB962C8B-B14F-4D97-AF65-F5344CB8AC3E}">
-        <p14:creationId xmlns:p14="http://schemas.microsoft.com/office/powerpoint/2010/main" val="1953208238"/>
+        <p14:creationId xmlns:p14="http://schemas.microsoft.com/office/powerpoint/2010/main" val="4156503974"/>
       </p:ext>
     </p:extLst>
   </p:cSld>
@@ -23327,7 +22683,7 @@
 </p:sld>
 </file>
 
-<file path=ppt/slides/slide48.xml><?xml version="1.0" encoding="utf-8"?>
+<file path=ppt/slides/slide46.xml><?xml version="1.0" encoding="utf-8"?>
 <p:sld xmlns:a="http://schemas.openxmlformats.org/drawingml/2006/main" xmlns:r="http://schemas.openxmlformats.org/officeDocument/2006/relationships" xmlns:p="http://schemas.openxmlformats.org/presentationml/2006/main">
   <p:cSld>
     <p:bg>
@@ -23354,7 +22710,7 @@
       </p:grpSpPr>
       <p:sp useBgFill="1">
         <p:nvSpPr>
-          <p:cNvPr id="91" name="Rectangle 90">
+          <p:cNvPr id="14" name="Rectangle 13">
             <a:extLst>
               <a:ext uri="{FF2B5EF4-FFF2-40B4-BE49-F238E27FC236}">
                 <a16:creationId xmlns:a16="http://schemas.microsoft.com/office/drawing/2014/main" id="{1D868099-6145-4BC0-A5EA-74BEF1776BA9}"/>
@@ -23431,31 +22787,40 @@
         <p:spPr>
           <a:xfrm>
             <a:off x="8471424" y="1110882"/>
-            <a:ext cx="3053039" cy="1060817"/>
+            <a:ext cx="3053039" cy="1463506"/>
           </a:xfrm>
         </p:spPr>
         <p:txBody>
           <a:bodyPr anchor="b">
-            <a:normAutofit/>
+            <a:noAutofit/>
           </a:bodyPr>
           <a:lstStyle/>
           <a:p>
             <a:r>
-              <a:rPr lang="it-IT" sz="2800" dirty="0">
-                <a:ea typeface="Linux Biolinum G" panose="02000503000000000000" pitchFamily="2" charset="0"/>
-                <a:cs typeface="Linux Biolinum G" panose="02000503000000000000" pitchFamily="2" charset="0"/>
-              </a:rPr>
-              <a:t>Image Analysis: HW 2</a:t>
-            </a:r>
+              <a:rPr lang="it-IT" sz="2800" dirty="0"/>
+              <a:t>1.3: Mesh </a:t>
+            </a:r>
+            <a:r>
+              <a:rPr lang="it-IT" sz="2800" dirty="0" err="1"/>
+              <a:t>reconstruction</a:t>
+            </a:r>
+            <a:r>
+              <a:rPr lang="it-IT" sz="2800" dirty="0"/>
+              <a:t> from range image</a:t>
+            </a:r>
+            <a:endParaRPr lang="it-IT" sz="2800" dirty="0">
+              <a:ea typeface="Linux Biolinum G" panose="02000503000000000000" pitchFamily="2" charset="0"/>
+              <a:cs typeface="Linux Biolinum G" panose="02000503000000000000" pitchFamily="2" charset="0"/>
+            </a:endParaRPr>
           </a:p>
         </p:txBody>
       </p:sp>
       <p:pic>
         <p:nvPicPr>
-          <p:cNvPr id="7" name="Immagine 6">
+          <p:cNvPr id="7" name="Segnaposto contenuto 7">
             <a:extLst>
               <a:ext uri="{FF2B5EF4-FFF2-40B4-BE49-F238E27FC236}">
-                <a16:creationId xmlns:a16="http://schemas.microsoft.com/office/drawing/2014/main" id="{493C3807-6F32-4730-AD0C-A3848480444D}"/>
+                <a16:creationId xmlns:a16="http://schemas.microsoft.com/office/drawing/2014/main" id="{6176F39F-6EB8-4EB3-9369-0D20257476D3}"/>
               </a:ext>
             </a:extLst>
           </p:cNvPr>
@@ -23478,8 +22843,8 @@
         </p:blipFill>
         <p:spPr>
           <a:xfrm>
-            <a:off x="634275" y="841356"/>
-            <a:ext cx="6900380" cy="5175287"/>
+            <a:off x="634275" y="1367511"/>
+            <a:ext cx="6900380" cy="4122977"/>
           </a:xfrm>
           <a:prstGeom prst="rect">
             <a:avLst/>
@@ -23488,142 +22853,7 @@
       </p:pic>
       <p:sp>
         <p:nvSpPr>
-          <p:cNvPr id="3" name="Segnaposto contenuto 2">
-            <a:extLst>
-              <a:ext uri="{FF2B5EF4-FFF2-40B4-BE49-F238E27FC236}">
-                <a16:creationId xmlns:a16="http://schemas.microsoft.com/office/drawing/2014/main" id="{E15FC3D4-7E07-472C-AC13-B45DEAD73EE5}"/>
-              </a:ext>
-            </a:extLst>
-          </p:cNvPr>
-          <p:cNvSpPr>
-            <a:spLocks noGrp="1"/>
-          </p:cNvSpPr>
-          <p:nvPr>
-            <p:ph idx="1"/>
-          </p:nvPr>
-        </p:nvSpPr>
-        <p:spPr>
-          <a:xfrm>
-            <a:off x="8471423" y="2286000"/>
-            <a:ext cx="3053039" cy="3931920"/>
-          </a:xfrm>
-        </p:spPr>
-        <p:txBody>
-          <a:bodyPr>
-            <a:normAutofit/>
-          </a:bodyPr>
-          <a:lstStyle/>
-          <a:p>
-            <a:endParaRPr lang="it-IT" sz="1600" dirty="0"/>
-          </a:p>
-          <a:p>
-            <a:endParaRPr lang="it-IT" sz="1600" dirty="0"/>
-          </a:p>
-          <a:p>
-            <a:r>
-              <a:rPr lang="it-IT" sz="1600" b="0" i="0" u="none" strike="noStrike" baseline="0" dirty="0"/>
-              <a:t>Use </a:t>
-            </a:r>
-            <a:r>
-              <a:rPr lang="it-IT" sz="1600" b="0" i="0" u="none" strike="noStrike" baseline="0" dirty="0" err="1"/>
-              <a:t>morphological</a:t>
-            </a:r>
-            <a:r>
-              <a:rPr lang="it-IT" sz="1600" b="0" i="0" u="none" strike="noStrike" baseline="0" dirty="0"/>
-              <a:t> </a:t>
-            </a:r>
-            <a:r>
-              <a:rPr lang="it-IT" sz="1600" dirty="0" err="1"/>
-              <a:t>operators</a:t>
-            </a:r>
-            <a:r>
-              <a:rPr lang="it-IT" sz="1600" dirty="0"/>
-              <a:t> and </a:t>
-            </a:r>
-            <a:r>
-              <a:rPr lang="it-IT" sz="1600" dirty="0" err="1"/>
-              <a:t>region</a:t>
-            </a:r>
-            <a:r>
-              <a:rPr lang="it-IT" sz="1600" dirty="0"/>
-              <a:t> </a:t>
-            </a:r>
-            <a:r>
-              <a:rPr lang="it-IT" sz="1600" dirty="0" err="1"/>
-              <a:t>properties</a:t>
-            </a:r>
-            <a:r>
-              <a:rPr lang="it-IT" sz="1600" dirty="0"/>
-              <a:t> to </a:t>
-            </a:r>
-            <a:r>
-              <a:rPr lang="it-IT" sz="1600" dirty="0" err="1"/>
-              <a:t>infer</a:t>
-            </a:r>
-            <a:r>
-              <a:rPr lang="it-IT" sz="1600" dirty="0"/>
-              <a:t> information </a:t>
-            </a:r>
-            <a:r>
-              <a:rPr lang="it-IT" sz="1600" dirty="0" err="1"/>
-              <a:t>about</a:t>
-            </a:r>
-            <a:r>
-              <a:rPr lang="it-IT" sz="1600" dirty="0"/>
-              <a:t> </a:t>
-            </a:r>
-            <a:r>
-              <a:rPr lang="it-IT" sz="1600" dirty="0" err="1"/>
-              <a:t>shape</a:t>
-            </a:r>
-            <a:r>
-              <a:rPr lang="it-IT" sz="1600" dirty="0"/>
-              <a:t> and size of </a:t>
-            </a:r>
-            <a:r>
-              <a:rPr lang="it-IT" sz="1600" dirty="0" err="1"/>
-              <a:t>objects</a:t>
-            </a:r>
-            <a:r>
-              <a:rPr lang="it-IT" sz="1600" dirty="0"/>
-              <a:t> in the image</a:t>
-            </a:r>
-            <a:endParaRPr lang="it-IT" sz="1600" b="0" i="0" u="none" strike="noStrike" baseline="0" dirty="0"/>
-          </a:p>
-          <a:p>
-            <a:pPr lvl="1"/>
-            <a:endParaRPr lang="it-IT" sz="1600" b="0" i="0" u="none" strike="noStrike" baseline="0" dirty="0"/>
-          </a:p>
-          <a:p>
-            <a:pPr lvl="1"/>
-            <a:endParaRPr lang="it-IT" sz="1600" b="0" i="0" u="none" strike="noStrike" baseline="0" dirty="0">
-              <a:latin typeface="Courier New" panose="02070309020205020404" pitchFamily="49" charset="0"/>
-            </a:endParaRPr>
-          </a:p>
-          <a:p>
-            <a:pPr lvl="1"/>
-            <a:endParaRPr lang="it-IT" sz="1600" b="0" i="0" u="none" strike="noStrike" baseline="0" dirty="0">
-              <a:latin typeface="Courier New" panose="02070309020205020404" pitchFamily="49" charset="0"/>
-            </a:endParaRPr>
-          </a:p>
-          <a:p>
-            <a:pPr lvl="1"/>
-            <a:endParaRPr lang="pl-PL" sz="1600" b="0" i="0" u="none" strike="noStrike" baseline="0" dirty="0">
-              <a:latin typeface="Courier New" panose="02070309020205020404" pitchFamily="49" charset="0"/>
-            </a:endParaRPr>
-          </a:p>
-          <a:p>
-            <a:endParaRPr lang="it-IT" sz="1600" b="0" i="0" u="none" strike="noStrike" baseline="0" dirty="0"/>
-          </a:p>
-          <a:p>
-            <a:pPr lvl="1"/>
-            <a:endParaRPr lang="it-IT" sz="1600" b="0" i="0" u="none" strike="noStrike" baseline="0" dirty="0"/>
-          </a:p>
-        </p:txBody>
-      </p:sp>
-      <p:sp>
-        <p:nvSpPr>
-          <p:cNvPr id="93" name="Freeform 6">
+          <p:cNvPr id="16" name="Freeform 6">
             <a:extLst>
               <a:ext uri="{FF2B5EF4-FFF2-40B4-BE49-F238E27FC236}">
                 <a16:creationId xmlns:a16="http://schemas.microsoft.com/office/drawing/2014/main" id="{CC1026F7-DECB-49B4-A565-518BBA445471}"/>
@@ -23736,7 +22966,7 @@
                   <a:spcPts val="600"/>
                 </a:spcAft>
               </a:pPr>
-              <a:t>48</a:t>
+              <a:t>46</a:t>
             </a:fld>
             <a:endParaRPr lang="it-IT" dirty="0"/>
           </a:p>
@@ -23745,7 +22975,7 @@
     </p:spTree>
     <p:extLst>
       <p:ext uri="{BB962C8B-B14F-4D97-AF65-F5344CB8AC3E}">
-        <p14:creationId xmlns:p14="http://schemas.microsoft.com/office/powerpoint/2010/main" val="1025911777"/>
+        <p14:creationId xmlns:p14="http://schemas.microsoft.com/office/powerpoint/2010/main" val="589200849"/>
       </p:ext>
     </p:extLst>
   </p:cSld>
@@ -23755,7 +22985,365 @@
 </p:sld>
 </file>
 
-<file path=ppt/slides/slide49.xml><?xml version="1.0" encoding="utf-8"?>
+<file path=ppt/slides/slide47.xml><?xml version="1.0" encoding="utf-8"?>
+<p:sld xmlns:a="http://schemas.openxmlformats.org/drawingml/2006/main" xmlns:r="http://schemas.openxmlformats.org/officeDocument/2006/relationships" xmlns:p="http://schemas.openxmlformats.org/presentationml/2006/main">
+  <p:cSld>
+    <p:spTree>
+      <p:nvGrpSpPr>
+        <p:cNvPr id="1" name=""/>
+        <p:cNvGrpSpPr/>
+        <p:nvPr/>
+      </p:nvGrpSpPr>
+      <p:grpSpPr>
+        <a:xfrm>
+          <a:off x="0" y="0"/>
+          <a:ext cx="0" cy="0"/>
+          <a:chOff x="0" y="0"/>
+          <a:chExt cx="0" cy="0"/>
+        </a:xfrm>
+      </p:grpSpPr>
+      <p:sp>
+        <p:nvSpPr>
+          <p:cNvPr id="2" name="Titolo 1">
+            <a:extLst>
+              <a:ext uri="{FF2B5EF4-FFF2-40B4-BE49-F238E27FC236}">
+                <a16:creationId xmlns:a16="http://schemas.microsoft.com/office/drawing/2014/main" id="{233C87B1-734D-48CF-991A-EDF93F1C8061}"/>
+              </a:ext>
+            </a:extLst>
+          </p:cNvPr>
+          <p:cNvSpPr>
+            <a:spLocks noGrp="1"/>
+          </p:cNvSpPr>
+          <p:nvPr>
+            <p:ph type="title"/>
+          </p:nvPr>
+        </p:nvSpPr>
+        <p:spPr/>
+        <p:txBody>
+          <a:bodyPr>
+            <a:normAutofit/>
+          </a:bodyPr>
+          <a:lstStyle/>
+          <a:p>
+            <a:r>
+              <a:rPr lang="it-IT" sz="4000" dirty="0"/>
+              <a:t>2: Image </a:t>
+            </a:r>
+            <a:r>
+              <a:rPr lang="it-IT" sz="4000" dirty="0" err="1"/>
+              <a:t>analysis</a:t>
+            </a:r>
+            <a:endParaRPr lang="it-IT" sz="4000" dirty="0"/>
+          </a:p>
+        </p:txBody>
+      </p:sp>
+      <p:sp>
+        <p:nvSpPr>
+          <p:cNvPr id="3" name="Segnaposto contenuto 2">
+            <a:extLst>
+              <a:ext uri="{FF2B5EF4-FFF2-40B4-BE49-F238E27FC236}">
+                <a16:creationId xmlns:a16="http://schemas.microsoft.com/office/drawing/2014/main" id="{F0720EDD-94B2-432D-8E17-B53711CDC5B2}"/>
+              </a:ext>
+            </a:extLst>
+          </p:cNvPr>
+          <p:cNvSpPr>
+            <a:spLocks noGrp="1"/>
+          </p:cNvSpPr>
+          <p:nvPr>
+            <p:ph idx="1"/>
+          </p:nvPr>
+        </p:nvSpPr>
+        <p:spPr/>
+        <p:txBody>
+          <a:bodyPr/>
+          <a:lstStyle/>
+          <a:p>
+            <a:r>
+              <a:rPr lang="it-IT" dirty="0"/>
+              <a:t>Goal: </a:t>
+            </a:r>
+            <a:r>
+              <a:rPr lang="it-IT" dirty="0" err="1"/>
+              <a:t>Recognize</a:t>
+            </a:r>
+            <a:r>
+              <a:rPr lang="it-IT" dirty="0"/>
+              <a:t> in the </a:t>
+            </a:r>
+            <a:r>
+              <a:rPr lang="it-IT" dirty="0" err="1"/>
+              <a:t>proposed</a:t>
+            </a:r>
+            <a:r>
+              <a:rPr lang="it-IT" dirty="0"/>
+              <a:t> images </a:t>
+            </a:r>
+            <a:r>
+              <a:rPr lang="it-IT" dirty="0" err="1"/>
+              <a:t>various</a:t>
+            </a:r>
+            <a:r>
+              <a:rPr lang="it-IT" dirty="0"/>
+              <a:t> </a:t>
+            </a:r>
+            <a:r>
+              <a:rPr lang="it-IT" dirty="0" err="1"/>
+              <a:t>obejct</a:t>
+            </a:r>
+            <a:r>
+              <a:rPr lang="it-IT" dirty="0"/>
+              <a:t> </a:t>
+            </a:r>
+            <a:r>
+              <a:rPr lang="it-IT" dirty="0" err="1"/>
+              <a:t>using</a:t>
+            </a:r>
+            <a:r>
+              <a:rPr lang="it-IT" dirty="0"/>
+              <a:t> the </a:t>
+            </a:r>
+            <a:r>
+              <a:rPr lang="it-IT" dirty="0" err="1"/>
+              <a:t>tecniques</a:t>
+            </a:r>
+            <a:r>
+              <a:rPr lang="it-IT" dirty="0"/>
+              <a:t> </a:t>
+            </a:r>
+            <a:r>
+              <a:rPr lang="it-IT" dirty="0" err="1"/>
+              <a:t>seen</a:t>
+            </a:r>
+            <a:r>
+              <a:rPr lang="it-IT" dirty="0"/>
+              <a:t> in the </a:t>
+            </a:r>
+            <a:r>
+              <a:rPr lang="it-IT" dirty="0" err="1"/>
+              <a:t>lectures</a:t>
+            </a:r>
+            <a:r>
+              <a:rPr lang="it-IT" dirty="0"/>
+              <a:t> </a:t>
+            </a:r>
+            <a:r>
+              <a:rPr lang="it-IT" dirty="0" err="1"/>
+              <a:t>related</a:t>
+            </a:r>
+            <a:r>
+              <a:rPr lang="it-IT" dirty="0"/>
+              <a:t> to Image Analysis.</a:t>
+            </a:r>
+          </a:p>
+          <a:p>
+            <a:r>
+              <a:rPr lang="it-IT" dirty="0"/>
+              <a:t>The </a:t>
+            </a:r>
+            <a:r>
+              <a:rPr lang="it-IT" dirty="0" err="1"/>
+              <a:t>cited</a:t>
+            </a:r>
+            <a:r>
+              <a:rPr lang="it-IT" dirty="0"/>
+              <a:t> </a:t>
+            </a:r>
+            <a:r>
+              <a:rPr lang="it-IT" dirty="0" err="1"/>
+              <a:t>tecniques</a:t>
+            </a:r>
+            <a:r>
+              <a:rPr lang="it-IT" dirty="0"/>
+              <a:t> involve </a:t>
+            </a:r>
+            <a:r>
+              <a:rPr lang="it-IT" dirty="0" err="1"/>
+              <a:t>morphological</a:t>
+            </a:r>
+            <a:r>
+              <a:rPr lang="it-IT" dirty="0"/>
+              <a:t> </a:t>
+            </a:r>
+            <a:r>
+              <a:rPr lang="it-IT" dirty="0" err="1"/>
+              <a:t>operations</a:t>
+            </a:r>
+            <a:r>
+              <a:rPr lang="it-IT" dirty="0"/>
+              <a:t> like </a:t>
+            </a:r>
+            <a:r>
+              <a:rPr lang="it-IT" dirty="0" err="1"/>
+              <a:t>binarization</a:t>
+            </a:r>
+            <a:r>
+              <a:rPr lang="it-IT" dirty="0"/>
+              <a:t>, opening, or closing. The concepts of </a:t>
+            </a:r>
+            <a:r>
+              <a:rPr lang="it-IT" dirty="0" err="1"/>
+              <a:t>regions</a:t>
+            </a:r>
+            <a:r>
+              <a:rPr lang="it-IT" dirty="0"/>
+              <a:t>, </a:t>
+            </a:r>
+            <a:r>
+              <a:rPr lang="it-IT" dirty="0" err="1"/>
+              <a:t>connected</a:t>
+            </a:r>
+            <a:r>
+              <a:rPr lang="it-IT" dirty="0"/>
+              <a:t> </a:t>
+            </a:r>
+            <a:r>
+              <a:rPr lang="it-IT" dirty="0" err="1"/>
+              <a:t>components</a:t>
+            </a:r>
+            <a:r>
+              <a:rPr lang="it-IT" dirty="0"/>
+              <a:t>, </a:t>
+            </a:r>
+            <a:r>
+              <a:rPr lang="it-IT" dirty="0" err="1"/>
+              <a:t>bounding</a:t>
+            </a:r>
+            <a:r>
+              <a:rPr lang="it-IT" dirty="0"/>
+              <a:t> box, </a:t>
+            </a:r>
+            <a:r>
+              <a:rPr lang="it-IT" dirty="0" err="1"/>
+              <a:t>elongation</a:t>
+            </a:r>
+            <a:r>
+              <a:rPr lang="it-IT" dirty="0"/>
+              <a:t>, </a:t>
+            </a:r>
+            <a:r>
+              <a:rPr lang="it-IT" dirty="0" err="1"/>
+              <a:t>eccentricity</a:t>
+            </a:r>
+            <a:r>
+              <a:rPr lang="it-IT" dirty="0"/>
+              <a:t> and </a:t>
+            </a:r>
+            <a:r>
+              <a:rPr lang="it-IT" dirty="0" err="1"/>
+              <a:t>others</a:t>
+            </a:r>
+            <a:r>
+              <a:rPr lang="it-IT" dirty="0"/>
+              <a:t> </a:t>
+            </a:r>
+            <a:r>
+              <a:rPr lang="it-IT" dirty="0" err="1"/>
+              <a:t>have</a:t>
+            </a:r>
+            <a:r>
+              <a:rPr lang="it-IT" dirty="0"/>
+              <a:t> </a:t>
+            </a:r>
+            <a:r>
+              <a:rPr lang="it-IT" dirty="0" err="1"/>
+              <a:t>been</a:t>
+            </a:r>
+            <a:r>
+              <a:rPr lang="it-IT" dirty="0"/>
+              <a:t> </a:t>
+            </a:r>
+            <a:r>
+              <a:rPr lang="it-IT" dirty="0" err="1"/>
+              <a:t>also</a:t>
+            </a:r>
+            <a:r>
+              <a:rPr lang="it-IT" dirty="0"/>
+              <a:t> </a:t>
+            </a:r>
+            <a:r>
+              <a:rPr lang="it-IT" dirty="0" err="1"/>
+              <a:t>used</a:t>
+            </a:r>
+            <a:r>
+              <a:rPr lang="it-IT" dirty="0"/>
+              <a:t> to </a:t>
+            </a:r>
+            <a:r>
+              <a:rPr lang="it-IT" dirty="0" err="1"/>
+              <a:t>obtain</a:t>
+            </a:r>
+            <a:r>
+              <a:rPr lang="it-IT" dirty="0"/>
+              <a:t> the </a:t>
+            </a:r>
+            <a:r>
+              <a:rPr lang="it-IT" dirty="0" err="1"/>
+              <a:t>objectives</a:t>
+            </a:r>
+            <a:r>
+              <a:rPr lang="it-IT" dirty="0"/>
+              <a:t> of the </a:t>
+            </a:r>
+            <a:r>
+              <a:rPr lang="it-IT" dirty="0" err="1"/>
+              <a:t>assignments</a:t>
+            </a:r>
+            <a:r>
+              <a:rPr lang="it-IT" dirty="0"/>
+              <a:t>. </a:t>
+            </a:r>
+          </a:p>
+          <a:p>
+            <a:endParaRPr lang="it-IT" dirty="0"/>
+          </a:p>
+          <a:p>
+            <a:endParaRPr lang="it-IT" dirty="0"/>
+          </a:p>
+        </p:txBody>
+      </p:sp>
+      <p:sp>
+        <p:nvSpPr>
+          <p:cNvPr id="4" name="Segnaposto numero diapositiva 3">
+            <a:extLst>
+              <a:ext uri="{FF2B5EF4-FFF2-40B4-BE49-F238E27FC236}">
+                <a16:creationId xmlns:a16="http://schemas.microsoft.com/office/drawing/2014/main" id="{12E66E89-1F17-4BE1-950A-D0A6AAD464A6}"/>
+              </a:ext>
+            </a:extLst>
+          </p:cNvPr>
+          <p:cNvSpPr>
+            <a:spLocks noGrp="1"/>
+          </p:cNvSpPr>
+          <p:nvPr>
+            <p:ph type="sldNum" sz="quarter" idx="12"/>
+          </p:nvPr>
+        </p:nvSpPr>
+        <p:spPr/>
+        <p:txBody>
+          <a:bodyPr/>
+          <a:lstStyle/>
+          <a:p>
+            <a:fld id="{9E8ABD2E-3A5F-4DED-804B-27CF0A0D3579}" type="slidenum">
+              <a:rPr lang="it-IT" smtClean="0"/>
+              <a:t>47</a:t>
+            </a:fld>
+            <a:endParaRPr lang="it-IT"/>
+          </a:p>
+        </p:txBody>
+      </p:sp>
+    </p:spTree>
+    <p:extLst>
+      <p:ext uri="{BB962C8B-B14F-4D97-AF65-F5344CB8AC3E}">
+        <p14:creationId xmlns:p14="http://schemas.microsoft.com/office/powerpoint/2010/main" val="755570594"/>
+      </p:ext>
+    </p:extLst>
+  </p:cSld>
+  <p:clrMapOvr>
+    <a:masterClrMapping/>
+  </p:clrMapOvr>
+</p:sld>
+</file>
+
+<file path=ppt/slides/slide48.xml><?xml version="1.0" encoding="utf-8"?>
 <p:sld xmlns:a="http://schemas.openxmlformats.org/drawingml/2006/main" xmlns:r="http://schemas.openxmlformats.org/officeDocument/2006/relationships" xmlns:p="http://schemas.openxmlformats.org/presentationml/2006/main">
   <p:cSld>
     <p:bg>
@@ -23782,7 +23370,7 @@
       </p:grpSpPr>
       <p:sp useBgFill="1">
         <p:nvSpPr>
-          <p:cNvPr id="98" name="Rectangle 97">
+          <p:cNvPr id="84" name="Rectangle 83">
             <a:extLst>
               <a:ext uri="{FF2B5EF4-FFF2-40B4-BE49-F238E27FC236}">
                 <a16:creationId xmlns:a16="http://schemas.microsoft.com/office/drawing/2014/main" id="{1D868099-6145-4BC0-A5EA-74BEF1776BA9}"/>
@@ -23873,7 +23461,7 @@
                 <a:ea typeface="Linux Biolinum G" panose="02000503000000000000" pitchFamily="2" charset="0"/>
                 <a:cs typeface="Linux Biolinum G" panose="02000503000000000000" pitchFamily="2" charset="0"/>
               </a:rPr>
-              <a:t>Image Analysis: HW 3</a:t>
+              <a:t>Image Analysis: HW 1</a:t>
             </a:r>
           </a:p>
         </p:txBody>
@@ -23883,7 +23471,7 @@
           <p:cNvPr id="5" name="Immagine 4">
             <a:extLst>
               <a:ext uri="{FF2B5EF4-FFF2-40B4-BE49-F238E27FC236}">
-                <a16:creationId xmlns:a16="http://schemas.microsoft.com/office/drawing/2014/main" id="{A684A9BF-B39E-42D9-9FB3-83B1206A7039}"/>
+                <a16:creationId xmlns:a16="http://schemas.microsoft.com/office/drawing/2014/main" id="{9C45DDFD-88E2-436C-878F-C9172F8243D0}"/>
               </a:ext>
             </a:extLst>
           </p:cNvPr>
@@ -23949,28 +23537,8 @@
           </a:p>
           <a:p>
             <a:r>
-              <a:rPr lang="it-IT" sz="1600" b="0" i="0" u="none" strike="noStrike" baseline="0" dirty="0"/>
-              <a:t>Use </a:t>
-            </a:r>
-            <a:r>
-              <a:rPr lang="it-IT" sz="1600" b="0" i="0" u="none" strike="noStrike" baseline="0" dirty="0" err="1"/>
-              <a:t>morphological</a:t>
-            </a:r>
-            <a:r>
-              <a:rPr lang="it-IT" sz="1600" b="0" i="0" u="none" strike="noStrike" baseline="0" dirty="0"/>
-              <a:t> </a:t>
-            </a:r>
-            <a:r>
               <a:rPr lang="it-IT" sz="1600" dirty="0" err="1"/>
-              <a:t>operators</a:t>
-            </a:r>
-            <a:r>
-              <a:rPr lang="it-IT" sz="1600" dirty="0"/>
-              <a:t> and </a:t>
-            </a:r>
-            <a:r>
-              <a:rPr lang="it-IT" sz="1600" dirty="0" err="1"/>
-              <a:t>region</a:t>
+              <a:t>Obtain</a:t>
             </a:r>
             <a:r>
               <a:rPr lang="it-IT" sz="1600" dirty="0"/>
@@ -23978,23 +23546,7 @@
             </a:r>
             <a:r>
               <a:rPr lang="it-IT" sz="1600" dirty="0" err="1"/>
-              <a:t>properties</a:t>
-            </a:r>
-            <a:r>
-              <a:rPr lang="it-IT" sz="1600" dirty="0"/>
-              <a:t> to </a:t>
-            </a:r>
-            <a:r>
-              <a:rPr lang="it-IT" sz="1600" dirty="0" err="1"/>
-              <a:t>infer</a:t>
-            </a:r>
-            <a:r>
-              <a:rPr lang="it-IT" sz="1600" dirty="0"/>
-              <a:t> information </a:t>
-            </a:r>
-            <a:r>
-              <a:rPr lang="it-IT" sz="1600" dirty="0" err="1"/>
-              <a:t>about</a:t>
+              <a:t>same</a:t>
             </a:r>
             <a:r>
               <a:rPr lang="it-IT" sz="1600" dirty="0"/>
@@ -24002,23 +23554,23 @@
             </a:r>
             <a:r>
               <a:rPr lang="it-IT" sz="1600" dirty="0" err="1"/>
-              <a:t>shape</a:t>
+              <a:t>results</a:t>
             </a:r>
             <a:r>
               <a:rPr lang="it-IT" sz="1600" dirty="0"/>
-              <a:t> and size of </a:t>
+              <a:t> of </a:t>
             </a:r>
             <a:r>
               <a:rPr lang="it-IT" sz="1600" dirty="0" err="1"/>
-              <a:t>objects</a:t>
+              <a:t>exercise</a:t>
             </a:r>
             <a:r>
               <a:rPr lang="it-IT" sz="1600" dirty="0"/>
-              <a:t> in an image of </a:t>
+              <a:t> 1 (</a:t>
             </a:r>
             <a:r>
               <a:rPr lang="it-IT" sz="1600" dirty="0" err="1"/>
-              <a:t>our</a:t>
+              <a:t>not</a:t>
             </a:r>
             <a:r>
               <a:rPr lang="it-IT" sz="1600" dirty="0"/>
@@ -24026,7 +23578,27 @@
             </a:r>
             <a:r>
               <a:rPr lang="it-IT" sz="1600" dirty="0" err="1"/>
-              <a:t>choice</a:t>
+              <a:t>reported</a:t>
+            </a:r>
+            <a:r>
+              <a:rPr lang="it-IT" sz="1600" dirty="0"/>
+              <a:t> </a:t>
+            </a:r>
+            <a:r>
+              <a:rPr lang="it-IT" sz="1600" dirty="0" err="1"/>
+              <a:t>here</a:t>
+            </a:r>
+            <a:r>
+              <a:rPr lang="it-IT" sz="1600" dirty="0"/>
+              <a:t>) with </a:t>
+            </a:r>
+            <a:r>
+              <a:rPr lang="it-IT" sz="1600" dirty="0" err="1"/>
+              <a:t>coins</a:t>
+            </a:r>
+            <a:r>
+              <a:rPr lang="it-IT" sz="1600" dirty="0"/>
+              <a:t> image</a:t>
             </a:r>
             <a:endParaRPr lang="it-IT" sz="1600" b="0" i="0" u="none" strike="noStrike" baseline="0" dirty="0"/>
           </a:p>
@@ -24063,7 +23635,7 @@
       </p:sp>
       <p:sp>
         <p:nvSpPr>
-          <p:cNvPr id="100" name="Freeform 6">
+          <p:cNvPr id="86" name="Freeform 6">
             <a:extLst>
               <a:ext uri="{FF2B5EF4-FFF2-40B4-BE49-F238E27FC236}">
                 <a16:creationId xmlns:a16="http://schemas.microsoft.com/office/drawing/2014/main" id="{CC1026F7-DECB-49B4-A565-518BBA445471}"/>
@@ -24176,7 +23748,7 @@
                   <a:spcPts val="600"/>
                 </a:spcAft>
               </a:pPr>
-              <a:t>49</a:t>
+              <a:t>48</a:t>
             </a:fld>
             <a:endParaRPr lang="it-IT" dirty="0"/>
           </a:p>
@@ -24185,7 +23757,7 @@
     </p:spTree>
     <p:extLst>
       <p:ext uri="{BB962C8B-B14F-4D97-AF65-F5344CB8AC3E}">
-        <p14:creationId xmlns:p14="http://schemas.microsoft.com/office/powerpoint/2010/main" val="125450256"/>
+        <p14:creationId xmlns:p14="http://schemas.microsoft.com/office/powerpoint/2010/main" val="1953208238"/>
       </p:ext>
     </p:extLst>
   </p:cSld>
@@ -24195,7 +23767,7 @@
 </p:sld>
 </file>
 
-<file path=ppt/slides/slide5.xml><?xml version="1.0" encoding="utf-8"?>
+<file path=ppt/slides/slide49.xml><?xml version="1.0" encoding="utf-8"?>
 <p:sld xmlns:a="http://schemas.openxmlformats.org/drawingml/2006/main" xmlns:r="http://schemas.openxmlformats.org/officeDocument/2006/relationships" xmlns:p="http://schemas.openxmlformats.org/presentationml/2006/main">
   <p:cSld>
     <p:bg>
@@ -24222,7 +23794,7 @@
       </p:grpSpPr>
       <p:sp useBgFill="1">
         <p:nvSpPr>
-          <p:cNvPr id="108" name="Rectangle 107">
+          <p:cNvPr id="91" name="Rectangle 90">
             <a:extLst>
               <a:ext uri="{FF2B5EF4-FFF2-40B4-BE49-F238E27FC236}">
                 <a16:creationId xmlns:a16="http://schemas.microsoft.com/office/drawing/2014/main" id="{1D868099-6145-4BC0-A5EA-74BEF1776BA9}"/>
@@ -24313,46 +23885,17 @@
                 <a:ea typeface="Linux Biolinum G" panose="02000503000000000000" pitchFamily="2" charset="0"/>
                 <a:cs typeface="Linux Biolinum G" panose="02000503000000000000" pitchFamily="2" charset="0"/>
               </a:rPr>
-              <a:t>5° Degree </a:t>
-            </a:r>
-            <a:r>
-              <a:rPr lang="it-IT" sz="2800">
-                <a:ea typeface="Linux Biolinum G" panose="02000503000000000000" pitchFamily="2" charset="0"/>
-                <a:cs typeface="Linux Biolinum G" panose="02000503000000000000" pitchFamily="2" charset="0"/>
-              </a:rPr>
-              <a:t>Polynomial</a:t>
-            </a:r>
-            <a:r>
-              <a:rPr lang="it-IT" sz="2800" dirty="0">
-                <a:ea typeface="Linux Biolinum G" panose="02000503000000000000" pitchFamily="2" charset="0"/>
-                <a:cs typeface="Linux Biolinum G" panose="02000503000000000000" pitchFamily="2" charset="0"/>
-              </a:rPr>
-              <a:t>: </a:t>
-            </a:r>
-            <a:r>
-              <a:rPr lang="it-IT" sz="2800" b="1" dirty="0">
-                <a:ea typeface="DejaVu Math TeX Gyre" panose="02000503000000000000" pitchFamily="2" charset="0"/>
-                <a:cs typeface="DejaVu Math TeX Gyre" panose="02000503000000000000" pitchFamily="2" charset="0"/>
-              </a:rPr>
-              <a:t>∆</a:t>
-            </a:r>
-            <a:r>
-              <a:rPr lang="it-IT" sz="2800" b="1" dirty="0"/>
-              <a:t>T</a:t>
-            </a:r>
-            <a:endParaRPr lang="it-IT" sz="2800" dirty="0">
-              <a:ea typeface="Linux Biolinum G" panose="02000503000000000000" pitchFamily="2" charset="0"/>
-              <a:cs typeface="Linux Biolinum G" panose="02000503000000000000" pitchFamily="2" charset="0"/>
-            </a:endParaRPr>
+              <a:t>Image Analysis: HW 2</a:t>
+            </a:r>
           </a:p>
         </p:txBody>
       </p:sp>
       <p:pic>
         <p:nvPicPr>
-          <p:cNvPr id="8" name="Immagine 7">
+          <p:cNvPr id="7" name="Immagine 6">
             <a:extLst>
               <a:ext uri="{FF2B5EF4-FFF2-40B4-BE49-F238E27FC236}">
-                <a16:creationId xmlns:a16="http://schemas.microsoft.com/office/drawing/2014/main" id="{3F31B3D3-4DA6-488F-9A5A-90D9754ADBA7}"/>
+                <a16:creationId xmlns:a16="http://schemas.microsoft.com/office/drawing/2014/main" id="{493C3807-6F32-4730-AD0C-A3848480444D}"/>
               </a:ext>
             </a:extLst>
           </p:cNvPr>
@@ -24411,89 +23954,116 @@
           </a:bodyPr>
           <a:lstStyle/>
           <a:p>
-            <a:pPr marL="0" indent="0">
-              <a:buNone/>
-            </a:pPr>
-            <a:endParaRPr lang="it-IT" sz="1600"/>
-          </a:p>
-          <a:p>
-            <a:r>
-              <a:rPr lang="it-IT" sz="1600"/>
-              <a:t>Trajectories with continuos velocity and acceleration but discontinuos jerk</a:t>
-            </a:r>
-          </a:p>
-          <a:p>
-            <a:pPr marL="0" indent="0">
-              <a:buNone/>
-            </a:pPr>
-            <a:endParaRPr lang="it-IT" sz="1600" u="sng"/>
-          </a:p>
-          <a:p>
-            <a:r>
-              <a:rPr lang="it-IT" sz="1600" b="1">
-                <a:ea typeface="DejaVu Math TeX Gyre" panose="02000503000000000000" pitchFamily="2" charset="0"/>
-                <a:cs typeface="DejaVu Math TeX Gyre" panose="02000503000000000000" pitchFamily="2" charset="0"/>
-              </a:rPr>
-              <a:t>∆</a:t>
-            </a:r>
-            <a:r>
-              <a:rPr lang="it-IT" sz="1600" b="1"/>
-              <a:t>T Formulation</a:t>
-            </a:r>
-          </a:p>
-          <a:p>
-            <a:r>
-              <a:rPr lang="it-IT" sz="1600"/>
-              <a:t>Inital and final conditions:</a:t>
-            </a:r>
+            <a:endParaRPr lang="it-IT" sz="1600" dirty="0"/>
+          </a:p>
+          <a:p>
+            <a:endParaRPr lang="it-IT" sz="1600" dirty="0"/>
+          </a:p>
+          <a:p>
+            <a:r>
+              <a:rPr lang="it-IT" sz="1600" b="0" i="0" u="none" strike="noStrike" baseline="0" dirty="0"/>
+              <a:t>Use </a:t>
+            </a:r>
+            <a:r>
+              <a:rPr lang="it-IT" sz="1600" b="0" i="0" u="none" strike="noStrike" baseline="0" dirty="0" err="1"/>
+              <a:t>morphological</a:t>
+            </a:r>
+            <a:r>
+              <a:rPr lang="it-IT" sz="1600" b="0" i="0" u="none" strike="noStrike" baseline="0" dirty="0"/>
+              <a:t> </a:t>
+            </a:r>
+            <a:r>
+              <a:rPr lang="it-IT" sz="1600" dirty="0" err="1"/>
+              <a:t>operators</a:t>
+            </a:r>
+            <a:r>
+              <a:rPr lang="it-IT" sz="1600" dirty="0"/>
+              <a:t> and </a:t>
+            </a:r>
+            <a:r>
+              <a:rPr lang="it-IT" sz="1600" dirty="0" err="1"/>
+              <a:t>region</a:t>
+            </a:r>
+            <a:r>
+              <a:rPr lang="it-IT" sz="1600" dirty="0"/>
+              <a:t> </a:t>
+            </a:r>
+            <a:r>
+              <a:rPr lang="it-IT" sz="1600" dirty="0" err="1"/>
+              <a:t>properties</a:t>
+            </a:r>
+            <a:r>
+              <a:rPr lang="it-IT" sz="1600" dirty="0"/>
+              <a:t> to </a:t>
+            </a:r>
+            <a:r>
+              <a:rPr lang="it-IT" sz="1600" dirty="0" err="1"/>
+              <a:t>infer</a:t>
+            </a:r>
+            <a:r>
+              <a:rPr lang="it-IT" sz="1600" dirty="0"/>
+              <a:t> information </a:t>
+            </a:r>
+            <a:r>
+              <a:rPr lang="it-IT" sz="1600" dirty="0" err="1"/>
+              <a:t>about</a:t>
+            </a:r>
+            <a:r>
+              <a:rPr lang="it-IT" sz="1600" dirty="0"/>
+              <a:t> </a:t>
+            </a:r>
+            <a:r>
+              <a:rPr lang="it-IT" sz="1600" dirty="0" err="1"/>
+              <a:t>shape</a:t>
+            </a:r>
+            <a:r>
+              <a:rPr lang="it-IT" sz="1600" dirty="0"/>
+              <a:t> and size of </a:t>
+            </a:r>
+            <a:r>
+              <a:rPr lang="it-IT" sz="1600" dirty="0" err="1"/>
+              <a:t>objects</a:t>
+            </a:r>
+            <a:r>
+              <a:rPr lang="it-IT" sz="1600" dirty="0"/>
+              <a:t> in the image</a:t>
+            </a:r>
+            <a:endParaRPr lang="it-IT" sz="1600" b="0" i="0" u="none" strike="noStrike" baseline="0" dirty="0"/>
           </a:p>
           <a:p>
             <a:pPr lvl="1"/>
-            <a:r>
-              <a:rPr lang="it-IT" sz="1600" b="0" i="0" u="none" strike="noStrike" baseline="0"/>
-              <a:t>qi=4;   	qf=10;</a:t>
-            </a:r>
+            <a:endParaRPr lang="it-IT" sz="1600" b="0" i="0" u="none" strike="noStrike" baseline="0" dirty="0"/>
           </a:p>
           <a:p>
             <a:pPr lvl="1"/>
-            <a:r>
-              <a:rPr lang="it-IT" sz="1600" b="0" i="0" u="none" strike="noStrike" baseline="0"/>
-              <a:t>dqi=0;   	dqf=5;</a:t>
-            </a:r>
+            <a:endParaRPr lang="it-IT" sz="1600" b="0" i="0" u="none" strike="noStrike" baseline="0" dirty="0">
+              <a:latin typeface="Courier New" panose="02070309020205020404" pitchFamily="49" charset="0"/>
+            </a:endParaRPr>
           </a:p>
           <a:p>
             <a:pPr lvl="1"/>
-            <a:r>
-              <a:rPr lang="it-IT" sz="1600" b="0" i="0" u="none" strike="noStrike" baseline="0"/>
-              <a:t>ddqi=0;	 ddqf=0;</a:t>
-            </a:r>
+            <a:endParaRPr lang="it-IT" sz="1600" b="0" i="0" u="none" strike="noStrike" baseline="0" dirty="0">
+              <a:latin typeface="Courier New" panose="02070309020205020404" pitchFamily="49" charset="0"/>
+            </a:endParaRPr>
           </a:p>
           <a:p>
             <a:pPr lvl="1"/>
-            <a:r>
-              <a:rPr lang="it-IT" sz="1600" b="0" i="0" u="none" strike="noStrike" baseline="0"/>
-              <a:t>ti=</a:t>
-            </a:r>
-            <a:r>
-              <a:rPr lang="it-IT" sz="1600" i="0"/>
-              <a:t>5;</a:t>
-            </a:r>
-            <a:r>
-              <a:rPr lang="it-IT" sz="1600" b="0" i="0" u="none" strike="noStrike" baseline="0"/>
-              <a:t> 	tf=10</a:t>
-            </a:r>
-          </a:p>
-          <a:p>
-            <a:pPr marL="530352" lvl="1" indent="0">
-              <a:buNone/>
-            </a:pPr>
-            <a:endParaRPr lang="it-IT" sz="1600" b="0" i="0" u="none" strike="noStrike" baseline="0"/>
+            <a:endParaRPr lang="pl-PL" sz="1600" b="0" i="0" u="none" strike="noStrike" baseline="0" dirty="0">
+              <a:latin typeface="Courier New" panose="02070309020205020404" pitchFamily="49" charset="0"/>
+            </a:endParaRPr>
+          </a:p>
+          <a:p>
+            <a:endParaRPr lang="it-IT" sz="1600" b="0" i="0" u="none" strike="noStrike" baseline="0" dirty="0"/>
+          </a:p>
+          <a:p>
+            <a:pPr lvl="1"/>
+            <a:endParaRPr lang="it-IT" sz="1600" b="0" i="0" u="none" strike="noStrike" baseline="0" dirty="0"/>
           </a:p>
         </p:txBody>
       </p:sp>
       <p:sp>
         <p:nvSpPr>
-          <p:cNvPr id="110" name="Freeform 6">
+          <p:cNvPr id="93" name="Freeform 6">
             <a:extLst>
               <a:ext uri="{FF2B5EF4-FFF2-40B4-BE49-F238E27FC236}">
                 <a16:creationId xmlns:a16="http://schemas.microsoft.com/office/drawing/2014/main" id="{CC1026F7-DECB-49B4-A565-518BBA445471}"/>
@@ -24568,6 +24138,436 @@
       </p:sp>
       <p:sp>
         <p:nvSpPr>
+          <p:cNvPr id="6" name="Segnaposto numero diapositiva 5">
+            <a:extLst>
+              <a:ext uri="{FF2B5EF4-FFF2-40B4-BE49-F238E27FC236}">
+                <a16:creationId xmlns:a16="http://schemas.microsoft.com/office/drawing/2014/main" id="{A3D7F0D3-8C5D-4133-B138-703C2DD89CF3}"/>
+              </a:ext>
+            </a:extLst>
+          </p:cNvPr>
+          <p:cNvSpPr>
+            <a:spLocks noGrp="1"/>
+          </p:cNvSpPr>
+          <p:nvPr>
+            <p:ph type="sldNum" sz="quarter" idx="12"/>
+          </p:nvPr>
+        </p:nvSpPr>
+        <p:spPr>
+          <a:xfrm>
+            <a:off x="9472736" y="6453386"/>
+            <a:ext cx="1596292" cy="404614"/>
+          </a:xfrm>
+        </p:spPr>
+        <p:txBody>
+          <a:bodyPr>
+            <a:normAutofit/>
+          </a:bodyPr>
+          <a:lstStyle/>
+          <a:p>
+            <a:pPr>
+              <a:spcAft>
+                <a:spcPts val="600"/>
+              </a:spcAft>
+            </a:pPr>
+            <a:fld id="{9E8ABD2E-3A5F-4DED-804B-27CF0A0D3579}" type="slidenum">
+              <a:rPr lang="it-IT" smtClean="0"/>
+              <a:pPr>
+                <a:spcAft>
+                  <a:spcPts val="600"/>
+                </a:spcAft>
+              </a:pPr>
+              <a:t>49</a:t>
+            </a:fld>
+            <a:endParaRPr lang="it-IT" dirty="0"/>
+          </a:p>
+        </p:txBody>
+      </p:sp>
+    </p:spTree>
+    <p:extLst>
+      <p:ext uri="{BB962C8B-B14F-4D97-AF65-F5344CB8AC3E}">
+        <p14:creationId xmlns:p14="http://schemas.microsoft.com/office/powerpoint/2010/main" val="1025911777"/>
+      </p:ext>
+    </p:extLst>
+  </p:cSld>
+  <p:clrMapOvr>
+    <a:masterClrMapping/>
+  </p:clrMapOvr>
+</p:sld>
+</file>
+
+<file path=ppt/slides/slide5.xml><?xml version="1.0" encoding="utf-8"?>
+<p:sld xmlns:a="http://schemas.openxmlformats.org/drawingml/2006/main" xmlns:r="http://schemas.openxmlformats.org/officeDocument/2006/relationships" xmlns:p="http://schemas.openxmlformats.org/presentationml/2006/main">
+  <p:cSld>
+    <p:bg>
+      <p:bgPr>
+        <a:solidFill>
+          <a:schemeClr val="bg2"/>
+        </a:solidFill>
+        <a:effectLst/>
+      </p:bgPr>
+    </p:bg>
+    <p:spTree>
+      <p:nvGrpSpPr>
+        <p:cNvPr id="1" name=""/>
+        <p:cNvGrpSpPr/>
+        <p:nvPr/>
+      </p:nvGrpSpPr>
+      <p:grpSpPr>
+        <a:xfrm>
+          <a:off x="0" y="0"/>
+          <a:ext cx="0" cy="0"/>
+          <a:chOff x="0" y="0"/>
+          <a:chExt cx="0" cy="0"/>
+        </a:xfrm>
+      </p:grpSpPr>
+      <p:sp useBgFill="1">
+        <p:nvSpPr>
+          <p:cNvPr id="108" name="Rectangle 107">
+            <a:extLst>
+              <a:ext uri="{FF2B5EF4-FFF2-40B4-BE49-F238E27FC236}">
+                <a16:creationId xmlns:a16="http://schemas.microsoft.com/office/drawing/2014/main" id="{1D868099-6145-4BC0-A5EA-74BEF1776BA9}"/>
+              </a:ext>
+              <a:ext uri="{C183D7F6-B498-43B3-948B-1728B52AA6E4}">
+                <adec:decorative xmlns:adec="http://schemas.microsoft.com/office/drawing/2017/decorative" val="1"/>
+              </a:ext>
+            </a:extLst>
+          </p:cNvPr>
+          <p:cNvSpPr>
+            <a:spLocks noGrp="1" noRot="1" noChangeAspect="1" noMove="1" noResize="1" noEditPoints="1" noAdjustHandles="1" noChangeArrowheads="1" noChangeShapeType="1" noTextEdit="1"/>
+          </p:cNvSpPr>
+          <p:nvPr>
+            <p:extLst>
+              <p:ext uri="{386F3935-93C4-4BCD-93E2-E3B085C9AB24}">
+                <p16:designElem xmlns:p16="http://schemas.microsoft.com/office/powerpoint/2015/main" val="1"/>
+              </p:ext>
+            </p:extLst>
+          </p:nvPr>
+        </p:nvSpPr>
+        <p:spPr>
+          <a:xfrm>
+            <a:off x="0" y="0"/>
+            <a:ext cx="12192000" cy="6858000"/>
+          </a:xfrm>
+          <a:prstGeom prst="rect">
+            <a:avLst/>
+          </a:prstGeom>
+          <a:ln>
+            <a:noFill/>
+          </a:ln>
+        </p:spPr>
+        <p:style>
+          <a:lnRef idx="2">
+            <a:schemeClr val="accent1">
+              <a:shade val="50000"/>
+            </a:schemeClr>
+          </a:lnRef>
+          <a:fillRef idx="1">
+            <a:schemeClr val="accent1"/>
+          </a:fillRef>
+          <a:effectRef idx="0">
+            <a:schemeClr val="accent1"/>
+          </a:effectRef>
+          <a:fontRef idx="minor">
+            <a:schemeClr val="lt1"/>
+          </a:fontRef>
+        </p:style>
+        <p:txBody>
+          <a:bodyPr rtlCol="0" anchor="ctr"/>
+          <a:lstStyle/>
+          <a:p>
+            <a:pPr algn="ctr"/>
+            <a:endParaRPr lang="en-US"/>
+          </a:p>
+        </p:txBody>
+      </p:sp>
+      <p:sp>
+        <p:nvSpPr>
+          <p:cNvPr id="2" name="Titolo 1">
+            <a:extLst>
+              <a:ext uri="{FF2B5EF4-FFF2-40B4-BE49-F238E27FC236}">
+                <a16:creationId xmlns:a16="http://schemas.microsoft.com/office/drawing/2014/main" id="{FE62F838-6ED5-4511-AB1D-737675EB365E}"/>
+              </a:ext>
+            </a:extLst>
+          </p:cNvPr>
+          <p:cNvSpPr>
+            <a:spLocks noGrp="1"/>
+          </p:cNvSpPr>
+          <p:nvPr>
+            <p:ph type="title"/>
+          </p:nvPr>
+        </p:nvSpPr>
+        <p:spPr>
+          <a:xfrm>
+            <a:off x="8471424" y="1110882"/>
+            <a:ext cx="3053039" cy="1060817"/>
+          </a:xfrm>
+        </p:spPr>
+        <p:txBody>
+          <a:bodyPr anchor="b">
+            <a:normAutofit/>
+          </a:bodyPr>
+          <a:lstStyle/>
+          <a:p>
+            <a:r>
+              <a:rPr lang="it-IT" sz="2800" dirty="0">
+                <a:ea typeface="Linux Biolinum G" panose="02000503000000000000" pitchFamily="2" charset="0"/>
+                <a:cs typeface="Linux Biolinum G" panose="02000503000000000000" pitchFamily="2" charset="0"/>
+              </a:rPr>
+              <a:t>5° Degree </a:t>
+            </a:r>
+            <a:r>
+              <a:rPr lang="it-IT" sz="2800">
+                <a:ea typeface="Linux Biolinum G" panose="02000503000000000000" pitchFamily="2" charset="0"/>
+                <a:cs typeface="Linux Biolinum G" panose="02000503000000000000" pitchFamily="2" charset="0"/>
+              </a:rPr>
+              <a:t>Polynomial</a:t>
+            </a:r>
+            <a:r>
+              <a:rPr lang="it-IT" sz="2800" dirty="0">
+                <a:ea typeface="Linux Biolinum G" panose="02000503000000000000" pitchFamily="2" charset="0"/>
+                <a:cs typeface="Linux Biolinum G" panose="02000503000000000000" pitchFamily="2" charset="0"/>
+              </a:rPr>
+              <a:t>: </a:t>
+            </a:r>
+            <a:r>
+              <a:rPr lang="it-IT" sz="2800" b="1" dirty="0">
+                <a:ea typeface="DejaVu Math TeX Gyre" panose="02000503000000000000" pitchFamily="2" charset="0"/>
+                <a:cs typeface="DejaVu Math TeX Gyre" panose="02000503000000000000" pitchFamily="2" charset="0"/>
+              </a:rPr>
+              <a:t>∆</a:t>
+            </a:r>
+            <a:r>
+              <a:rPr lang="it-IT" sz="2800" b="1" dirty="0"/>
+              <a:t>T</a:t>
+            </a:r>
+            <a:endParaRPr lang="it-IT" sz="2800" dirty="0">
+              <a:ea typeface="Linux Biolinum G" panose="02000503000000000000" pitchFamily="2" charset="0"/>
+              <a:cs typeface="Linux Biolinum G" panose="02000503000000000000" pitchFamily="2" charset="0"/>
+            </a:endParaRPr>
+          </a:p>
+        </p:txBody>
+      </p:sp>
+      <p:pic>
+        <p:nvPicPr>
+          <p:cNvPr id="8" name="Immagine 7">
+            <a:extLst>
+              <a:ext uri="{FF2B5EF4-FFF2-40B4-BE49-F238E27FC236}">
+                <a16:creationId xmlns:a16="http://schemas.microsoft.com/office/drawing/2014/main" id="{3F31B3D3-4DA6-488F-9A5A-90D9754ADBA7}"/>
+              </a:ext>
+            </a:extLst>
+          </p:cNvPr>
+          <p:cNvPicPr>
+            <a:picLocks noChangeAspect="1"/>
+          </p:cNvPicPr>
+          <p:nvPr/>
+        </p:nvPicPr>
+        <p:blipFill>
+          <a:blip r:embed="rId2">
+            <a:extLst>
+              <a:ext uri="{28A0092B-C50C-407E-A947-70E740481C1C}">
+                <a14:useLocalDpi xmlns:a14="http://schemas.microsoft.com/office/drawing/2010/main" val="0"/>
+              </a:ext>
+            </a:extLst>
+          </a:blip>
+          <a:stretch>
+            <a:fillRect/>
+          </a:stretch>
+        </p:blipFill>
+        <p:spPr>
+          <a:xfrm>
+            <a:off x="634275" y="841356"/>
+            <a:ext cx="6900380" cy="5175287"/>
+          </a:xfrm>
+          <a:prstGeom prst="rect">
+            <a:avLst/>
+          </a:prstGeom>
+        </p:spPr>
+      </p:pic>
+      <p:sp>
+        <p:nvSpPr>
+          <p:cNvPr id="3" name="Segnaposto contenuto 2">
+            <a:extLst>
+              <a:ext uri="{FF2B5EF4-FFF2-40B4-BE49-F238E27FC236}">
+                <a16:creationId xmlns:a16="http://schemas.microsoft.com/office/drawing/2014/main" id="{E15FC3D4-7E07-472C-AC13-B45DEAD73EE5}"/>
+              </a:ext>
+            </a:extLst>
+          </p:cNvPr>
+          <p:cNvSpPr>
+            <a:spLocks noGrp="1"/>
+          </p:cNvSpPr>
+          <p:nvPr>
+            <p:ph idx="1"/>
+          </p:nvPr>
+        </p:nvSpPr>
+        <p:spPr>
+          <a:xfrm>
+            <a:off x="8471423" y="2286000"/>
+            <a:ext cx="3053039" cy="3931920"/>
+          </a:xfrm>
+        </p:spPr>
+        <p:txBody>
+          <a:bodyPr>
+            <a:normAutofit/>
+          </a:bodyPr>
+          <a:lstStyle/>
+          <a:p>
+            <a:pPr marL="0" indent="0">
+              <a:buNone/>
+            </a:pPr>
+            <a:endParaRPr lang="it-IT" sz="1600"/>
+          </a:p>
+          <a:p>
+            <a:r>
+              <a:rPr lang="it-IT" sz="1600"/>
+              <a:t>Trajectories with continuos velocity and acceleration but discontinuos jerk</a:t>
+            </a:r>
+          </a:p>
+          <a:p>
+            <a:pPr marL="0" indent="0">
+              <a:buNone/>
+            </a:pPr>
+            <a:endParaRPr lang="it-IT" sz="1600" u="sng"/>
+          </a:p>
+          <a:p>
+            <a:r>
+              <a:rPr lang="it-IT" sz="1600" b="1">
+                <a:ea typeface="DejaVu Math TeX Gyre" panose="02000503000000000000" pitchFamily="2" charset="0"/>
+                <a:cs typeface="DejaVu Math TeX Gyre" panose="02000503000000000000" pitchFamily="2" charset="0"/>
+              </a:rPr>
+              <a:t>∆</a:t>
+            </a:r>
+            <a:r>
+              <a:rPr lang="it-IT" sz="1600" b="1"/>
+              <a:t>T Formulation</a:t>
+            </a:r>
+          </a:p>
+          <a:p>
+            <a:r>
+              <a:rPr lang="it-IT" sz="1600"/>
+              <a:t>Inital and final conditions:</a:t>
+            </a:r>
+          </a:p>
+          <a:p>
+            <a:pPr lvl="1"/>
+            <a:r>
+              <a:rPr lang="it-IT" sz="1600" b="0" i="0" u="none" strike="noStrike" baseline="0"/>
+              <a:t>qi=4;   	qf=10;</a:t>
+            </a:r>
+          </a:p>
+          <a:p>
+            <a:pPr lvl="1"/>
+            <a:r>
+              <a:rPr lang="it-IT" sz="1600" b="0" i="0" u="none" strike="noStrike" baseline="0"/>
+              <a:t>dqi=0;   	dqf=5;</a:t>
+            </a:r>
+          </a:p>
+          <a:p>
+            <a:pPr lvl="1"/>
+            <a:r>
+              <a:rPr lang="it-IT" sz="1600" b="0" i="0" u="none" strike="noStrike" baseline="0"/>
+              <a:t>ddqi=0;	 ddqf=0;</a:t>
+            </a:r>
+          </a:p>
+          <a:p>
+            <a:pPr lvl="1"/>
+            <a:r>
+              <a:rPr lang="it-IT" sz="1600" b="0" i="0" u="none" strike="noStrike" baseline="0"/>
+              <a:t>ti=</a:t>
+            </a:r>
+            <a:r>
+              <a:rPr lang="it-IT" sz="1600" i="0"/>
+              <a:t>5;</a:t>
+            </a:r>
+            <a:r>
+              <a:rPr lang="it-IT" sz="1600" b="0" i="0" u="none" strike="noStrike" baseline="0"/>
+              <a:t> 	tf=10</a:t>
+            </a:r>
+          </a:p>
+          <a:p>
+            <a:pPr marL="530352" lvl="1" indent="0">
+              <a:buNone/>
+            </a:pPr>
+            <a:endParaRPr lang="it-IT" sz="1600" b="0" i="0" u="none" strike="noStrike" baseline="0"/>
+          </a:p>
+        </p:txBody>
+      </p:sp>
+      <p:sp>
+        <p:nvSpPr>
+          <p:cNvPr id="110" name="Freeform 6">
+            <a:extLst>
+              <a:ext uri="{FF2B5EF4-FFF2-40B4-BE49-F238E27FC236}">
+                <a16:creationId xmlns:a16="http://schemas.microsoft.com/office/drawing/2014/main" id="{CC1026F7-DECB-49B4-A565-518BBA445471}"/>
+              </a:ext>
+              <a:ext uri="{C183D7F6-B498-43B3-948B-1728B52AA6E4}">
+                <adec:decorative xmlns:adec="http://schemas.microsoft.com/office/drawing/2017/decorative" val="1"/>
+              </a:ext>
+            </a:extLst>
+          </p:cNvPr>
+          <p:cNvSpPr>
+            <a:spLocks noGrp="1" noRot="1" noChangeAspect="1" noMove="1" noResize="1" noEditPoints="1" noAdjustHandles="1" noChangeArrowheads="1" noChangeShapeType="1" noTextEdit="1"/>
+          </p:cNvSpPr>
+          <p:nvPr>
+            <p:extLst>
+              <p:ext uri="{386F3935-93C4-4BCD-93E2-E3B085C9AB24}">
+                <p16:designElem xmlns:p16="http://schemas.microsoft.com/office/powerpoint/2015/main" val="1"/>
+              </p:ext>
+            </p:extLst>
+          </p:nvPr>
+        </p:nvSpPr>
+        <p:spPr bwMode="auto">
+          <a:xfrm flipH="1" flipV="1">
+            <a:off x="7983434" y="640080"/>
+            <a:ext cx="2296028" cy="3674981"/>
+          </a:xfrm>
+          <a:custGeom>
+            <a:avLst/>
+            <a:gdLst/>
+            <a:ahLst/>
+            <a:cxnLst/>
+            <a:rect l="l" t="t" r="r" b="b"/>
+            <a:pathLst>
+              <a:path w="10002" h="10000">
+                <a:moveTo>
+                  <a:pt x="8763" y="0"/>
+                </a:moveTo>
+                <a:lnTo>
+                  <a:pt x="10002" y="0"/>
+                </a:lnTo>
+                <a:lnTo>
+                  <a:pt x="10002" y="10000"/>
+                </a:lnTo>
+                <a:lnTo>
+                  <a:pt x="2" y="10000"/>
+                </a:lnTo>
+                <a:cubicBezTo>
+                  <a:pt x="-2" y="9698"/>
+                  <a:pt x="4" y="9427"/>
+                  <a:pt x="0" y="9125"/>
+                </a:cubicBezTo>
+                <a:lnTo>
+                  <a:pt x="8763" y="9128"/>
+                </a:lnTo>
+                <a:lnTo>
+                  <a:pt x="8763" y="0"/>
+                </a:lnTo>
+                <a:close/>
+              </a:path>
+            </a:pathLst>
+          </a:custGeom>
+          <a:solidFill>
+            <a:schemeClr val="tx2"/>
+          </a:solidFill>
+          <a:ln w="0">
+            <a:noFill/>
+            <a:prstDash val="solid"/>
+            <a:round/>
+            <a:headEnd/>
+            <a:tailEnd/>
+          </a:ln>
+        </p:spPr>
+      </p:sp>
+      <p:sp>
+        <p:nvSpPr>
           <p:cNvPr id="4" name="Segnaposto numero diapositiva 3">
             <a:extLst>
               <a:ext uri="{FF2B5EF4-FFF2-40B4-BE49-F238E27FC236}">
@@ -24633,47 +24633,12 @@
           <a:chExt cx="0" cy="0"/>
         </a:xfrm>
       </p:grpSpPr>
-      <p:sp>
-        <p:nvSpPr>
-          <p:cNvPr id="2" name="Titolo 1">
+      <p:sp useBgFill="1">
+        <p:nvSpPr>
+          <p:cNvPr id="98" name="Rectangle 97">
             <a:extLst>
               <a:ext uri="{FF2B5EF4-FFF2-40B4-BE49-F238E27FC236}">
-                <a16:creationId xmlns:a16="http://schemas.microsoft.com/office/drawing/2014/main" id="{233C87B1-734D-48CF-991A-EDF93F1C8061}"/>
-              </a:ext>
-            </a:extLst>
-          </p:cNvPr>
-          <p:cNvSpPr>
-            <a:spLocks noGrp="1"/>
-          </p:cNvSpPr>
-          <p:nvPr>
-            <p:ph type="title"/>
-          </p:nvPr>
-        </p:nvSpPr>
-        <p:spPr>
-          <a:xfrm>
-            <a:off x="6389914" y="685800"/>
-            <a:ext cx="5127172" cy="1485900"/>
-          </a:xfrm>
-        </p:spPr>
-        <p:txBody>
-          <a:bodyPr>
-            <a:normAutofit/>
-          </a:bodyPr>
-          <a:lstStyle/>
-          <a:p>
-            <a:r>
-              <a:rPr lang="it-IT" dirty="0"/>
-              <a:t>3: 3D Analysis</a:t>
-            </a:r>
-          </a:p>
-        </p:txBody>
-      </p:sp>
-      <p:sp>
-        <p:nvSpPr>
-          <p:cNvPr id="15" name="Rectangle 10">
-            <a:extLst>
-              <a:ext uri="{FF2B5EF4-FFF2-40B4-BE49-F238E27FC236}">
-                <a16:creationId xmlns:a16="http://schemas.microsoft.com/office/drawing/2014/main" id="{A67E2D8A-19BE-48A0-889C-CCAC02348C99}"/>
+                <a16:creationId xmlns:a16="http://schemas.microsoft.com/office/drawing/2014/main" id="{1D868099-6145-4BC0-A5EA-74BEF1776BA9}"/>
               </a:ext>
               <a:ext uri="{C183D7F6-B498-43B3-948B-1728B52AA6E4}">
                 <adec:decorative xmlns:adec="http://schemas.microsoft.com/office/drawing/2017/decorative" val="1"/>
@@ -24693,15 +24658,12 @@
         </p:nvSpPr>
         <p:spPr>
           <a:xfrm>
-            <a:off x="478095" y="376"/>
-            <a:ext cx="228600" cy="6858000"/>
+            <a:off x="0" y="0"/>
+            <a:ext cx="12192000" cy="6858000"/>
           </a:xfrm>
           <a:prstGeom prst="rect">
             <a:avLst/>
           </a:prstGeom>
-          <a:solidFill>
-            <a:schemeClr val="tx2"/>
-          </a:solidFill>
           <a:ln>
             <a:noFill/>
           </a:ln>
@@ -24722,13 +24684,59 @@
             <a:schemeClr val="lt1"/>
           </a:fontRef>
         </p:style>
+        <p:txBody>
+          <a:bodyPr rtlCol="0" anchor="ctr"/>
+          <a:lstStyle/>
+          <a:p>
+            <a:pPr algn="ctr"/>
+            <a:endParaRPr lang="en-US"/>
+          </a:p>
+        </p:txBody>
+      </p:sp>
+      <p:sp>
+        <p:nvSpPr>
+          <p:cNvPr id="2" name="Titolo 1">
+            <a:extLst>
+              <a:ext uri="{FF2B5EF4-FFF2-40B4-BE49-F238E27FC236}">
+                <a16:creationId xmlns:a16="http://schemas.microsoft.com/office/drawing/2014/main" id="{FE62F838-6ED5-4511-AB1D-737675EB365E}"/>
+              </a:ext>
+            </a:extLst>
+          </p:cNvPr>
+          <p:cNvSpPr>
+            <a:spLocks noGrp="1"/>
+          </p:cNvSpPr>
+          <p:nvPr>
+            <p:ph type="title"/>
+          </p:nvPr>
+        </p:nvSpPr>
+        <p:spPr>
+          <a:xfrm>
+            <a:off x="8471424" y="1110882"/>
+            <a:ext cx="3053039" cy="1060817"/>
+          </a:xfrm>
+        </p:spPr>
+        <p:txBody>
+          <a:bodyPr anchor="b">
+            <a:normAutofit/>
+          </a:bodyPr>
+          <a:lstStyle/>
+          <a:p>
+            <a:r>
+              <a:rPr lang="it-IT" sz="2800" dirty="0">
+                <a:ea typeface="Linux Biolinum G" panose="02000503000000000000" pitchFamily="2" charset="0"/>
+                <a:cs typeface="Linux Biolinum G" panose="02000503000000000000" pitchFamily="2" charset="0"/>
+              </a:rPr>
+              <a:t>Image Analysis: HW 3</a:t>
+            </a:r>
+          </a:p>
+        </p:txBody>
       </p:sp>
       <p:pic>
         <p:nvPicPr>
-          <p:cNvPr id="6" name="Immagine 5" descr="Immagine che contiene testo, mappa, ombrello, accessorio&#10;&#10;Descrizione generata automaticamente">
+          <p:cNvPr id="5" name="Immagine 4">
             <a:extLst>
               <a:ext uri="{FF2B5EF4-FFF2-40B4-BE49-F238E27FC236}">
-                <a16:creationId xmlns:a16="http://schemas.microsoft.com/office/drawing/2014/main" id="{F7E10729-3749-40C2-8DDC-3DDA369FBB11}"/>
+                <a16:creationId xmlns:a16="http://schemas.microsoft.com/office/drawing/2014/main" id="{A684A9BF-B39E-42D9-9FB3-83B1206A7039}"/>
               </a:ext>
             </a:extLst>
           </p:cNvPr>
@@ -24751,8 +24759,8 @@
         </p:blipFill>
         <p:spPr>
           <a:xfrm>
-            <a:off x="1012676" y="1671454"/>
-            <a:ext cx="5071256" cy="4348601"/>
+            <a:off x="634275" y="841356"/>
+            <a:ext cx="6900380" cy="5175287"/>
           </a:xfrm>
           <a:prstGeom prst="rect">
             <a:avLst/>
@@ -24764,7 +24772,7 @@
           <p:cNvPr id="3" name="Segnaposto contenuto 2">
             <a:extLst>
               <a:ext uri="{FF2B5EF4-FFF2-40B4-BE49-F238E27FC236}">
-                <a16:creationId xmlns:a16="http://schemas.microsoft.com/office/drawing/2014/main" id="{F0720EDD-94B2-432D-8E17-B53711CDC5B2}"/>
+                <a16:creationId xmlns:a16="http://schemas.microsoft.com/office/drawing/2014/main" id="{E15FC3D4-7E07-472C-AC13-B45DEAD73EE5}"/>
               </a:ext>
             </a:extLst>
           </p:cNvPr>
@@ -24777,8 +24785,8 @@
         </p:nvSpPr>
         <p:spPr>
           <a:xfrm>
-            <a:off x="6389913" y="1881386"/>
-            <a:ext cx="5127172" cy="4572000"/>
+            <a:off x="8471423" y="2286000"/>
+            <a:ext cx="3053039" cy="3931920"/>
           </a:xfrm>
         </p:spPr>
         <p:txBody>
@@ -24787,196 +24795,206 @@
           </a:bodyPr>
           <a:lstStyle/>
           <a:p>
-            <a:r>
-              <a:rPr lang="it-IT" sz="1900" dirty="0" err="1"/>
-              <a:t>Implement</a:t>
-            </a:r>
-            <a:r>
-              <a:rPr lang="it-IT" sz="1900" dirty="0"/>
-              <a:t> the following </a:t>
-            </a:r>
-            <a:r>
-              <a:rPr lang="it-IT" sz="1900" dirty="0" err="1"/>
-              <a:t>methods</a:t>
-            </a:r>
-            <a:r>
-              <a:rPr lang="it-IT" sz="1900" dirty="0"/>
+            <a:endParaRPr lang="it-IT" sz="1600" dirty="0"/>
+          </a:p>
+          <a:p>
+            <a:endParaRPr lang="it-IT" sz="1600" dirty="0"/>
+          </a:p>
+          <a:p>
+            <a:r>
+              <a:rPr lang="it-IT" sz="1600" b="0" i="0" u="none" strike="noStrike" baseline="0" dirty="0"/>
+              <a:t>Use </a:t>
+            </a:r>
+            <a:r>
+              <a:rPr lang="it-IT" sz="1600" b="0" i="0" u="none" strike="noStrike" baseline="0" dirty="0" err="1"/>
+              <a:t>morphological</a:t>
+            </a:r>
+            <a:r>
+              <a:rPr lang="it-IT" sz="1600" b="0" i="0" u="none" strike="noStrike" baseline="0" dirty="0"/>
+              <a:t> </a:t>
+            </a:r>
+            <a:r>
+              <a:rPr lang="it-IT" sz="1600" dirty="0" err="1"/>
+              <a:t>operators</a:t>
+            </a:r>
+            <a:r>
+              <a:rPr lang="it-IT" sz="1600" dirty="0"/>
+              <a:t> and </a:t>
+            </a:r>
+            <a:r>
+              <a:rPr lang="it-IT" sz="1600" dirty="0" err="1"/>
+              <a:t>region</a:t>
+            </a:r>
+            <a:r>
+              <a:rPr lang="it-IT" sz="1600" dirty="0"/>
+              <a:t> </a:t>
+            </a:r>
+            <a:r>
+              <a:rPr lang="it-IT" sz="1600" dirty="0" err="1"/>
+              <a:t>properties</a:t>
+            </a:r>
+            <a:r>
+              <a:rPr lang="it-IT" sz="1600" dirty="0"/>
               <a:t> to </a:t>
             </a:r>
             <a:r>
-              <a:rPr lang="it-IT" sz="1900" dirty="0" err="1"/>
-              <a:t>achieve</a:t>
-            </a:r>
-            <a:r>
-              <a:rPr lang="it-IT" sz="1900" dirty="0"/>
-              <a:t> the </a:t>
-            </a:r>
-            <a:r>
-              <a:rPr lang="it-IT" sz="1900" dirty="0" err="1"/>
-              <a:t>result</a:t>
-            </a:r>
-            <a:r>
-              <a:rPr lang="it-IT" sz="1900" dirty="0"/>
+              <a:rPr lang="it-IT" sz="1600" dirty="0" err="1"/>
+              <a:t>infer</a:t>
+            </a:r>
+            <a:r>
+              <a:rPr lang="it-IT" sz="1600" dirty="0"/>
+              <a:t> information </a:t>
+            </a:r>
+            <a:r>
+              <a:rPr lang="it-IT" sz="1600" dirty="0" err="1"/>
+              <a:t>about</a:t>
+            </a:r>
+            <a:r>
+              <a:rPr lang="it-IT" sz="1600" dirty="0"/>
               <a:t> </a:t>
             </a:r>
             <a:r>
-              <a:rPr lang="it-IT" sz="1900" dirty="0" err="1"/>
-              <a:t>seen</a:t>
-            </a:r>
-            <a:r>
-              <a:rPr lang="it-IT" sz="1900" dirty="0"/>
-              <a:t> in the </a:t>
-            </a:r>
-            <a:r>
-              <a:rPr lang="it-IT" sz="1900" dirty="0" err="1"/>
-              <a:t>lecture</a:t>
-            </a:r>
-            <a:endParaRPr lang="it-IT" sz="1900" dirty="0"/>
-          </a:p>
-          <a:p>
-            <a:pPr marL="0" indent="0">
-              <a:buNone/>
-            </a:pPr>
-            <a:endParaRPr lang="it-IT" sz="1900" dirty="0"/>
+              <a:rPr lang="it-IT" sz="1600" dirty="0" err="1"/>
+              <a:t>shape</a:t>
+            </a:r>
+            <a:r>
+              <a:rPr lang="it-IT" sz="1600" dirty="0"/>
+              <a:t> and size of </a:t>
+            </a:r>
+            <a:r>
+              <a:rPr lang="it-IT" sz="1600" dirty="0" err="1"/>
+              <a:t>objects</a:t>
+            </a:r>
+            <a:r>
+              <a:rPr lang="it-IT" sz="1600" dirty="0"/>
+              <a:t> in an image of </a:t>
+            </a:r>
+            <a:r>
+              <a:rPr lang="it-IT" sz="1600" dirty="0" err="1"/>
+              <a:t>our</a:t>
+            </a:r>
+            <a:r>
+              <a:rPr lang="it-IT" sz="1600" dirty="0"/>
+              <a:t> </a:t>
+            </a:r>
+            <a:r>
+              <a:rPr lang="it-IT" sz="1600" dirty="0" err="1"/>
+              <a:t>choice</a:t>
+            </a:r>
+            <a:endParaRPr lang="it-IT" sz="1600" b="0" i="0" u="none" strike="noStrike" baseline="0" dirty="0"/>
           </a:p>
           <a:p>
             <a:pPr lvl="1"/>
-            <a:r>
-              <a:rPr lang="it-IT" sz="1900" dirty="0" err="1"/>
-              <a:t>Plane</a:t>
-            </a:r>
-            <a:r>
-              <a:rPr lang="it-IT" sz="1900" dirty="0"/>
-              <a:t> Fitting</a:t>
-            </a:r>
+            <a:endParaRPr lang="it-IT" sz="1600" b="0" i="0" u="none" strike="noStrike" baseline="0" dirty="0"/>
           </a:p>
           <a:p>
             <a:pPr lvl="1"/>
-            <a:r>
-              <a:rPr lang="it-IT" sz="1900" dirty="0"/>
-              <a:t>Point to </a:t>
-            </a:r>
-            <a:r>
-              <a:rPr lang="it-IT" sz="1900" dirty="0" err="1"/>
-              <a:t>plane</a:t>
-            </a:r>
-            <a:r>
-              <a:rPr lang="it-IT" sz="1900" dirty="0"/>
-              <a:t> </a:t>
-            </a:r>
-            <a:r>
-              <a:rPr lang="it-IT" sz="1900" dirty="0" err="1"/>
-              <a:t>distance</a:t>
-            </a:r>
-            <a:r>
-              <a:rPr lang="it-IT" sz="1900" dirty="0"/>
-              <a:t> </a:t>
-            </a:r>
-            <a:r>
-              <a:rPr lang="it-IT" sz="1900" dirty="0" err="1"/>
-              <a:t>computation</a:t>
-            </a:r>
-            <a:endParaRPr lang="it-IT" sz="1900" dirty="0"/>
+            <a:endParaRPr lang="it-IT" sz="1600" b="0" i="0" u="none" strike="noStrike" baseline="0" dirty="0">
+              <a:latin typeface="Courier New" panose="02070309020205020404" pitchFamily="49" charset="0"/>
+            </a:endParaRPr>
           </a:p>
           <a:p>
             <a:pPr lvl="1"/>
-            <a:r>
-              <a:rPr lang="it-IT" sz="1900" dirty="0"/>
-              <a:t>Point to </a:t>
-            </a:r>
-            <a:r>
-              <a:rPr lang="it-IT" sz="1900" dirty="0" err="1"/>
-              <a:t>plane</a:t>
-            </a:r>
-            <a:r>
-              <a:rPr lang="it-IT" sz="1900" dirty="0"/>
-              <a:t> </a:t>
-            </a:r>
-            <a:r>
-              <a:rPr lang="it-IT" sz="1900" dirty="0" err="1"/>
-              <a:t>projection</a:t>
-            </a:r>
-            <a:endParaRPr lang="it-IT" sz="1900" dirty="0"/>
+            <a:endParaRPr lang="it-IT" sz="1600" b="0" i="0" u="none" strike="noStrike" baseline="0" dirty="0">
+              <a:latin typeface="Courier New" panose="02070309020205020404" pitchFamily="49" charset="0"/>
+            </a:endParaRPr>
           </a:p>
           <a:p>
             <a:pPr lvl="1"/>
-            <a:r>
-              <a:rPr lang="it-IT" sz="1900" dirty="0"/>
-              <a:t>Line fitting</a:t>
-            </a:r>
+            <a:endParaRPr lang="pl-PL" sz="1600" b="0" i="0" u="none" strike="noStrike" baseline="0" dirty="0">
+              <a:latin typeface="Courier New" panose="02070309020205020404" pitchFamily="49" charset="0"/>
+            </a:endParaRPr>
+          </a:p>
+          <a:p>
+            <a:endParaRPr lang="it-IT" sz="1600" b="0" i="0" u="none" strike="noStrike" baseline="0" dirty="0"/>
           </a:p>
           <a:p>
             <a:pPr lvl="1"/>
-            <a:r>
-              <a:rPr lang="it-IT" sz="1900" dirty="0"/>
-              <a:t>Point to line </a:t>
-            </a:r>
-            <a:r>
-              <a:rPr lang="it-IT" sz="1900" dirty="0" err="1"/>
-              <a:t>projection</a:t>
-            </a:r>
-            <a:endParaRPr lang="it-IT" sz="1900" dirty="0"/>
-          </a:p>
-          <a:p>
-            <a:pPr lvl="1"/>
-            <a:r>
-              <a:rPr lang="it-IT" sz="1900" dirty="0"/>
-              <a:t>Angle </a:t>
-            </a:r>
-            <a:r>
-              <a:rPr lang="it-IT" sz="1900" dirty="0" err="1"/>
-              <a:t>between</a:t>
-            </a:r>
-            <a:r>
-              <a:rPr lang="it-IT" sz="1900" dirty="0"/>
-              <a:t> </a:t>
-            </a:r>
-            <a:r>
-              <a:rPr lang="it-IT" sz="1900" dirty="0" err="1"/>
-              <a:t>two</a:t>
-            </a:r>
-            <a:r>
-              <a:rPr lang="it-IT" sz="1900" dirty="0"/>
-              <a:t> lines</a:t>
-            </a:r>
-          </a:p>
-          <a:p>
-            <a:pPr lvl="1"/>
-            <a:r>
-              <a:rPr lang="it-IT" sz="1900" dirty="0"/>
-              <a:t>Two lines </a:t>
-            </a:r>
-            <a:r>
-              <a:rPr lang="it-IT" sz="1900" dirty="0" err="1"/>
-              <a:t>intersection</a:t>
-            </a:r>
-            <a:endParaRPr lang="it-IT" sz="1900" dirty="0"/>
-          </a:p>
-          <a:p>
-            <a:pPr lvl="1"/>
-            <a:r>
-              <a:rPr lang="it-IT" sz="1900" dirty="0" err="1"/>
-              <a:t>Robust</a:t>
-            </a:r>
-            <a:r>
-              <a:rPr lang="it-IT" sz="1900" dirty="0"/>
-              <a:t> line fitting</a:t>
-            </a:r>
-          </a:p>
-          <a:p>
-            <a:endParaRPr lang="it-IT" sz="1900" dirty="0"/>
-          </a:p>
-          <a:p>
-            <a:endParaRPr lang="it-IT" sz="1900" dirty="0"/>
+            <a:endParaRPr lang="it-IT" sz="1600" b="0" i="0" u="none" strike="noStrike" baseline="0" dirty="0"/>
           </a:p>
         </p:txBody>
       </p:sp>
       <p:sp>
         <p:nvSpPr>
-          <p:cNvPr id="4" name="Segnaposto numero diapositiva 3">
+          <p:cNvPr id="100" name="Freeform 6">
             <a:extLst>
               <a:ext uri="{FF2B5EF4-FFF2-40B4-BE49-F238E27FC236}">
-                <a16:creationId xmlns:a16="http://schemas.microsoft.com/office/drawing/2014/main" id="{12E66E89-1F17-4BE1-950A-D0A6AAD464A6}"/>
+                <a16:creationId xmlns:a16="http://schemas.microsoft.com/office/drawing/2014/main" id="{CC1026F7-DECB-49B4-A565-518BBA445471}"/>
+              </a:ext>
+              <a:ext uri="{C183D7F6-B498-43B3-948B-1728B52AA6E4}">
+                <adec:decorative xmlns:adec="http://schemas.microsoft.com/office/drawing/2017/decorative" val="1"/>
+              </a:ext>
+            </a:extLst>
+          </p:cNvPr>
+          <p:cNvSpPr>
+            <a:spLocks noGrp="1" noRot="1" noChangeAspect="1" noMove="1" noResize="1" noEditPoints="1" noAdjustHandles="1" noChangeArrowheads="1" noChangeShapeType="1" noTextEdit="1"/>
+          </p:cNvSpPr>
+          <p:nvPr>
+            <p:extLst>
+              <p:ext uri="{386F3935-93C4-4BCD-93E2-E3B085C9AB24}">
+                <p16:designElem xmlns:p16="http://schemas.microsoft.com/office/powerpoint/2015/main" val="1"/>
+              </p:ext>
+            </p:extLst>
+          </p:nvPr>
+        </p:nvSpPr>
+        <p:spPr bwMode="auto">
+          <a:xfrm flipH="1" flipV="1">
+            <a:off x="7983434" y="640080"/>
+            <a:ext cx="2296028" cy="3674981"/>
+          </a:xfrm>
+          <a:custGeom>
+            <a:avLst/>
+            <a:gdLst/>
+            <a:ahLst/>
+            <a:cxnLst/>
+            <a:rect l="l" t="t" r="r" b="b"/>
+            <a:pathLst>
+              <a:path w="10002" h="10000">
+                <a:moveTo>
+                  <a:pt x="8763" y="0"/>
+                </a:moveTo>
+                <a:lnTo>
+                  <a:pt x="10002" y="0"/>
+                </a:lnTo>
+                <a:lnTo>
+                  <a:pt x="10002" y="10000"/>
+                </a:lnTo>
+                <a:lnTo>
+                  <a:pt x="2" y="10000"/>
+                </a:lnTo>
+                <a:cubicBezTo>
+                  <a:pt x="-2" y="9698"/>
+                  <a:pt x="4" y="9427"/>
+                  <a:pt x="0" y="9125"/>
+                </a:cubicBezTo>
+                <a:lnTo>
+                  <a:pt x="8763" y="9128"/>
+                </a:lnTo>
+                <a:lnTo>
+                  <a:pt x="8763" y="0"/>
+                </a:lnTo>
+                <a:close/>
+              </a:path>
+            </a:pathLst>
+          </a:custGeom>
+          <a:solidFill>
+            <a:schemeClr val="tx2"/>
+          </a:solidFill>
+          <a:ln w="0">
+            <a:noFill/>
+            <a:prstDash val="solid"/>
+            <a:round/>
+            <a:headEnd/>
+            <a:tailEnd/>
+          </a:ln>
+        </p:spPr>
+      </p:sp>
+      <p:sp>
+        <p:nvSpPr>
+          <p:cNvPr id="6" name="Segnaposto numero diapositiva 5">
+            <a:extLst>
+              <a:ext uri="{FF2B5EF4-FFF2-40B4-BE49-F238E27FC236}">
+                <a16:creationId xmlns:a16="http://schemas.microsoft.com/office/drawing/2014/main" id="{A3D7F0D3-8C5D-4133-B138-703C2DD89CF3}"/>
               </a:ext>
             </a:extLst>
           </p:cNvPr>
@@ -25013,14 +25031,14 @@
               </a:pPr>
               <a:t>50</a:t>
             </a:fld>
-            <a:endParaRPr lang="it-IT"/>
+            <a:endParaRPr lang="it-IT" dirty="0"/>
           </a:p>
         </p:txBody>
       </p:sp>
     </p:spTree>
     <p:extLst>
       <p:ext uri="{BB962C8B-B14F-4D97-AF65-F5344CB8AC3E}">
-        <p14:creationId xmlns:p14="http://schemas.microsoft.com/office/powerpoint/2010/main" val="3836273972"/>
+        <p14:creationId xmlns:p14="http://schemas.microsoft.com/office/powerpoint/2010/main" val="125450256"/>
       </p:ext>
     </p:extLst>
   </p:cSld>
@@ -25057,10 +25075,45 @@
       </p:grpSpPr>
       <p:sp>
         <p:nvSpPr>
-          <p:cNvPr id="11" name="Rectangle 10">
+          <p:cNvPr id="2" name="Titolo 1">
             <a:extLst>
               <a:ext uri="{FF2B5EF4-FFF2-40B4-BE49-F238E27FC236}">
-                <a16:creationId xmlns:a16="http://schemas.microsoft.com/office/drawing/2014/main" id="{AA6EC888-B85F-410F-B430-06583E94BEEC}"/>
+                <a16:creationId xmlns:a16="http://schemas.microsoft.com/office/drawing/2014/main" id="{233C87B1-734D-48CF-991A-EDF93F1C8061}"/>
+              </a:ext>
+            </a:extLst>
+          </p:cNvPr>
+          <p:cNvSpPr>
+            <a:spLocks noGrp="1"/>
+          </p:cNvSpPr>
+          <p:nvPr>
+            <p:ph type="title"/>
+          </p:nvPr>
+        </p:nvSpPr>
+        <p:spPr>
+          <a:xfrm>
+            <a:off x="6389914" y="685800"/>
+            <a:ext cx="5127172" cy="1485900"/>
+          </a:xfrm>
+        </p:spPr>
+        <p:txBody>
+          <a:bodyPr>
+            <a:normAutofit/>
+          </a:bodyPr>
+          <a:lstStyle/>
+          <a:p>
+            <a:r>
+              <a:rPr lang="it-IT" dirty="0"/>
+              <a:t>3: 3D Analysis</a:t>
+            </a:r>
+          </a:p>
+        </p:txBody>
+      </p:sp>
+      <p:sp>
+        <p:nvSpPr>
+          <p:cNvPr id="15" name="Rectangle 10">
+            <a:extLst>
+              <a:ext uri="{FF2B5EF4-FFF2-40B4-BE49-F238E27FC236}">
+                <a16:creationId xmlns:a16="http://schemas.microsoft.com/office/drawing/2014/main" id="{A67E2D8A-19BE-48A0-889C-CCAC02348C99}"/>
               </a:ext>
               <a:ext uri="{C183D7F6-B498-43B3-948B-1728B52AA6E4}">
                 <adec:decorative xmlns:adec="http://schemas.microsoft.com/office/drawing/2017/decorative" val="1"/>
@@ -25110,390 +25163,12 @@
           </a:fontRef>
         </p:style>
       </p:sp>
-      <p:sp>
-        <p:nvSpPr>
-          <p:cNvPr id="13" name="Rectangle 12">
-            <a:extLst>
-              <a:ext uri="{FF2B5EF4-FFF2-40B4-BE49-F238E27FC236}">
-                <a16:creationId xmlns:a16="http://schemas.microsoft.com/office/drawing/2014/main" id="{9485DA84-CB73-4E5E-9864-2460CE28055D}"/>
-              </a:ext>
-              <a:ext uri="{C183D7F6-B498-43B3-948B-1728B52AA6E4}">
-                <adec:decorative xmlns:adec="http://schemas.microsoft.com/office/drawing/2017/decorative" val="1"/>
-              </a:ext>
-            </a:extLst>
-          </p:cNvPr>
-          <p:cNvSpPr>
-            <a:spLocks noGrp="1" noRot="1" noChangeAspect="1" noMove="1" noResize="1" noEditPoints="1" noAdjustHandles="1" noChangeArrowheads="1" noChangeShapeType="1" noTextEdit="1"/>
-          </p:cNvSpPr>
-          <p:nvPr>
-            <p:extLst>
-              <p:ext uri="{386F3935-93C4-4BCD-93E2-E3B085C9AB24}">
-                <p16:designElem xmlns:p16="http://schemas.microsoft.com/office/powerpoint/2015/main" val="1"/>
-              </p:ext>
-            </p:extLst>
-          </p:nvPr>
-        </p:nvSpPr>
-        <p:spPr>
-          <a:xfrm>
-            <a:off x="0" y="0"/>
-            <a:ext cx="12192000" cy="6858000"/>
-          </a:xfrm>
-          <a:prstGeom prst="rect">
-            <a:avLst/>
-          </a:prstGeom>
-          <a:solidFill>
-            <a:schemeClr val="bg2"/>
-          </a:solidFill>
-          <a:ln>
-            <a:noFill/>
-          </a:ln>
-        </p:spPr>
-        <p:style>
-          <a:lnRef idx="2">
-            <a:schemeClr val="accent1">
-              <a:shade val="50000"/>
-            </a:schemeClr>
-          </a:lnRef>
-          <a:fillRef idx="1">
-            <a:schemeClr val="accent1"/>
-          </a:fillRef>
-          <a:effectRef idx="0">
-            <a:schemeClr val="accent1"/>
-          </a:effectRef>
-          <a:fontRef idx="minor">
-            <a:schemeClr val="lt1"/>
-          </a:fontRef>
-        </p:style>
-        <p:txBody>
-          <a:bodyPr rtlCol="0" anchor="ctr"/>
-          <a:lstStyle/>
-          <a:p>
-            <a:pPr algn="ctr"/>
-            <a:endParaRPr lang="en-US"/>
-          </a:p>
-        </p:txBody>
-      </p:sp>
-      <p:sp>
-        <p:nvSpPr>
-          <p:cNvPr id="15" name="Rectangle 14">
-            <a:extLst>
-              <a:ext uri="{FF2B5EF4-FFF2-40B4-BE49-F238E27FC236}">
-                <a16:creationId xmlns:a16="http://schemas.microsoft.com/office/drawing/2014/main" id="{7D49185E-361A-421B-8F2D-11C7FFC686F0}"/>
-              </a:ext>
-              <a:ext uri="{C183D7F6-B498-43B3-948B-1728B52AA6E4}">
-                <adec:decorative xmlns:adec="http://schemas.microsoft.com/office/drawing/2017/decorative" val="1"/>
-              </a:ext>
-            </a:extLst>
-          </p:cNvPr>
-          <p:cNvSpPr>
-            <a:spLocks noGrp="1" noRot="1" noChangeAspect="1" noMove="1" noResize="1" noEditPoints="1" noAdjustHandles="1" noChangeArrowheads="1" noChangeShapeType="1" noTextEdit="1"/>
-          </p:cNvSpPr>
-          <p:nvPr>
-            <p:extLst>
-              <p:ext uri="{386F3935-93C4-4BCD-93E2-E3B085C9AB24}">
-                <p16:designElem xmlns:p16="http://schemas.microsoft.com/office/powerpoint/2015/main" val="1"/>
-              </p:ext>
-            </p:extLst>
-          </p:nvPr>
-        </p:nvSpPr>
-        <p:spPr>
-          <a:xfrm>
-            <a:off x="0" y="0"/>
-            <a:ext cx="365760" cy="365760"/>
-          </a:xfrm>
-          <a:prstGeom prst="rect">
-            <a:avLst/>
-          </a:prstGeom>
-          <a:solidFill>
-            <a:schemeClr val="tx1"/>
-          </a:solidFill>
-          <a:ln>
-            <a:noFill/>
-          </a:ln>
-        </p:spPr>
-        <p:style>
-          <a:lnRef idx="2">
-            <a:schemeClr val="accent1">
-              <a:shade val="50000"/>
-            </a:schemeClr>
-          </a:lnRef>
-          <a:fillRef idx="1">
-            <a:schemeClr val="accent1"/>
-          </a:fillRef>
-          <a:effectRef idx="0">
-            <a:schemeClr val="accent1"/>
-          </a:effectRef>
-          <a:fontRef idx="minor">
-            <a:schemeClr val="lt1"/>
-          </a:fontRef>
-        </p:style>
-        <p:txBody>
-          <a:bodyPr rtlCol="0" anchor="ctr"/>
-          <a:lstStyle/>
-          <a:p>
-            <a:pPr algn="ctr"/>
-            <a:endParaRPr lang="en-US"/>
-          </a:p>
-        </p:txBody>
-      </p:sp>
-      <p:sp>
-        <p:nvSpPr>
-          <p:cNvPr id="17" name="Rectangle 16">
-            <a:extLst>
-              <a:ext uri="{FF2B5EF4-FFF2-40B4-BE49-F238E27FC236}">
-                <a16:creationId xmlns:a16="http://schemas.microsoft.com/office/drawing/2014/main" id="{14B85BAA-C37F-44B4-B427-B4F10EBB4183}"/>
-              </a:ext>
-              <a:ext uri="{C183D7F6-B498-43B3-948B-1728B52AA6E4}">
-                <adec:decorative xmlns:adec="http://schemas.microsoft.com/office/drawing/2017/decorative" val="1"/>
-              </a:ext>
-            </a:extLst>
-          </p:cNvPr>
-          <p:cNvSpPr>
-            <a:spLocks noGrp="1" noRot="1" noChangeAspect="1" noMove="1" noResize="1" noEditPoints="1" noAdjustHandles="1" noChangeArrowheads="1" noChangeShapeType="1" noTextEdit="1"/>
-          </p:cNvSpPr>
-          <p:nvPr>
-            <p:extLst>
-              <p:ext uri="{386F3935-93C4-4BCD-93E2-E3B085C9AB24}">
-                <p16:designElem xmlns:p16="http://schemas.microsoft.com/office/powerpoint/2015/main" val="1"/>
-              </p:ext>
-            </p:extLst>
-          </p:nvPr>
-        </p:nvSpPr>
-        <p:spPr>
-          <a:xfrm>
-            <a:off x="11826240" y="-4668"/>
-            <a:ext cx="365760" cy="365760"/>
-          </a:xfrm>
-          <a:prstGeom prst="rect">
-            <a:avLst/>
-          </a:prstGeom>
-          <a:solidFill>
-            <a:schemeClr val="tx1"/>
-          </a:solidFill>
-          <a:ln>
-            <a:noFill/>
-          </a:ln>
-        </p:spPr>
-        <p:style>
-          <a:lnRef idx="2">
-            <a:schemeClr val="accent1">
-              <a:shade val="50000"/>
-            </a:schemeClr>
-          </a:lnRef>
-          <a:fillRef idx="1">
-            <a:schemeClr val="accent1"/>
-          </a:fillRef>
-          <a:effectRef idx="0">
-            <a:schemeClr val="accent1"/>
-          </a:effectRef>
-          <a:fontRef idx="minor">
-            <a:schemeClr val="lt1"/>
-          </a:fontRef>
-        </p:style>
-        <p:txBody>
-          <a:bodyPr rtlCol="0" anchor="ctr"/>
-          <a:lstStyle/>
-          <a:p>
-            <a:pPr algn="ctr"/>
-            <a:endParaRPr lang="en-US"/>
-          </a:p>
-        </p:txBody>
-      </p:sp>
-      <p:sp>
-        <p:nvSpPr>
-          <p:cNvPr id="19" name="Rectangle 18">
-            <a:extLst>
-              <a:ext uri="{FF2B5EF4-FFF2-40B4-BE49-F238E27FC236}">
-                <a16:creationId xmlns:a16="http://schemas.microsoft.com/office/drawing/2014/main" id="{EDC4EE06-D7B4-4FAC-A561-38A1C380232A}"/>
-              </a:ext>
-              <a:ext uri="{C183D7F6-B498-43B3-948B-1728B52AA6E4}">
-                <adec:decorative xmlns:adec="http://schemas.microsoft.com/office/drawing/2017/decorative" val="1"/>
-              </a:ext>
-            </a:extLst>
-          </p:cNvPr>
-          <p:cNvSpPr>
-            <a:spLocks noGrp="1" noRot="1" noChangeAspect="1" noMove="1" noResize="1" noEditPoints="1" noAdjustHandles="1" noChangeArrowheads="1" noChangeShapeType="1" noTextEdit="1"/>
-          </p:cNvSpPr>
-          <p:nvPr>
-            <p:extLst>
-              <p:ext uri="{386F3935-93C4-4BCD-93E2-E3B085C9AB24}">
-                <p16:designElem xmlns:p16="http://schemas.microsoft.com/office/powerpoint/2015/main" val="1"/>
-              </p:ext>
-            </p:extLst>
-          </p:nvPr>
-        </p:nvSpPr>
-        <p:spPr>
-          <a:xfrm>
-            <a:off x="0" y="6494325"/>
-            <a:ext cx="365760" cy="365760"/>
-          </a:xfrm>
-          <a:prstGeom prst="rect">
-            <a:avLst/>
-          </a:prstGeom>
-          <a:solidFill>
-            <a:schemeClr val="tx1"/>
-          </a:solidFill>
-          <a:ln>
-            <a:noFill/>
-          </a:ln>
-        </p:spPr>
-        <p:style>
-          <a:lnRef idx="2">
-            <a:schemeClr val="accent1">
-              <a:shade val="50000"/>
-            </a:schemeClr>
-          </a:lnRef>
-          <a:fillRef idx="1">
-            <a:schemeClr val="accent1"/>
-          </a:fillRef>
-          <a:effectRef idx="0">
-            <a:schemeClr val="accent1"/>
-          </a:effectRef>
-          <a:fontRef idx="minor">
-            <a:schemeClr val="lt1"/>
-          </a:fontRef>
-        </p:style>
-        <p:txBody>
-          <a:bodyPr rtlCol="0" anchor="ctr"/>
-          <a:lstStyle/>
-          <a:p>
-            <a:pPr algn="ctr"/>
-            <a:endParaRPr lang="en-US"/>
-          </a:p>
-        </p:txBody>
-      </p:sp>
-      <p:sp>
-        <p:nvSpPr>
-          <p:cNvPr id="21" name="Rectangle 20">
-            <a:extLst>
-              <a:ext uri="{FF2B5EF4-FFF2-40B4-BE49-F238E27FC236}">
-                <a16:creationId xmlns:a16="http://schemas.microsoft.com/office/drawing/2014/main" id="{9018D83B-903C-4782-B1BB-A45164A71F60}"/>
-              </a:ext>
-              <a:ext uri="{C183D7F6-B498-43B3-948B-1728B52AA6E4}">
-                <adec:decorative xmlns:adec="http://schemas.microsoft.com/office/drawing/2017/decorative" val="1"/>
-              </a:ext>
-            </a:extLst>
-          </p:cNvPr>
-          <p:cNvSpPr>
-            <a:spLocks noGrp="1" noRot="1" noChangeAspect="1" noMove="1" noResize="1" noEditPoints="1" noAdjustHandles="1" noChangeArrowheads="1" noChangeShapeType="1" noTextEdit="1"/>
-          </p:cNvSpPr>
-          <p:nvPr>
-            <p:extLst>
-              <p:ext uri="{386F3935-93C4-4BCD-93E2-E3B085C9AB24}">
-                <p16:designElem xmlns:p16="http://schemas.microsoft.com/office/powerpoint/2015/main" val="1"/>
-              </p:ext>
-            </p:extLst>
-          </p:nvPr>
-        </p:nvSpPr>
-        <p:spPr>
-          <a:xfrm>
-            <a:off x="11826240" y="6494325"/>
-            <a:ext cx="365760" cy="365760"/>
-          </a:xfrm>
-          <a:prstGeom prst="rect">
-            <a:avLst/>
-          </a:prstGeom>
-          <a:solidFill>
-            <a:schemeClr val="tx1"/>
-          </a:solidFill>
-          <a:ln>
-            <a:noFill/>
-          </a:ln>
-        </p:spPr>
-        <p:style>
-          <a:lnRef idx="2">
-            <a:schemeClr val="accent1">
-              <a:shade val="50000"/>
-            </a:schemeClr>
-          </a:lnRef>
-          <a:fillRef idx="1">
-            <a:schemeClr val="accent1"/>
-          </a:fillRef>
-          <a:effectRef idx="0">
-            <a:schemeClr val="accent1"/>
-          </a:effectRef>
-          <a:fontRef idx="minor">
-            <a:schemeClr val="lt1"/>
-          </a:fontRef>
-        </p:style>
-        <p:txBody>
-          <a:bodyPr rtlCol="0" anchor="ctr"/>
-          <a:lstStyle/>
-          <a:p>
-            <a:pPr algn="ctr"/>
-            <a:endParaRPr lang="en-US"/>
-          </a:p>
-        </p:txBody>
-      </p:sp>
-      <p:sp>
-        <p:nvSpPr>
-          <p:cNvPr id="23" name="Rectangle 22">
-            <a:extLst>
-              <a:ext uri="{FF2B5EF4-FFF2-40B4-BE49-F238E27FC236}">
-                <a16:creationId xmlns:a16="http://schemas.microsoft.com/office/drawing/2014/main" id="{8785589A-A5AC-409A-B2A2-24D871B4CEF0}"/>
-              </a:ext>
-              <a:ext uri="{C183D7F6-B498-43B3-948B-1728B52AA6E4}">
-                <adec:decorative xmlns:adec="http://schemas.microsoft.com/office/drawing/2017/decorative" val="1"/>
-              </a:ext>
-            </a:extLst>
-          </p:cNvPr>
-          <p:cNvSpPr>
-            <a:spLocks noGrp="1" noRot="1" noChangeAspect="1" noMove="1" noResize="1" noEditPoints="1" noAdjustHandles="1" noChangeArrowheads="1" noChangeShapeType="1" noTextEdit="1"/>
-          </p:cNvSpPr>
-          <p:nvPr>
-            <p:extLst>
-              <p:ext uri="{386F3935-93C4-4BCD-93E2-E3B085C9AB24}">
-                <p16:designElem xmlns:p16="http://schemas.microsoft.com/office/powerpoint/2015/main" val="1"/>
-              </p:ext>
-            </p:extLst>
-          </p:nvPr>
-        </p:nvSpPr>
-        <p:spPr>
-          <a:xfrm>
-            <a:off x="160867" y="158782"/>
-            <a:ext cx="11870265" cy="6537850"/>
-          </a:xfrm>
-          <a:prstGeom prst="rect">
-            <a:avLst/>
-          </a:prstGeom>
-          <a:solidFill>
-            <a:srgbClr val="FFFFFF"/>
-          </a:solidFill>
-          <a:ln>
-            <a:noFill/>
-          </a:ln>
-        </p:spPr>
-        <p:style>
-          <a:lnRef idx="2">
-            <a:schemeClr val="accent1">
-              <a:shade val="50000"/>
-            </a:schemeClr>
-          </a:lnRef>
-          <a:fillRef idx="1">
-            <a:schemeClr val="accent1"/>
-          </a:fillRef>
-          <a:effectRef idx="0">
-            <a:schemeClr val="accent1"/>
-          </a:effectRef>
-          <a:fontRef idx="minor">
-            <a:schemeClr val="lt1"/>
-          </a:fontRef>
-        </p:style>
-        <p:txBody>
-          <a:bodyPr rtlCol="0" anchor="ctr"/>
-          <a:lstStyle/>
-          <a:p>
-            <a:pPr algn="ctr"/>
-            <a:endParaRPr lang="en-US"/>
-          </a:p>
-        </p:txBody>
-      </p:sp>
       <p:pic>
         <p:nvPicPr>
-          <p:cNvPr id="6" name="Immagine 5">
+          <p:cNvPr id="6" name="Immagine 5" descr="Immagine che contiene testo, mappa, ombrello, accessorio&#10;&#10;Descrizione generata automaticamente">
             <a:extLst>
               <a:ext uri="{FF2B5EF4-FFF2-40B4-BE49-F238E27FC236}">
-                <a16:creationId xmlns:a16="http://schemas.microsoft.com/office/drawing/2014/main" id="{BEABC6A4-E529-4907-A612-807E269E5DBA}"/>
+                <a16:creationId xmlns:a16="http://schemas.microsoft.com/office/drawing/2014/main" id="{F7E10729-3749-40C2-8DDC-3DDA369FBB11}"/>
               </a:ext>
             </a:extLst>
           </p:cNvPr>
@@ -25516,8 +25191,8 @@
         </p:blipFill>
         <p:spPr>
           <a:xfrm>
-            <a:off x="2167800" y="480515"/>
-            <a:ext cx="7856399" cy="5892302"/>
+            <a:off x="1012676" y="1671454"/>
+            <a:ext cx="5071256" cy="4348601"/>
           </a:xfrm>
           <a:prstGeom prst="rect">
             <a:avLst/>
@@ -25526,10 +25201,10 @@
       </p:pic>
       <p:sp>
         <p:nvSpPr>
-          <p:cNvPr id="4" name="Segnaposto numero diapositiva 3">
+          <p:cNvPr id="3" name="Segnaposto contenuto 2">
             <a:extLst>
               <a:ext uri="{FF2B5EF4-FFF2-40B4-BE49-F238E27FC236}">
-                <a16:creationId xmlns:a16="http://schemas.microsoft.com/office/drawing/2014/main" id="{7E75E45B-1080-4F78-A657-2916E5B9B405}"/>
+                <a16:creationId xmlns:a16="http://schemas.microsoft.com/office/drawing/2014/main" id="{F0720EDD-94B2-432D-8E17-B53711CDC5B2}"/>
               </a:ext>
             </a:extLst>
           </p:cNvPr>
@@ -25537,17 +25212,229 @@
             <a:spLocks noGrp="1"/>
           </p:cNvSpPr>
           <p:nvPr>
-            <p:ph type="sldNum" sz="quarter" idx="12"/>
+            <p:ph idx="1"/>
           </p:nvPr>
         </p:nvSpPr>
         <p:spPr>
           <a:xfrm>
-            <a:off x="9472736" y="6330118"/>
+            <a:off x="6389913" y="1881386"/>
+            <a:ext cx="5127172" cy="4572000"/>
+          </a:xfrm>
+        </p:spPr>
+        <p:txBody>
+          <a:bodyPr>
+            <a:normAutofit/>
+          </a:bodyPr>
+          <a:lstStyle/>
+          <a:p>
+            <a:r>
+              <a:rPr lang="it-IT" sz="1900" dirty="0" err="1"/>
+              <a:t>Implement</a:t>
+            </a:r>
+            <a:r>
+              <a:rPr lang="it-IT" sz="1900" dirty="0"/>
+              <a:t> the following </a:t>
+            </a:r>
+            <a:r>
+              <a:rPr lang="it-IT" sz="1900" dirty="0" err="1"/>
+              <a:t>methods</a:t>
+            </a:r>
+            <a:r>
+              <a:rPr lang="it-IT" sz="1900" dirty="0"/>
+              <a:t> to </a:t>
+            </a:r>
+            <a:r>
+              <a:rPr lang="it-IT" sz="1900" dirty="0" err="1"/>
+              <a:t>achieve</a:t>
+            </a:r>
+            <a:r>
+              <a:rPr lang="it-IT" sz="1900" dirty="0"/>
+              <a:t> the </a:t>
+            </a:r>
+            <a:r>
+              <a:rPr lang="it-IT" sz="1900" dirty="0" err="1"/>
+              <a:t>result</a:t>
+            </a:r>
+            <a:r>
+              <a:rPr lang="it-IT" sz="1900" dirty="0"/>
+              <a:t> </a:t>
+            </a:r>
+            <a:r>
+              <a:rPr lang="it-IT" sz="1900" dirty="0" err="1"/>
+              <a:t>seen</a:t>
+            </a:r>
+            <a:r>
+              <a:rPr lang="it-IT" sz="1900" dirty="0"/>
+              <a:t> in the </a:t>
+            </a:r>
+            <a:r>
+              <a:rPr lang="it-IT" sz="1900" dirty="0" err="1"/>
+              <a:t>lecture</a:t>
+            </a:r>
+            <a:endParaRPr lang="it-IT" sz="1900" dirty="0"/>
+          </a:p>
+          <a:p>
+            <a:pPr marL="0" indent="0">
+              <a:buNone/>
+            </a:pPr>
+            <a:endParaRPr lang="it-IT" sz="1900" dirty="0"/>
+          </a:p>
+          <a:p>
+            <a:pPr lvl="1"/>
+            <a:r>
+              <a:rPr lang="it-IT" sz="1900" dirty="0" err="1"/>
+              <a:t>Plane</a:t>
+            </a:r>
+            <a:r>
+              <a:rPr lang="it-IT" sz="1900" dirty="0"/>
+              <a:t> Fitting</a:t>
+            </a:r>
+          </a:p>
+          <a:p>
+            <a:pPr lvl="1"/>
+            <a:r>
+              <a:rPr lang="it-IT" sz="1900" dirty="0"/>
+              <a:t>Point to </a:t>
+            </a:r>
+            <a:r>
+              <a:rPr lang="it-IT" sz="1900" dirty="0" err="1"/>
+              <a:t>plane</a:t>
+            </a:r>
+            <a:r>
+              <a:rPr lang="it-IT" sz="1900" dirty="0"/>
+              <a:t> </a:t>
+            </a:r>
+            <a:r>
+              <a:rPr lang="it-IT" sz="1900" dirty="0" err="1"/>
+              <a:t>distance</a:t>
+            </a:r>
+            <a:r>
+              <a:rPr lang="it-IT" sz="1900" dirty="0"/>
+              <a:t> </a:t>
+            </a:r>
+            <a:r>
+              <a:rPr lang="it-IT" sz="1900" dirty="0" err="1"/>
+              <a:t>computation</a:t>
+            </a:r>
+            <a:endParaRPr lang="it-IT" sz="1900" dirty="0"/>
+          </a:p>
+          <a:p>
+            <a:pPr lvl="1"/>
+            <a:r>
+              <a:rPr lang="it-IT" sz="1900" dirty="0"/>
+              <a:t>Point to </a:t>
+            </a:r>
+            <a:r>
+              <a:rPr lang="it-IT" sz="1900" dirty="0" err="1"/>
+              <a:t>plane</a:t>
+            </a:r>
+            <a:r>
+              <a:rPr lang="it-IT" sz="1900" dirty="0"/>
+              <a:t> </a:t>
+            </a:r>
+            <a:r>
+              <a:rPr lang="it-IT" sz="1900" dirty="0" err="1"/>
+              <a:t>projection</a:t>
+            </a:r>
+            <a:endParaRPr lang="it-IT" sz="1900" dirty="0"/>
+          </a:p>
+          <a:p>
+            <a:pPr lvl="1"/>
+            <a:r>
+              <a:rPr lang="it-IT" sz="1900" dirty="0"/>
+              <a:t>Line fitting</a:t>
+            </a:r>
+          </a:p>
+          <a:p>
+            <a:pPr lvl="1"/>
+            <a:r>
+              <a:rPr lang="it-IT" sz="1900" dirty="0"/>
+              <a:t>Point to line </a:t>
+            </a:r>
+            <a:r>
+              <a:rPr lang="it-IT" sz="1900" dirty="0" err="1"/>
+              <a:t>projection</a:t>
+            </a:r>
+            <a:endParaRPr lang="it-IT" sz="1900" dirty="0"/>
+          </a:p>
+          <a:p>
+            <a:pPr lvl="1"/>
+            <a:r>
+              <a:rPr lang="it-IT" sz="1900" dirty="0"/>
+              <a:t>Angle </a:t>
+            </a:r>
+            <a:r>
+              <a:rPr lang="it-IT" sz="1900" dirty="0" err="1"/>
+              <a:t>between</a:t>
+            </a:r>
+            <a:r>
+              <a:rPr lang="it-IT" sz="1900" dirty="0"/>
+              <a:t> </a:t>
+            </a:r>
+            <a:r>
+              <a:rPr lang="it-IT" sz="1900" dirty="0" err="1"/>
+              <a:t>two</a:t>
+            </a:r>
+            <a:r>
+              <a:rPr lang="it-IT" sz="1900" dirty="0"/>
+              <a:t> lines</a:t>
+            </a:r>
+          </a:p>
+          <a:p>
+            <a:pPr lvl="1"/>
+            <a:r>
+              <a:rPr lang="it-IT" sz="1900" dirty="0"/>
+              <a:t>Two lines </a:t>
+            </a:r>
+            <a:r>
+              <a:rPr lang="it-IT" sz="1900" dirty="0" err="1"/>
+              <a:t>intersection</a:t>
+            </a:r>
+            <a:endParaRPr lang="it-IT" sz="1900" dirty="0"/>
+          </a:p>
+          <a:p>
+            <a:pPr lvl="1"/>
+            <a:r>
+              <a:rPr lang="it-IT" sz="1900" dirty="0" err="1"/>
+              <a:t>Robust</a:t>
+            </a:r>
+            <a:r>
+              <a:rPr lang="it-IT" sz="1900" dirty="0"/>
+              <a:t> line fitting</a:t>
+            </a:r>
+          </a:p>
+          <a:p>
+            <a:endParaRPr lang="it-IT" sz="1900" dirty="0"/>
+          </a:p>
+          <a:p>
+            <a:endParaRPr lang="it-IT" sz="1900" dirty="0"/>
+          </a:p>
+        </p:txBody>
+      </p:sp>
+      <p:sp>
+        <p:nvSpPr>
+          <p:cNvPr id="4" name="Segnaposto numero diapositiva 3">
+            <a:extLst>
+              <a:ext uri="{FF2B5EF4-FFF2-40B4-BE49-F238E27FC236}">
+                <a16:creationId xmlns:a16="http://schemas.microsoft.com/office/drawing/2014/main" id="{12E66E89-1F17-4BE1-950A-D0A6AAD464A6}"/>
+              </a:ext>
+            </a:extLst>
+          </p:cNvPr>
+          <p:cNvSpPr>
+            <a:spLocks noGrp="1"/>
+          </p:cNvSpPr>
+          <p:nvPr>
+            <p:ph type="sldNum" sz="quarter" idx="12"/>
+          </p:nvPr>
+        </p:nvSpPr>
+        <p:spPr>
+          <a:xfrm>
+            <a:off x="9472736" y="6453386"/>
             <a:ext cx="1596292" cy="404614"/>
           </a:xfrm>
         </p:spPr>
         <p:txBody>
-          <a:bodyPr vert="horz" lIns="91440" tIns="45720" rIns="91440" bIns="45720" rtlCol="0" anchor="ctr">
+          <a:bodyPr>
             <a:normAutofit/>
           </a:bodyPr>
           <a:lstStyle/>
@@ -25558,11 +25445,7 @@
               </a:spcAft>
             </a:pPr>
             <a:fld id="{9E8ABD2E-3A5F-4DED-804B-27CF0A0D3579}" type="slidenum">
-              <a:rPr lang="en-US">
-                <a:solidFill>
-                  <a:srgbClr val="000000"/>
-                </a:solidFill>
-              </a:rPr>
+              <a:rPr lang="it-IT" smtClean="0"/>
               <a:pPr>
                 <a:spcAft>
                   <a:spcPts val="600"/>
@@ -25570,18 +25453,14 @@
               </a:pPr>
               <a:t>51</a:t>
             </a:fld>
-            <a:endParaRPr lang="en-US">
-              <a:solidFill>
-                <a:srgbClr val="000000"/>
-              </a:solidFill>
-            </a:endParaRPr>
+            <a:endParaRPr lang="it-IT"/>
           </a:p>
         </p:txBody>
       </p:sp>
     </p:spTree>
     <p:extLst>
       <p:ext uri="{BB962C8B-B14F-4D97-AF65-F5344CB8AC3E}">
-        <p14:creationId xmlns:p14="http://schemas.microsoft.com/office/powerpoint/2010/main" val="584107498"/>
+        <p14:creationId xmlns:p14="http://schemas.microsoft.com/office/powerpoint/2010/main" val="3836273972"/>
       </p:ext>
     </p:extLst>
   </p:cSld>
@@ -26051,19 +25930,17 @@
       </p:sp>
       <p:pic>
         <p:nvPicPr>
-          <p:cNvPr id="6" name="Segnaposto contenuto 5">
+          <p:cNvPr id="6" name="Immagine 5">
             <a:extLst>
               <a:ext uri="{FF2B5EF4-FFF2-40B4-BE49-F238E27FC236}">
-                <a16:creationId xmlns:a16="http://schemas.microsoft.com/office/drawing/2014/main" id="{7A51F92B-7D0A-4006-95C2-30C1BC1F6868}"/>
+                <a16:creationId xmlns:a16="http://schemas.microsoft.com/office/drawing/2014/main" id="{BEABC6A4-E529-4907-A612-807E269E5DBA}"/>
               </a:ext>
             </a:extLst>
           </p:cNvPr>
           <p:cNvPicPr>
-            <a:picLocks noGrp="1" noChangeAspect="1"/>
+            <a:picLocks noChangeAspect="1"/>
           </p:cNvPicPr>
-          <p:nvPr>
-            <p:ph idx="1"/>
-          </p:nvPr>
+          <p:nvPr/>
         </p:nvPicPr>
         <p:blipFill>
           <a:blip r:embed="rId2">
@@ -26092,7 +25969,7 @@
           <p:cNvPr id="4" name="Segnaposto numero diapositiva 3">
             <a:extLst>
               <a:ext uri="{FF2B5EF4-FFF2-40B4-BE49-F238E27FC236}">
-                <a16:creationId xmlns:a16="http://schemas.microsoft.com/office/drawing/2014/main" id="{E81E8FF7-06BB-4664-8459-89DFC10A4D91}"/>
+                <a16:creationId xmlns:a16="http://schemas.microsoft.com/office/drawing/2014/main" id="{7E75E45B-1080-4F78-A657-2916E5B9B405}"/>
               </a:ext>
             </a:extLst>
           </p:cNvPr>
@@ -26132,6 +26009,569 @@
                 </a:spcAft>
               </a:pPr>
               <a:t>52</a:t>
+            </a:fld>
+            <a:endParaRPr lang="en-US">
+              <a:solidFill>
+                <a:srgbClr val="000000"/>
+              </a:solidFill>
+            </a:endParaRPr>
+          </a:p>
+        </p:txBody>
+      </p:sp>
+    </p:spTree>
+    <p:extLst>
+      <p:ext uri="{BB962C8B-B14F-4D97-AF65-F5344CB8AC3E}">
+        <p14:creationId xmlns:p14="http://schemas.microsoft.com/office/powerpoint/2010/main" val="584107498"/>
+      </p:ext>
+    </p:extLst>
+  </p:cSld>
+  <p:clrMapOvr>
+    <a:masterClrMapping/>
+  </p:clrMapOvr>
+</p:sld>
+</file>
+
+<file path=ppt/slides/slide53.xml><?xml version="1.0" encoding="utf-8"?>
+<p:sld xmlns:a="http://schemas.openxmlformats.org/drawingml/2006/main" xmlns:r="http://schemas.openxmlformats.org/officeDocument/2006/relationships" xmlns:p="http://schemas.openxmlformats.org/presentationml/2006/main">
+  <p:cSld>
+    <p:bg>
+      <p:bgPr>
+        <a:solidFill>
+          <a:schemeClr val="bg2"/>
+        </a:solidFill>
+        <a:effectLst/>
+      </p:bgPr>
+    </p:bg>
+    <p:spTree>
+      <p:nvGrpSpPr>
+        <p:cNvPr id="1" name=""/>
+        <p:cNvGrpSpPr/>
+        <p:nvPr/>
+      </p:nvGrpSpPr>
+      <p:grpSpPr>
+        <a:xfrm>
+          <a:off x="0" y="0"/>
+          <a:ext cx="0" cy="0"/>
+          <a:chOff x="0" y="0"/>
+          <a:chExt cx="0" cy="0"/>
+        </a:xfrm>
+      </p:grpSpPr>
+      <p:sp>
+        <p:nvSpPr>
+          <p:cNvPr id="11" name="Rectangle 10">
+            <a:extLst>
+              <a:ext uri="{FF2B5EF4-FFF2-40B4-BE49-F238E27FC236}">
+                <a16:creationId xmlns:a16="http://schemas.microsoft.com/office/drawing/2014/main" id="{AA6EC888-B85F-410F-B430-06583E94BEEC}"/>
+              </a:ext>
+              <a:ext uri="{C183D7F6-B498-43B3-948B-1728B52AA6E4}">
+                <adec:decorative xmlns:adec="http://schemas.microsoft.com/office/drawing/2017/decorative" val="1"/>
+              </a:ext>
+            </a:extLst>
+          </p:cNvPr>
+          <p:cNvSpPr>
+            <a:spLocks noGrp="1" noRot="1" noChangeAspect="1" noMove="1" noResize="1" noEditPoints="1" noAdjustHandles="1" noChangeArrowheads="1" noChangeShapeType="1" noTextEdit="1"/>
+          </p:cNvSpPr>
+          <p:nvPr>
+            <p:extLst>
+              <p:ext uri="{386F3935-93C4-4BCD-93E2-E3B085C9AB24}">
+                <p16:designElem xmlns:p16="http://schemas.microsoft.com/office/powerpoint/2015/main" val="1"/>
+              </p:ext>
+            </p:extLst>
+          </p:nvPr>
+        </p:nvSpPr>
+        <p:spPr>
+          <a:xfrm>
+            <a:off x="478095" y="376"/>
+            <a:ext cx="228600" cy="6858000"/>
+          </a:xfrm>
+          <a:prstGeom prst="rect">
+            <a:avLst/>
+          </a:prstGeom>
+          <a:solidFill>
+            <a:schemeClr val="tx2"/>
+          </a:solidFill>
+          <a:ln>
+            <a:noFill/>
+          </a:ln>
+        </p:spPr>
+        <p:style>
+          <a:lnRef idx="2">
+            <a:schemeClr val="accent1">
+              <a:shade val="50000"/>
+            </a:schemeClr>
+          </a:lnRef>
+          <a:fillRef idx="1">
+            <a:schemeClr val="accent1"/>
+          </a:fillRef>
+          <a:effectRef idx="0">
+            <a:schemeClr val="accent1"/>
+          </a:effectRef>
+          <a:fontRef idx="minor">
+            <a:schemeClr val="lt1"/>
+          </a:fontRef>
+        </p:style>
+      </p:sp>
+      <p:sp>
+        <p:nvSpPr>
+          <p:cNvPr id="13" name="Rectangle 12">
+            <a:extLst>
+              <a:ext uri="{FF2B5EF4-FFF2-40B4-BE49-F238E27FC236}">
+                <a16:creationId xmlns:a16="http://schemas.microsoft.com/office/drawing/2014/main" id="{9485DA84-CB73-4E5E-9864-2460CE28055D}"/>
+              </a:ext>
+              <a:ext uri="{C183D7F6-B498-43B3-948B-1728B52AA6E4}">
+                <adec:decorative xmlns:adec="http://schemas.microsoft.com/office/drawing/2017/decorative" val="1"/>
+              </a:ext>
+            </a:extLst>
+          </p:cNvPr>
+          <p:cNvSpPr>
+            <a:spLocks noGrp="1" noRot="1" noChangeAspect="1" noMove="1" noResize="1" noEditPoints="1" noAdjustHandles="1" noChangeArrowheads="1" noChangeShapeType="1" noTextEdit="1"/>
+          </p:cNvSpPr>
+          <p:nvPr>
+            <p:extLst>
+              <p:ext uri="{386F3935-93C4-4BCD-93E2-E3B085C9AB24}">
+                <p16:designElem xmlns:p16="http://schemas.microsoft.com/office/powerpoint/2015/main" val="1"/>
+              </p:ext>
+            </p:extLst>
+          </p:nvPr>
+        </p:nvSpPr>
+        <p:spPr>
+          <a:xfrm>
+            <a:off x="0" y="0"/>
+            <a:ext cx="12192000" cy="6858000"/>
+          </a:xfrm>
+          <a:prstGeom prst="rect">
+            <a:avLst/>
+          </a:prstGeom>
+          <a:solidFill>
+            <a:schemeClr val="bg2"/>
+          </a:solidFill>
+          <a:ln>
+            <a:noFill/>
+          </a:ln>
+        </p:spPr>
+        <p:style>
+          <a:lnRef idx="2">
+            <a:schemeClr val="accent1">
+              <a:shade val="50000"/>
+            </a:schemeClr>
+          </a:lnRef>
+          <a:fillRef idx="1">
+            <a:schemeClr val="accent1"/>
+          </a:fillRef>
+          <a:effectRef idx="0">
+            <a:schemeClr val="accent1"/>
+          </a:effectRef>
+          <a:fontRef idx="minor">
+            <a:schemeClr val="lt1"/>
+          </a:fontRef>
+        </p:style>
+        <p:txBody>
+          <a:bodyPr rtlCol="0" anchor="ctr"/>
+          <a:lstStyle/>
+          <a:p>
+            <a:pPr algn="ctr"/>
+            <a:endParaRPr lang="en-US"/>
+          </a:p>
+        </p:txBody>
+      </p:sp>
+      <p:sp>
+        <p:nvSpPr>
+          <p:cNvPr id="15" name="Rectangle 14">
+            <a:extLst>
+              <a:ext uri="{FF2B5EF4-FFF2-40B4-BE49-F238E27FC236}">
+                <a16:creationId xmlns:a16="http://schemas.microsoft.com/office/drawing/2014/main" id="{7D49185E-361A-421B-8F2D-11C7FFC686F0}"/>
+              </a:ext>
+              <a:ext uri="{C183D7F6-B498-43B3-948B-1728B52AA6E4}">
+                <adec:decorative xmlns:adec="http://schemas.microsoft.com/office/drawing/2017/decorative" val="1"/>
+              </a:ext>
+            </a:extLst>
+          </p:cNvPr>
+          <p:cNvSpPr>
+            <a:spLocks noGrp="1" noRot="1" noChangeAspect="1" noMove="1" noResize="1" noEditPoints="1" noAdjustHandles="1" noChangeArrowheads="1" noChangeShapeType="1" noTextEdit="1"/>
+          </p:cNvSpPr>
+          <p:nvPr>
+            <p:extLst>
+              <p:ext uri="{386F3935-93C4-4BCD-93E2-E3B085C9AB24}">
+                <p16:designElem xmlns:p16="http://schemas.microsoft.com/office/powerpoint/2015/main" val="1"/>
+              </p:ext>
+            </p:extLst>
+          </p:nvPr>
+        </p:nvSpPr>
+        <p:spPr>
+          <a:xfrm>
+            <a:off x="0" y="0"/>
+            <a:ext cx="365760" cy="365760"/>
+          </a:xfrm>
+          <a:prstGeom prst="rect">
+            <a:avLst/>
+          </a:prstGeom>
+          <a:solidFill>
+            <a:schemeClr val="tx1"/>
+          </a:solidFill>
+          <a:ln>
+            <a:noFill/>
+          </a:ln>
+        </p:spPr>
+        <p:style>
+          <a:lnRef idx="2">
+            <a:schemeClr val="accent1">
+              <a:shade val="50000"/>
+            </a:schemeClr>
+          </a:lnRef>
+          <a:fillRef idx="1">
+            <a:schemeClr val="accent1"/>
+          </a:fillRef>
+          <a:effectRef idx="0">
+            <a:schemeClr val="accent1"/>
+          </a:effectRef>
+          <a:fontRef idx="minor">
+            <a:schemeClr val="lt1"/>
+          </a:fontRef>
+        </p:style>
+        <p:txBody>
+          <a:bodyPr rtlCol="0" anchor="ctr"/>
+          <a:lstStyle/>
+          <a:p>
+            <a:pPr algn="ctr"/>
+            <a:endParaRPr lang="en-US"/>
+          </a:p>
+        </p:txBody>
+      </p:sp>
+      <p:sp>
+        <p:nvSpPr>
+          <p:cNvPr id="17" name="Rectangle 16">
+            <a:extLst>
+              <a:ext uri="{FF2B5EF4-FFF2-40B4-BE49-F238E27FC236}">
+                <a16:creationId xmlns:a16="http://schemas.microsoft.com/office/drawing/2014/main" id="{14B85BAA-C37F-44B4-B427-B4F10EBB4183}"/>
+              </a:ext>
+              <a:ext uri="{C183D7F6-B498-43B3-948B-1728B52AA6E4}">
+                <adec:decorative xmlns:adec="http://schemas.microsoft.com/office/drawing/2017/decorative" val="1"/>
+              </a:ext>
+            </a:extLst>
+          </p:cNvPr>
+          <p:cNvSpPr>
+            <a:spLocks noGrp="1" noRot="1" noChangeAspect="1" noMove="1" noResize="1" noEditPoints="1" noAdjustHandles="1" noChangeArrowheads="1" noChangeShapeType="1" noTextEdit="1"/>
+          </p:cNvSpPr>
+          <p:nvPr>
+            <p:extLst>
+              <p:ext uri="{386F3935-93C4-4BCD-93E2-E3B085C9AB24}">
+                <p16:designElem xmlns:p16="http://schemas.microsoft.com/office/powerpoint/2015/main" val="1"/>
+              </p:ext>
+            </p:extLst>
+          </p:nvPr>
+        </p:nvSpPr>
+        <p:spPr>
+          <a:xfrm>
+            <a:off x="11826240" y="-4668"/>
+            <a:ext cx="365760" cy="365760"/>
+          </a:xfrm>
+          <a:prstGeom prst="rect">
+            <a:avLst/>
+          </a:prstGeom>
+          <a:solidFill>
+            <a:schemeClr val="tx1"/>
+          </a:solidFill>
+          <a:ln>
+            <a:noFill/>
+          </a:ln>
+        </p:spPr>
+        <p:style>
+          <a:lnRef idx="2">
+            <a:schemeClr val="accent1">
+              <a:shade val="50000"/>
+            </a:schemeClr>
+          </a:lnRef>
+          <a:fillRef idx="1">
+            <a:schemeClr val="accent1"/>
+          </a:fillRef>
+          <a:effectRef idx="0">
+            <a:schemeClr val="accent1"/>
+          </a:effectRef>
+          <a:fontRef idx="minor">
+            <a:schemeClr val="lt1"/>
+          </a:fontRef>
+        </p:style>
+        <p:txBody>
+          <a:bodyPr rtlCol="0" anchor="ctr"/>
+          <a:lstStyle/>
+          <a:p>
+            <a:pPr algn="ctr"/>
+            <a:endParaRPr lang="en-US"/>
+          </a:p>
+        </p:txBody>
+      </p:sp>
+      <p:sp>
+        <p:nvSpPr>
+          <p:cNvPr id="19" name="Rectangle 18">
+            <a:extLst>
+              <a:ext uri="{FF2B5EF4-FFF2-40B4-BE49-F238E27FC236}">
+                <a16:creationId xmlns:a16="http://schemas.microsoft.com/office/drawing/2014/main" id="{EDC4EE06-D7B4-4FAC-A561-38A1C380232A}"/>
+              </a:ext>
+              <a:ext uri="{C183D7F6-B498-43B3-948B-1728B52AA6E4}">
+                <adec:decorative xmlns:adec="http://schemas.microsoft.com/office/drawing/2017/decorative" val="1"/>
+              </a:ext>
+            </a:extLst>
+          </p:cNvPr>
+          <p:cNvSpPr>
+            <a:spLocks noGrp="1" noRot="1" noChangeAspect="1" noMove="1" noResize="1" noEditPoints="1" noAdjustHandles="1" noChangeArrowheads="1" noChangeShapeType="1" noTextEdit="1"/>
+          </p:cNvSpPr>
+          <p:nvPr>
+            <p:extLst>
+              <p:ext uri="{386F3935-93C4-4BCD-93E2-E3B085C9AB24}">
+                <p16:designElem xmlns:p16="http://schemas.microsoft.com/office/powerpoint/2015/main" val="1"/>
+              </p:ext>
+            </p:extLst>
+          </p:nvPr>
+        </p:nvSpPr>
+        <p:spPr>
+          <a:xfrm>
+            <a:off x="0" y="6494325"/>
+            <a:ext cx="365760" cy="365760"/>
+          </a:xfrm>
+          <a:prstGeom prst="rect">
+            <a:avLst/>
+          </a:prstGeom>
+          <a:solidFill>
+            <a:schemeClr val="tx1"/>
+          </a:solidFill>
+          <a:ln>
+            <a:noFill/>
+          </a:ln>
+        </p:spPr>
+        <p:style>
+          <a:lnRef idx="2">
+            <a:schemeClr val="accent1">
+              <a:shade val="50000"/>
+            </a:schemeClr>
+          </a:lnRef>
+          <a:fillRef idx="1">
+            <a:schemeClr val="accent1"/>
+          </a:fillRef>
+          <a:effectRef idx="0">
+            <a:schemeClr val="accent1"/>
+          </a:effectRef>
+          <a:fontRef idx="minor">
+            <a:schemeClr val="lt1"/>
+          </a:fontRef>
+        </p:style>
+        <p:txBody>
+          <a:bodyPr rtlCol="0" anchor="ctr"/>
+          <a:lstStyle/>
+          <a:p>
+            <a:pPr algn="ctr"/>
+            <a:endParaRPr lang="en-US"/>
+          </a:p>
+        </p:txBody>
+      </p:sp>
+      <p:sp>
+        <p:nvSpPr>
+          <p:cNvPr id="21" name="Rectangle 20">
+            <a:extLst>
+              <a:ext uri="{FF2B5EF4-FFF2-40B4-BE49-F238E27FC236}">
+                <a16:creationId xmlns:a16="http://schemas.microsoft.com/office/drawing/2014/main" id="{9018D83B-903C-4782-B1BB-A45164A71F60}"/>
+              </a:ext>
+              <a:ext uri="{C183D7F6-B498-43B3-948B-1728B52AA6E4}">
+                <adec:decorative xmlns:adec="http://schemas.microsoft.com/office/drawing/2017/decorative" val="1"/>
+              </a:ext>
+            </a:extLst>
+          </p:cNvPr>
+          <p:cNvSpPr>
+            <a:spLocks noGrp="1" noRot="1" noChangeAspect="1" noMove="1" noResize="1" noEditPoints="1" noAdjustHandles="1" noChangeArrowheads="1" noChangeShapeType="1" noTextEdit="1"/>
+          </p:cNvSpPr>
+          <p:nvPr>
+            <p:extLst>
+              <p:ext uri="{386F3935-93C4-4BCD-93E2-E3B085C9AB24}">
+                <p16:designElem xmlns:p16="http://schemas.microsoft.com/office/powerpoint/2015/main" val="1"/>
+              </p:ext>
+            </p:extLst>
+          </p:nvPr>
+        </p:nvSpPr>
+        <p:spPr>
+          <a:xfrm>
+            <a:off x="11826240" y="6494325"/>
+            <a:ext cx="365760" cy="365760"/>
+          </a:xfrm>
+          <a:prstGeom prst="rect">
+            <a:avLst/>
+          </a:prstGeom>
+          <a:solidFill>
+            <a:schemeClr val="tx1"/>
+          </a:solidFill>
+          <a:ln>
+            <a:noFill/>
+          </a:ln>
+        </p:spPr>
+        <p:style>
+          <a:lnRef idx="2">
+            <a:schemeClr val="accent1">
+              <a:shade val="50000"/>
+            </a:schemeClr>
+          </a:lnRef>
+          <a:fillRef idx="1">
+            <a:schemeClr val="accent1"/>
+          </a:fillRef>
+          <a:effectRef idx="0">
+            <a:schemeClr val="accent1"/>
+          </a:effectRef>
+          <a:fontRef idx="minor">
+            <a:schemeClr val="lt1"/>
+          </a:fontRef>
+        </p:style>
+        <p:txBody>
+          <a:bodyPr rtlCol="0" anchor="ctr"/>
+          <a:lstStyle/>
+          <a:p>
+            <a:pPr algn="ctr"/>
+            <a:endParaRPr lang="en-US"/>
+          </a:p>
+        </p:txBody>
+      </p:sp>
+      <p:sp>
+        <p:nvSpPr>
+          <p:cNvPr id="23" name="Rectangle 22">
+            <a:extLst>
+              <a:ext uri="{FF2B5EF4-FFF2-40B4-BE49-F238E27FC236}">
+                <a16:creationId xmlns:a16="http://schemas.microsoft.com/office/drawing/2014/main" id="{8785589A-A5AC-409A-B2A2-24D871B4CEF0}"/>
+              </a:ext>
+              <a:ext uri="{C183D7F6-B498-43B3-948B-1728B52AA6E4}">
+                <adec:decorative xmlns:adec="http://schemas.microsoft.com/office/drawing/2017/decorative" val="1"/>
+              </a:ext>
+            </a:extLst>
+          </p:cNvPr>
+          <p:cNvSpPr>
+            <a:spLocks noGrp="1" noRot="1" noChangeAspect="1" noMove="1" noResize="1" noEditPoints="1" noAdjustHandles="1" noChangeArrowheads="1" noChangeShapeType="1" noTextEdit="1"/>
+          </p:cNvSpPr>
+          <p:nvPr>
+            <p:extLst>
+              <p:ext uri="{386F3935-93C4-4BCD-93E2-E3B085C9AB24}">
+                <p16:designElem xmlns:p16="http://schemas.microsoft.com/office/powerpoint/2015/main" val="1"/>
+              </p:ext>
+            </p:extLst>
+          </p:nvPr>
+        </p:nvSpPr>
+        <p:spPr>
+          <a:xfrm>
+            <a:off x="160867" y="158782"/>
+            <a:ext cx="11870265" cy="6537850"/>
+          </a:xfrm>
+          <a:prstGeom prst="rect">
+            <a:avLst/>
+          </a:prstGeom>
+          <a:solidFill>
+            <a:srgbClr val="FFFFFF"/>
+          </a:solidFill>
+          <a:ln>
+            <a:noFill/>
+          </a:ln>
+        </p:spPr>
+        <p:style>
+          <a:lnRef idx="2">
+            <a:schemeClr val="accent1">
+              <a:shade val="50000"/>
+            </a:schemeClr>
+          </a:lnRef>
+          <a:fillRef idx="1">
+            <a:schemeClr val="accent1"/>
+          </a:fillRef>
+          <a:effectRef idx="0">
+            <a:schemeClr val="accent1"/>
+          </a:effectRef>
+          <a:fontRef idx="minor">
+            <a:schemeClr val="lt1"/>
+          </a:fontRef>
+        </p:style>
+        <p:txBody>
+          <a:bodyPr rtlCol="0" anchor="ctr"/>
+          <a:lstStyle/>
+          <a:p>
+            <a:pPr algn="ctr"/>
+            <a:endParaRPr lang="en-US"/>
+          </a:p>
+        </p:txBody>
+      </p:sp>
+      <p:pic>
+        <p:nvPicPr>
+          <p:cNvPr id="6" name="Segnaposto contenuto 5">
+            <a:extLst>
+              <a:ext uri="{FF2B5EF4-FFF2-40B4-BE49-F238E27FC236}">
+                <a16:creationId xmlns:a16="http://schemas.microsoft.com/office/drawing/2014/main" id="{7A51F92B-7D0A-4006-95C2-30C1BC1F6868}"/>
+              </a:ext>
+            </a:extLst>
+          </p:cNvPr>
+          <p:cNvPicPr>
+            <a:picLocks noGrp="1" noChangeAspect="1"/>
+          </p:cNvPicPr>
+          <p:nvPr>
+            <p:ph idx="1"/>
+          </p:nvPr>
+        </p:nvPicPr>
+        <p:blipFill>
+          <a:blip r:embed="rId2">
+            <a:extLst>
+              <a:ext uri="{28A0092B-C50C-407E-A947-70E740481C1C}">
+                <a14:useLocalDpi xmlns:a14="http://schemas.microsoft.com/office/drawing/2010/main" val="0"/>
+              </a:ext>
+            </a:extLst>
+          </a:blip>
+          <a:stretch>
+            <a:fillRect/>
+          </a:stretch>
+        </p:blipFill>
+        <p:spPr>
+          <a:xfrm>
+            <a:off x="2167800" y="480515"/>
+            <a:ext cx="7856399" cy="5892302"/>
+          </a:xfrm>
+          <a:prstGeom prst="rect">
+            <a:avLst/>
+          </a:prstGeom>
+        </p:spPr>
+      </p:pic>
+      <p:sp>
+        <p:nvSpPr>
+          <p:cNvPr id="4" name="Segnaposto numero diapositiva 3">
+            <a:extLst>
+              <a:ext uri="{FF2B5EF4-FFF2-40B4-BE49-F238E27FC236}">
+                <a16:creationId xmlns:a16="http://schemas.microsoft.com/office/drawing/2014/main" id="{E81E8FF7-06BB-4664-8459-89DFC10A4D91}"/>
+              </a:ext>
+            </a:extLst>
+          </p:cNvPr>
+          <p:cNvSpPr>
+            <a:spLocks noGrp="1"/>
+          </p:cNvSpPr>
+          <p:nvPr>
+            <p:ph type="sldNum" sz="quarter" idx="12"/>
+          </p:nvPr>
+        </p:nvSpPr>
+        <p:spPr>
+          <a:xfrm>
+            <a:off x="9472736" y="6330118"/>
+            <a:ext cx="1596292" cy="404614"/>
+          </a:xfrm>
+        </p:spPr>
+        <p:txBody>
+          <a:bodyPr vert="horz" lIns="91440" tIns="45720" rIns="91440" bIns="45720" rtlCol="0" anchor="ctr">
+            <a:normAutofit/>
+          </a:bodyPr>
+          <a:lstStyle/>
+          <a:p>
+            <a:pPr>
+              <a:spcAft>
+                <a:spcPts val="600"/>
+              </a:spcAft>
+            </a:pPr>
+            <a:fld id="{9E8ABD2E-3A5F-4DED-804B-27CF0A0D3579}" type="slidenum">
+              <a:rPr lang="en-US">
+                <a:solidFill>
+                  <a:srgbClr val="000000"/>
+                </a:solidFill>
+              </a:rPr>
+              <a:pPr>
+                <a:spcAft>
+                  <a:spcPts val="600"/>
+                </a:spcAft>
+              </a:pPr>
+              <a:t>53</a:t>
             </a:fld>
             <a:endParaRPr lang="en-US">
               <a:solidFill>

</xml_diff>

<commit_message>
last changes for presentations
</commit_message>
<xml_diff>
--- a/Homeworks/RVC_presentation.pptx
+++ b/Homeworks/RVC_presentation.pptx
@@ -167,6 +167,381 @@
 </p:presentation>
 </file>
 
+<file path=ppt/revisionInfo.xml><?xml version="1.0" encoding="utf-8"?>
+<p1510:revInfo xmlns:a="http://schemas.openxmlformats.org/drawingml/2006/main" xmlns:r="http://schemas.openxmlformats.org/officeDocument/2006/relationships" xmlns:p1510="http://schemas.microsoft.com/office/powerpoint/2015/10/main">
+  <p1510:revLst>
+    <p1510:client id="{31664E8E-083D-434E-8721-759F3A9DDD4C}" v="106" dt="2022-02-09T13:17:27.024"/>
+  </p1510:revLst>
+</p1510:revInfo>
+</file>
+
+<file path=ppt/changesInfos/changesInfo1.xml><?xml version="1.0" encoding="utf-8"?>
+<pc:chgInfo xmlns:a="http://schemas.openxmlformats.org/drawingml/2006/main" xmlns:r="http://schemas.openxmlformats.org/officeDocument/2006/relationships" xmlns:ac="http://schemas.microsoft.com/office/drawing/2013/main/command" xmlns:pc="http://schemas.microsoft.com/office/powerpoint/2013/main/command">
+  <pc:docChgLst>
+    <pc:chgData name="Nicola Marchiotto" userId="29cdb5144caad96d" providerId="LiveId" clId="{31664E8E-083D-434E-8721-759F3A9DDD4C}"/>
+    <pc:docChg chg="undo custSel addSld delSld modSld">
+      <pc:chgData name="Nicola Marchiotto" userId="29cdb5144caad96d" providerId="LiveId" clId="{31664E8E-083D-434E-8721-759F3A9DDD4C}" dt="2022-02-16T11:06:07.536" v="729" actId="20577"/>
+      <pc:docMkLst>
+        <pc:docMk/>
+      </pc:docMkLst>
+      <pc:sldChg chg="modSp mod">
+        <pc:chgData name="Nicola Marchiotto" userId="29cdb5144caad96d" providerId="LiveId" clId="{31664E8E-083D-434E-8721-759F3A9DDD4C}" dt="2022-02-09T09:37:26.019" v="4" actId="115"/>
+        <pc:sldMkLst>
+          <pc:docMk/>
+          <pc:sldMk cId="285060334" sldId="263"/>
+        </pc:sldMkLst>
+        <pc:spChg chg="mod">
+          <ac:chgData name="Nicola Marchiotto" userId="29cdb5144caad96d" providerId="LiveId" clId="{31664E8E-083D-434E-8721-759F3A9DDD4C}" dt="2022-02-09T09:37:26.019" v="4" actId="115"/>
+          <ac:spMkLst>
+            <pc:docMk/>
+            <pc:sldMk cId="285060334" sldId="263"/>
+            <ac:spMk id="3" creationId="{E15FC3D4-7E07-472C-AC13-B45DEAD73EE5}"/>
+          </ac:spMkLst>
+        </pc:spChg>
+        <pc:picChg chg="mod">
+          <ac:chgData name="Nicola Marchiotto" userId="29cdb5144caad96d" providerId="LiveId" clId="{31664E8E-083D-434E-8721-759F3A9DDD4C}" dt="2022-02-09T09:37:19.250" v="3" actId="1036"/>
+          <ac:picMkLst>
+            <pc:docMk/>
+            <pc:sldMk cId="285060334" sldId="263"/>
+            <ac:picMk id="10" creationId="{A3C9FE13-C6C0-411D-A17B-A56F8BD4A4BE}"/>
+          </ac:picMkLst>
+        </pc:picChg>
+      </pc:sldChg>
+      <pc:sldChg chg="modSp mod">
+        <pc:chgData name="Nicola Marchiotto" userId="29cdb5144caad96d" providerId="LiveId" clId="{31664E8E-083D-434E-8721-759F3A9DDD4C}" dt="2022-02-09T09:44:03.708" v="104" actId="20577"/>
+        <pc:sldMkLst>
+          <pc:docMk/>
+          <pc:sldMk cId="64066503" sldId="265"/>
+        </pc:sldMkLst>
+        <pc:spChg chg="mod">
+          <ac:chgData name="Nicola Marchiotto" userId="29cdb5144caad96d" providerId="LiveId" clId="{31664E8E-083D-434E-8721-759F3A9DDD4C}" dt="2022-02-09T09:44:03.708" v="104" actId="20577"/>
+          <ac:spMkLst>
+            <pc:docMk/>
+            <pc:sldMk cId="64066503" sldId="265"/>
+            <ac:spMk id="3" creationId="{E15FC3D4-7E07-472C-AC13-B45DEAD73EE5}"/>
+          </ac:spMkLst>
+        </pc:spChg>
+      </pc:sldChg>
+      <pc:sldChg chg="modSp mod">
+        <pc:chgData name="Nicola Marchiotto" userId="29cdb5144caad96d" providerId="LiveId" clId="{31664E8E-083D-434E-8721-759F3A9DDD4C}" dt="2022-02-09T10:20:40.001" v="308" actId="790"/>
+        <pc:sldMkLst>
+          <pc:docMk/>
+          <pc:sldMk cId="1409396935" sldId="270"/>
+        </pc:sldMkLst>
+        <pc:spChg chg="mod">
+          <ac:chgData name="Nicola Marchiotto" userId="29cdb5144caad96d" providerId="LiveId" clId="{31664E8E-083D-434E-8721-759F3A9DDD4C}" dt="2022-02-09T10:20:40.001" v="308" actId="790"/>
+          <ac:spMkLst>
+            <pc:docMk/>
+            <pc:sldMk cId="1409396935" sldId="270"/>
+            <ac:spMk id="3" creationId="{E15FC3D4-7E07-472C-AC13-B45DEAD73EE5}"/>
+          </ac:spMkLst>
+        </pc:spChg>
+      </pc:sldChg>
+      <pc:sldChg chg="modSp mod">
+        <pc:chgData name="Nicola Marchiotto" userId="29cdb5144caad96d" providerId="LiveId" clId="{31664E8E-083D-434E-8721-759F3A9DDD4C}" dt="2022-02-09T10:28:41.587" v="319" actId="20577"/>
+        <pc:sldMkLst>
+          <pc:docMk/>
+          <pc:sldMk cId="4105867268" sldId="272"/>
+        </pc:sldMkLst>
+        <pc:spChg chg="mod">
+          <ac:chgData name="Nicola Marchiotto" userId="29cdb5144caad96d" providerId="LiveId" clId="{31664E8E-083D-434E-8721-759F3A9DDD4C}" dt="2022-02-09T10:28:41.587" v="319" actId="20577"/>
+          <ac:spMkLst>
+            <pc:docMk/>
+            <pc:sldMk cId="4105867268" sldId="272"/>
+            <ac:spMk id="3" creationId="{E15FC3D4-7E07-472C-AC13-B45DEAD73EE5}"/>
+          </ac:spMkLst>
+        </pc:spChg>
+      </pc:sldChg>
+      <pc:sldChg chg="modSp mod">
+        <pc:chgData name="Nicola Marchiotto" userId="29cdb5144caad96d" providerId="LiveId" clId="{31664E8E-083D-434E-8721-759F3A9DDD4C}" dt="2022-02-09T10:28:50.358" v="338" actId="20577"/>
+        <pc:sldMkLst>
+          <pc:docMk/>
+          <pc:sldMk cId="1797476265" sldId="273"/>
+        </pc:sldMkLst>
+        <pc:spChg chg="mod">
+          <ac:chgData name="Nicola Marchiotto" userId="29cdb5144caad96d" providerId="LiveId" clId="{31664E8E-083D-434E-8721-759F3A9DDD4C}" dt="2022-02-09T10:28:50.358" v="338" actId="20577"/>
+          <ac:spMkLst>
+            <pc:docMk/>
+            <pc:sldMk cId="1797476265" sldId="273"/>
+            <ac:spMk id="3" creationId="{E15FC3D4-7E07-472C-AC13-B45DEAD73EE5}"/>
+          </ac:spMkLst>
+        </pc:spChg>
+      </pc:sldChg>
+      <pc:sldChg chg="modSp mod">
+        <pc:chgData name="Nicola Marchiotto" userId="29cdb5144caad96d" providerId="LiveId" clId="{31664E8E-083D-434E-8721-759F3A9DDD4C}" dt="2022-02-16T10:10:16.259" v="612" actId="20577"/>
+        <pc:sldMkLst>
+          <pc:docMk/>
+          <pc:sldMk cId="1797660694" sldId="275"/>
+        </pc:sldMkLst>
+        <pc:spChg chg="mod">
+          <ac:chgData name="Nicola Marchiotto" userId="29cdb5144caad96d" providerId="LiveId" clId="{31664E8E-083D-434E-8721-759F3A9DDD4C}" dt="2022-02-16T10:10:16.259" v="612" actId="20577"/>
+          <ac:spMkLst>
+            <pc:docMk/>
+            <pc:sldMk cId="1797660694" sldId="275"/>
+            <ac:spMk id="2" creationId="{FE62F838-6ED5-4511-AB1D-737675EB365E}"/>
+          </ac:spMkLst>
+        </pc:spChg>
+        <pc:spChg chg="mod">
+          <ac:chgData name="Nicola Marchiotto" userId="29cdb5144caad96d" providerId="LiveId" clId="{31664E8E-083D-434E-8721-759F3A9DDD4C}" dt="2022-02-16T10:10:01.709" v="610" actId="20577"/>
+          <ac:spMkLst>
+            <pc:docMk/>
+            <pc:sldMk cId="1797660694" sldId="275"/>
+            <ac:spMk id="3" creationId="{E15FC3D4-7E07-472C-AC13-B45DEAD73EE5}"/>
+          </ac:spMkLst>
+        </pc:spChg>
+      </pc:sldChg>
+      <pc:sldChg chg="modSp mod">
+        <pc:chgData name="Nicola Marchiotto" userId="29cdb5144caad96d" providerId="LiveId" clId="{31664E8E-083D-434E-8721-759F3A9DDD4C}" dt="2022-02-16T10:10:22.483" v="613" actId="115"/>
+        <pc:sldMkLst>
+          <pc:docMk/>
+          <pc:sldMk cId="3825190902" sldId="276"/>
+        </pc:sldMkLst>
+        <pc:spChg chg="mod">
+          <ac:chgData name="Nicola Marchiotto" userId="29cdb5144caad96d" providerId="LiveId" clId="{31664E8E-083D-434E-8721-759F3A9DDD4C}" dt="2022-02-16T10:10:22.483" v="613" actId="115"/>
+          <ac:spMkLst>
+            <pc:docMk/>
+            <pc:sldMk cId="3825190902" sldId="276"/>
+            <ac:spMk id="3" creationId="{E95FCEE0-8D7A-4ABD-9C50-637471E817AF}"/>
+          </ac:spMkLst>
+        </pc:spChg>
+      </pc:sldChg>
+      <pc:sldChg chg="modSp mod">
+        <pc:chgData name="Nicola Marchiotto" userId="29cdb5144caad96d" providerId="LiveId" clId="{31664E8E-083D-434E-8721-759F3A9DDD4C}" dt="2022-02-09T10:32:22.470" v="392" actId="20577"/>
+        <pc:sldMkLst>
+          <pc:docMk/>
+          <pc:sldMk cId="439710448" sldId="278"/>
+        </pc:sldMkLst>
+        <pc:spChg chg="mod">
+          <ac:chgData name="Nicola Marchiotto" userId="29cdb5144caad96d" providerId="LiveId" clId="{31664E8E-083D-434E-8721-759F3A9DDD4C}" dt="2022-02-09T10:32:22.470" v="392" actId="20577"/>
+          <ac:spMkLst>
+            <pc:docMk/>
+            <pc:sldMk cId="439710448" sldId="278"/>
+            <ac:spMk id="3" creationId="{E95FCEE0-8D7A-4ABD-9C50-637471E817AF}"/>
+          </ac:spMkLst>
+        </pc:spChg>
+      </pc:sldChg>
+      <pc:sldChg chg="modSp mod">
+        <pc:chgData name="Nicola Marchiotto" userId="29cdb5144caad96d" providerId="LiveId" clId="{31664E8E-083D-434E-8721-759F3A9DDD4C}" dt="2022-02-16T10:15:17.392" v="616" actId="20577"/>
+        <pc:sldMkLst>
+          <pc:docMk/>
+          <pc:sldMk cId="3954916340" sldId="279"/>
+        </pc:sldMkLst>
+        <pc:spChg chg="mod">
+          <ac:chgData name="Nicola Marchiotto" userId="29cdb5144caad96d" providerId="LiveId" clId="{31664E8E-083D-434E-8721-759F3A9DDD4C}" dt="2022-02-16T10:15:17.392" v="616" actId="20577"/>
+          <ac:spMkLst>
+            <pc:docMk/>
+            <pc:sldMk cId="3954916340" sldId="279"/>
+            <ac:spMk id="3" creationId="{E15FC3D4-7E07-472C-AC13-B45DEAD73EE5}"/>
+          </ac:spMkLst>
+        </pc:spChg>
+      </pc:sldChg>
+      <pc:sldChg chg="modSp mod">
+        <pc:chgData name="Nicola Marchiotto" userId="29cdb5144caad96d" providerId="LiveId" clId="{31664E8E-083D-434E-8721-759F3A9DDD4C}" dt="2022-02-16T10:18:39.790" v="618" actId="27636"/>
+        <pc:sldMkLst>
+          <pc:docMk/>
+          <pc:sldMk cId="738182131" sldId="280"/>
+        </pc:sldMkLst>
+        <pc:spChg chg="mod">
+          <ac:chgData name="Nicola Marchiotto" userId="29cdb5144caad96d" providerId="LiveId" clId="{31664E8E-083D-434E-8721-759F3A9DDD4C}" dt="2022-02-16T10:18:39.790" v="618" actId="27636"/>
+          <ac:spMkLst>
+            <pc:docMk/>
+            <pc:sldMk cId="738182131" sldId="280"/>
+            <ac:spMk id="3" creationId="{E15FC3D4-7E07-472C-AC13-B45DEAD73EE5}"/>
+          </ac:spMkLst>
+        </pc:spChg>
+      </pc:sldChg>
+      <pc:sldChg chg="modSp mod">
+        <pc:chgData name="Nicola Marchiotto" userId="29cdb5144caad96d" providerId="LiveId" clId="{31664E8E-083D-434E-8721-759F3A9DDD4C}" dt="2022-02-16T11:06:07.536" v="729" actId="20577"/>
+        <pc:sldMkLst>
+          <pc:docMk/>
+          <pc:sldMk cId="3025209891" sldId="283"/>
+        </pc:sldMkLst>
+        <pc:spChg chg="mod">
+          <ac:chgData name="Nicola Marchiotto" userId="29cdb5144caad96d" providerId="LiveId" clId="{31664E8E-083D-434E-8721-759F3A9DDD4C}" dt="2022-02-16T11:06:07.536" v="729" actId="20577"/>
+          <ac:spMkLst>
+            <pc:docMk/>
+            <pc:sldMk cId="3025209891" sldId="283"/>
+            <ac:spMk id="3" creationId="{E15FC3D4-7E07-472C-AC13-B45DEAD73EE5}"/>
+          </ac:spMkLst>
+        </pc:spChg>
+      </pc:sldChg>
+      <pc:sldChg chg="modSp mod">
+        <pc:chgData name="Nicola Marchiotto" userId="29cdb5144caad96d" providerId="LiveId" clId="{31664E8E-083D-434E-8721-759F3A9DDD4C}" dt="2022-02-09T13:12:36.329" v="423" actId="20577"/>
+        <pc:sldMkLst>
+          <pc:docMk/>
+          <pc:sldMk cId="870264710" sldId="297"/>
+        </pc:sldMkLst>
+        <pc:spChg chg="mod">
+          <ac:chgData name="Nicola Marchiotto" userId="29cdb5144caad96d" providerId="LiveId" clId="{31664E8E-083D-434E-8721-759F3A9DDD4C}" dt="2022-02-09T13:12:36.329" v="423" actId="20577"/>
+          <ac:spMkLst>
+            <pc:docMk/>
+            <pc:sldMk cId="870264710" sldId="297"/>
+            <ac:spMk id="3" creationId="{E95FCEE0-8D7A-4ABD-9C50-637471E817AF}"/>
+          </ac:spMkLst>
+        </pc:spChg>
+      </pc:sldChg>
+      <pc:sldChg chg="addSp modSp mod">
+        <pc:chgData name="Nicola Marchiotto" userId="29cdb5144caad96d" providerId="LiveId" clId="{31664E8E-083D-434E-8721-759F3A9DDD4C}" dt="2022-02-09T13:16:48.501" v="580" actId="1076"/>
+        <pc:sldMkLst>
+          <pc:docMk/>
+          <pc:sldMk cId="979630386" sldId="299"/>
+        </pc:sldMkLst>
+        <pc:spChg chg="add mod">
+          <ac:chgData name="Nicola Marchiotto" userId="29cdb5144caad96d" providerId="LiveId" clId="{31664E8E-083D-434E-8721-759F3A9DDD4C}" dt="2022-02-09T13:16:48.501" v="580" actId="1076"/>
+          <ac:spMkLst>
+            <pc:docMk/>
+            <pc:sldMk cId="979630386" sldId="299"/>
+            <ac:spMk id="2" creationId="{8753D3C0-E8F0-4196-B90C-9FD7F5EA810B}"/>
+          </ac:spMkLst>
+        </pc:spChg>
+        <pc:picChg chg="mod">
+          <ac:chgData name="Nicola Marchiotto" userId="29cdb5144caad96d" providerId="LiveId" clId="{31664E8E-083D-434E-8721-759F3A9DDD4C}" dt="2022-02-09T13:16:07.084" v="576" actId="1076"/>
+          <ac:picMkLst>
+            <pc:docMk/>
+            <pc:sldMk cId="979630386" sldId="299"/>
+            <ac:picMk id="6" creationId="{D8C1C849-DBFD-4DFC-8022-AE45F1810F4D}"/>
+          </ac:picMkLst>
+        </pc:picChg>
+      </pc:sldChg>
+      <pc:sldChg chg="addSp delSp modSp mod">
+        <pc:chgData name="Nicola Marchiotto" userId="29cdb5144caad96d" providerId="LiveId" clId="{31664E8E-083D-434E-8721-759F3A9DDD4C}" dt="2022-02-09T13:18:25.361" v="600" actId="1076"/>
+        <pc:sldMkLst>
+          <pc:docMk/>
+          <pc:sldMk cId="3418343868" sldId="300"/>
+        </pc:sldMkLst>
+        <pc:spChg chg="add del mod">
+          <ac:chgData name="Nicola Marchiotto" userId="29cdb5144caad96d" providerId="LiveId" clId="{31664E8E-083D-434E-8721-759F3A9DDD4C}" dt="2022-02-09T13:18:08.288" v="599" actId="478"/>
+          <ac:spMkLst>
+            <pc:docMk/>
+            <pc:sldMk cId="3418343868" sldId="300"/>
+            <ac:spMk id="5" creationId="{445B851E-B939-4813-8D32-4DBA3ED170C0}"/>
+          </ac:spMkLst>
+        </pc:spChg>
+        <pc:spChg chg="add mod">
+          <ac:chgData name="Nicola Marchiotto" userId="29cdb5144caad96d" providerId="LiveId" clId="{31664E8E-083D-434E-8721-759F3A9DDD4C}" dt="2022-02-09T13:16:34.355" v="579" actId="1076"/>
+          <ac:spMkLst>
+            <pc:docMk/>
+            <pc:sldMk cId="3418343868" sldId="300"/>
+            <ac:spMk id="12" creationId="{7E22D0C7-1C63-4A44-A956-C24AA9A1A073}"/>
+          </ac:spMkLst>
+        </pc:spChg>
+        <pc:picChg chg="add del mod">
+          <ac:chgData name="Nicola Marchiotto" userId="29cdb5144caad96d" providerId="LiveId" clId="{31664E8E-083D-434E-8721-759F3A9DDD4C}" dt="2022-02-09T13:18:25.361" v="600" actId="1076"/>
+          <ac:picMkLst>
+            <pc:docMk/>
+            <pc:sldMk cId="3418343868" sldId="300"/>
+            <ac:picMk id="6" creationId="{DC9A0728-8649-4F21-86C8-4AD079D65528}"/>
+          </ac:picMkLst>
+        </pc:picChg>
+      </pc:sldChg>
+      <pc:sldChg chg="addSp delSp modSp add del mod setBg delDesignElem">
+        <pc:chgData name="Nicola Marchiotto" userId="29cdb5144caad96d" providerId="LiveId" clId="{31664E8E-083D-434E-8721-759F3A9DDD4C}" dt="2022-02-09T13:18:31.844" v="601" actId="47"/>
+        <pc:sldMkLst>
+          <pc:docMk/>
+          <pc:sldMk cId="3858629899" sldId="317"/>
+        </pc:sldMkLst>
+        <pc:spChg chg="add del mod">
+          <ac:chgData name="Nicola Marchiotto" userId="29cdb5144caad96d" providerId="LiveId" clId="{31664E8E-083D-434E-8721-759F3A9DDD4C}" dt="2022-02-09T13:17:15.512" v="584" actId="478"/>
+          <ac:spMkLst>
+            <pc:docMk/>
+            <pc:sldMk cId="3858629899" sldId="317"/>
+            <ac:spMk id="5" creationId="{09A3A8AF-8AC6-4196-89CC-E3FC6F914F95}"/>
+          </ac:spMkLst>
+        </pc:spChg>
+        <pc:spChg chg="add del mod">
+          <ac:chgData name="Nicola Marchiotto" userId="29cdb5144caad96d" providerId="LiveId" clId="{31664E8E-083D-434E-8721-759F3A9DDD4C}" dt="2022-02-09T13:17:26.187" v="586" actId="478"/>
+          <ac:spMkLst>
+            <pc:docMk/>
+            <pc:sldMk cId="3858629899" sldId="317"/>
+            <ac:spMk id="8" creationId="{383B0178-246F-46C0-BED5-A82C9B926B6F}"/>
+          </ac:spMkLst>
+        </pc:spChg>
+        <pc:spChg chg="add del mod">
+          <ac:chgData name="Nicola Marchiotto" userId="29cdb5144caad96d" providerId="LiveId" clId="{31664E8E-083D-434E-8721-759F3A9DDD4C}" dt="2022-02-09T13:17:47.887" v="593" actId="478"/>
+          <ac:spMkLst>
+            <pc:docMk/>
+            <pc:sldMk cId="3858629899" sldId="317"/>
+            <ac:spMk id="10" creationId="{8AB24F44-F59E-499C-A47E-97F955CE8DE4}"/>
+          </ac:spMkLst>
+        </pc:spChg>
+        <pc:spChg chg="del">
+          <ac:chgData name="Nicola Marchiotto" userId="29cdb5144caad96d" providerId="LiveId" clId="{31664E8E-083D-434E-8721-759F3A9DDD4C}" dt="2022-02-09T13:17:09.159" v="582"/>
+          <ac:spMkLst>
+            <pc:docMk/>
+            <pc:sldMk cId="3858629899" sldId="317"/>
+            <ac:spMk id="11" creationId="{AA6EC888-B85F-410F-B430-06583E94BEEC}"/>
+          </ac:spMkLst>
+        </pc:spChg>
+        <pc:spChg chg="del">
+          <ac:chgData name="Nicola Marchiotto" userId="29cdb5144caad96d" providerId="LiveId" clId="{31664E8E-083D-434E-8721-759F3A9DDD4C}" dt="2022-02-09T13:17:09.159" v="582"/>
+          <ac:spMkLst>
+            <pc:docMk/>
+            <pc:sldMk cId="3858629899" sldId="317"/>
+            <ac:spMk id="13" creationId="{9485DA84-CB73-4E5E-9864-2460CE28055D}"/>
+          </ac:spMkLst>
+        </pc:spChg>
+        <pc:spChg chg="del">
+          <ac:chgData name="Nicola Marchiotto" userId="29cdb5144caad96d" providerId="LiveId" clId="{31664E8E-083D-434E-8721-759F3A9DDD4C}" dt="2022-02-09T13:17:09.159" v="582"/>
+          <ac:spMkLst>
+            <pc:docMk/>
+            <pc:sldMk cId="3858629899" sldId="317"/>
+            <ac:spMk id="15" creationId="{7D49185E-361A-421B-8F2D-11C7FFC686F0}"/>
+          </ac:spMkLst>
+        </pc:spChg>
+        <pc:spChg chg="del">
+          <ac:chgData name="Nicola Marchiotto" userId="29cdb5144caad96d" providerId="LiveId" clId="{31664E8E-083D-434E-8721-759F3A9DDD4C}" dt="2022-02-09T13:17:09.159" v="582"/>
+          <ac:spMkLst>
+            <pc:docMk/>
+            <pc:sldMk cId="3858629899" sldId="317"/>
+            <ac:spMk id="17" creationId="{14B85BAA-C37F-44B4-B427-B4F10EBB4183}"/>
+          </ac:spMkLst>
+        </pc:spChg>
+        <pc:spChg chg="del">
+          <ac:chgData name="Nicola Marchiotto" userId="29cdb5144caad96d" providerId="LiveId" clId="{31664E8E-083D-434E-8721-759F3A9DDD4C}" dt="2022-02-09T13:17:09.159" v="582"/>
+          <ac:spMkLst>
+            <pc:docMk/>
+            <pc:sldMk cId="3858629899" sldId="317"/>
+            <ac:spMk id="19" creationId="{EDC4EE06-D7B4-4FAC-A561-38A1C380232A}"/>
+          </ac:spMkLst>
+        </pc:spChg>
+        <pc:spChg chg="del">
+          <ac:chgData name="Nicola Marchiotto" userId="29cdb5144caad96d" providerId="LiveId" clId="{31664E8E-083D-434E-8721-759F3A9DDD4C}" dt="2022-02-09T13:17:09.159" v="582"/>
+          <ac:spMkLst>
+            <pc:docMk/>
+            <pc:sldMk cId="3858629899" sldId="317"/>
+            <ac:spMk id="21" creationId="{9018D83B-903C-4782-B1BB-A45164A71F60}"/>
+          </ac:spMkLst>
+        </pc:spChg>
+        <pc:spChg chg="del">
+          <ac:chgData name="Nicola Marchiotto" userId="29cdb5144caad96d" providerId="LiveId" clId="{31664E8E-083D-434E-8721-759F3A9DDD4C}" dt="2022-02-09T13:17:09.159" v="582"/>
+          <ac:spMkLst>
+            <pc:docMk/>
+            <pc:sldMk cId="3858629899" sldId="317"/>
+            <ac:spMk id="23" creationId="{8785589A-A5AC-409A-B2A2-24D871B4CEF0}"/>
+          </ac:spMkLst>
+        </pc:spChg>
+        <pc:picChg chg="add del">
+          <ac:chgData name="Nicola Marchiotto" userId="29cdb5144caad96d" providerId="LiveId" clId="{31664E8E-083D-434E-8721-759F3A9DDD4C}" dt="2022-02-09T13:17:32.984" v="589" actId="478"/>
+          <ac:picMkLst>
+            <pc:docMk/>
+            <pc:sldMk cId="3858629899" sldId="317"/>
+            <ac:picMk id="6" creationId="{D8C1C849-DBFD-4DFC-8022-AE45F1810F4D}"/>
+          </ac:picMkLst>
+        </pc:picChg>
+        <pc:picChg chg="add mod">
+          <ac:chgData name="Nicola Marchiotto" userId="29cdb5144caad96d" providerId="LiveId" clId="{31664E8E-083D-434E-8721-759F3A9DDD4C}" dt="2022-02-09T13:17:39.209" v="591" actId="1076"/>
+          <ac:picMkLst>
+            <pc:docMk/>
+            <pc:sldMk cId="3858629899" sldId="317"/>
+            <ac:picMk id="16" creationId="{74CECFCB-DEEC-46CB-A326-91E2A8D19448}"/>
+          </ac:picMkLst>
+        </pc:picChg>
+      </pc:sldChg>
+    </pc:docChg>
+  </pc:docChgLst>
+</pc:chgInfo>
+</file>
+
 <file path=ppt/notesMasters/notesMaster1.xml><?xml version="1.0" encoding="utf-8"?>
 <p:notesMaster xmlns:a="http://schemas.openxmlformats.org/drawingml/2006/main" xmlns:r="http://schemas.openxmlformats.org/officeDocument/2006/relationships" xmlns:p="http://schemas.openxmlformats.org/presentationml/2006/main">
   <p:cSld>
@@ -249,7 +624,7 @@
           <a:p>
             <a:fld id="{955F8B66-CE5C-415D-A154-A18399BE0406}" type="datetimeFigureOut">
               <a:rPr lang="it-IT" smtClean="0"/>
-              <a:t>08/02/2022</a:t>
+              <a:t>16/02/2022</a:t>
             </a:fld>
             <a:endParaRPr lang="it-IT"/>
           </a:p>
@@ -516,6 +891,174 @@
 </p:notesMaster>
 </file>
 
+<file path=ppt/notesSlides/notesSlide1.xml><?xml version="1.0" encoding="utf-8"?>
+<p:notes xmlns:a="http://schemas.openxmlformats.org/drawingml/2006/main" xmlns:r="http://schemas.openxmlformats.org/officeDocument/2006/relationships" xmlns:p="http://schemas.openxmlformats.org/presentationml/2006/main">
+  <p:cSld>
+    <p:spTree>
+      <p:nvGrpSpPr>
+        <p:cNvPr id="1" name=""/>
+        <p:cNvGrpSpPr/>
+        <p:nvPr/>
+      </p:nvGrpSpPr>
+      <p:grpSpPr>
+        <a:xfrm>
+          <a:off x="0" y="0"/>
+          <a:ext cx="0" cy="0"/>
+          <a:chOff x="0" y="0"/>
+          <a:chExt cx="0" cy="0"/>
+        </a:xfrm>
+      </p:grpSpPr>
+      <p:sp>
+        <p:nvSpPr>
+          <p:cNvPr id="2" name="Segnaposto immagine diapositiva 1"/>
+          <p:cNvSpPr>
+            <a:spLocks noGrp="1" noRot="1" noChangeAspect="1"/>
+          </p:cNvSpPr>
+          <p:nvPr>
+            <p:ph type="sldImg"/>
+          </p:nvPr>
+        </p:nvSpPr>
+        <p:spPr/>
+      </p:sp>
+      <p:sp>
+        <p:nvSpPr>
+          <p:cNvPr id="3" name="Segnaposto note 2"/>
+          <p:cNvSpPr>
+            <a:spLocks noGrp="1"/>
+          </p:cNvSpPr>
+          <p:nvPr>
+            <p:ph type="body" idx="1"/>
+          </p:nvPr>
+        </p:nvSpPr>
+        <p:spPr/>
+        <p:txBody>
+          <a:bodyPr/>
+          <a:lstStyle/>
+          <a:p>
+            <a:endParaRPr lang="it-IT" dirty="0"/>
+          </a:p>
+        </p:txBody>
+      </p:sp>
+      <p:sp>
+        <p:nvSpPr>
+          <p:cNvPr id="4" name="Segnaposto numero diapositiva 3"/>
+          <p:cNvSpPr>
+            <a:spLocks noGrp="1"/>
+          </p:cNvSpPr>
+          <p:nvPr>
+            <p:ph type="sldNum" sz="quarter" idx="5"/>
+          </p:nvPr>
+        </p:nvSpPr>
+        <p:spPr/>
+        <p:txBody>
+          <a:bodyPr/>
+          <a:lstStyle/>
+          <a:p>
+            <a:fld id="{43A91795-4D7E-4954-858B-259410DA1EA3}" type="slidenum">
+              <a:rPr lang="it-IT" smtClean="0"/>
+              <a:t>10</a:t>
+            </a:fld>
+            <a:endParaRPr lang="it-IT"/>
+          </a:p>
+        </p:txBody>
+      </p:sp>
+    </p:spTree>
+    <p:extLst>
+      <p:ext uri="{BB962C8B-B14F-4D97-AF65-F5344CB8AC3E}">
+        <p14:creationId xmlns:p14="http://schemas.microsoft.com/office/powerpoint/2010/main" val="637672036"/>
+      </p:ext>
+    </p:extLst>
+  </p:cSld>
+  <p:clrMapOvr>
+    <a:masterClrMapping/>
+  </p:clrMapOvr>
+</p:notes>
+</file>
+
+<file path=ppt/notesSlides/notesSlide2.xml><?xml version="1.0" encoding="utf-8"?>
+<p:notes xmlns:a="http://schemas.openxmlformats.org/drawingml/2006/main" xmlns:r="http://schemas.openxmlformats.org/officeDocument/2006/relationships" xmlns:p="http://schemas.openxmlformats.org/presentationml/2006/main">
+  <p:cSld>
+    <p:spTree>
+      <p:nvGrpSpPr>
+        <p:cNvPr id="1" name=""/>
+        <p:cNvGrpSpPr/>
+        <p:nvPr/>
+      </p:nvGrpSpPr>
+      <p:grpSpPr>
+        <a:xfrm>
+          <a:off x="0" y="0"/>
+          <a:ext cx="0" cy="0"/>
+          <a:chOff x="0" y="0"/>
+          <a:chExt cx="0" cy="0"/>
+        </a:xfrm>
+      </p:grpSpPr>
+      <p:sp>
+        <p:nvSpPr>
+          <p:cNvPr id="2" name="Segnaposto immagine diapositiva 1"/>
+          <p:cNvSpPr>
+            <a:spLocks noGrp="1" noRot="1" noChangeAspect="1"/>
+          </p:cNvSpPr>
+          <p:nvPr>
+            <p:ph type="sldImg"/>
+          </p:nvPr>
+        </p:nvSpPr>
+        <p:spPr/>
+      </p:sp>
+      <p:sp>
+        <p:nvSpPr>
+          <p:cNvPr id="3" name="Segnaposto note 2"/>
+          <p:cNvSpPr>
+            <a:spLocks noGrp="1"/>
+          </p:cNvSpPr>
+          <p:nvPr>
+            <p:ph type="body" idx="1"/>
+          </p:nvPr>
+        </p:nvSpPr>
+        <p:spPr/>
+        <p:txBody>
+          <a:bodyPr/>
+          <a:lstStyle/>
+          <a:p>
+            <a:endParaRPr lang="it-IT" dirty="0"/>
+          </a:p>
+        </p:txBody>
+      </p:sp>
+      <p:sp>
+        <p:nvSpPr>
+          <p:cNvPr id="4" name="Segnaposto numero diapositiva 3"/>
+          <p:cNvSpPr>
+            <a:spLocks noGrp="1"/>
+          </p:cNvSpPr>
+          <p:nvPr>
+            <p:ph type="sldNum" sz="quarter" idx="5"/>
+          </p:nvPr>
+        </p:nvSpPr>
+        <p:spPr/>
+        <p:txBody>
+          <a:bodyPr/>
+          <a:lstStyle/>
+          <a:p>
+            <a:fld id="{43A91795-4D7E-4954-858B-259410DA1EA3}" type="slidenum">
+              <a:rPr lang="it-IT" smtClean="0"/>
+              <a:t>13</a:t>
+            </a:fld>
+            <a:endParaRPr lang="it-IT"/>
+          </a:p>
+        </p:txBody>
+      </p:sp>
+    </p:spTree>
+    <p:extLst>
+      <p:ext uri="{BB962C8B-B14F-4D97-AF65-F5344CB8AC3E}">
+        <p14:creationId xmlns:p14="http://schemas.microsoft.com/office/powerpoint/2010/main" val="2345992147"/>
+      </p:ext>
+    </p:extLst>
+  </p:cSld>
+  <p:clrMapOvr>
+    <a:masterClrMapping/>
+  </p:clrMapOvr>
+</p:notes>
+</file>
+
 <file path=ppt/slideLayouts/slideLayout1.xml><?xml version="1.0" encoding="utf-8"?>
 <p:sldLayout xmlns:a="http://schemas.openxmlformats.org/drawingml/2006/main" xmlns:r="http://schemas.openxmlformats.org/officeDocument/2006/relationships" xmlns:p="http://schemas.openxmlformats.org/presentationml/2006/main" showMasterSp="0" type="title" preserve="1">
   <p:cSld name="Diapositiva titolo">
@@ -685,7 +1228,7 @@
           <a:p>
             <a:fld id="{830A977C-C6AA-4237-BAB0-78382018275C}" type="datetime1">
               <a:rPr lang="it-IT" smtClean="0"/>
-              <a:t>08/02/2022</a:t>
+              <a:t>16/02/2022</a:t>
             </a:fld>
             <a:endParaRPr lang="it-IT"/>
           </a:p>
@@ -1015,7 +1558,7 @@
           <a:p>
             <a:fld id="{7B6E2526-495F-4565-A6B3-16DBD0FD01F5}" type="datetime1">
               <a:rPr lang="it-IT" smtClean="0"/>
-              <a:t>08/02/2022</a:t>
+              <a:t>16/02/2022</a:t>
             </a:fld>
             <a:endParaRPr lang="it-IT"/>
           </a:p>
@@ -1195,7 +1738,7 @@
           <a:p>
             <a:fld id="{6119CD17-B6E4-4C9A-B3BC-2569618BB94E}" type="datetime1">
               <a:rPr lang="it-IT" smtClean="0"/>
-              <a:t>08/02/2022</a:t>
+              <a:t>16/02/2022</a:t>
             </a:fld>
             <a:endParaRPr lang="it-IT"/>
           </a:p>
@@ -1365,7 +1908,7 @@
           <a:p>
             <a:fld id="{09585017-A46B-4227-B159-7EE543EDCD82}" type="datetime1">
               <a:rPr lang="it-IT" smtClean="0"/>
-              <a:t>08/02/2022</a:t>
+              <a:t>16/02/2022</a:t>
             </a:fld>
             <a:endParaRPr lang="it-IT"/>
           </a:p>
@@ -1642,7 +2185,7 @@
           <a:p>
             <a:fld id="{89D9C247-814C-44A1-B005-27DDA41F7C7B}" type="datetime1">
               <a:rPr lang="it-IT" smtClean="0"/>
-              <a:t>08/02/2022</a:t>
+              <a:t>16/02/2022</a:t>
             </a:fld>
             <a:endParaRPr lang="it-IT"/>
           </a:p>
@@ -2036,7 +2579,7 @@
           <a:p>
             <a:fld id="{9D8A8455-29A1-4852-A314-D3AF68695AD1}" type="datetime1">
               <a:rPr lang="it-IT" smtClean="0"/>
-              <a:t>08/02/2022</a:t>
+              <a:t>16/02/2022</a:t>
             </a:fld>
             <a:endParaRPr lang="it-IT"/>
           </a:p>
@@ -2513,7 +3056,7 @@
           <a:p>
             <a:fld id="{EFA46E6C-BA16-4101-A951-9412500EE31E}" type="datetime1">
               <a:rPr lang="it-IT" smtClean="0"/>
-              <a:t>08/02/2022</a:t>
+              <a:t>16/02/2022</a:t>
             </a:fld>
             <a:endParaRPr lang="it-IT"/>
           </a:p>
@@ -2631,7 +3174,7 @@
           <a:p>
             <a:fld id="{1FD077D1-0EBE-423A-850F-73884ED1FC5C}" type="datetime1">
               <a:rPr lang="it-IT" smtClean="0"/>
-              <a:t>08/02/2022</a:t>
+              <a:t>16/02/2022</a:t>
             </a:fld>
             <a:endParaRPr lang="it-IT"/>
           </a:p>
@@ -2726,7 +3269,7 @@
           <a:p>
             <a:fld id="{97690C9B-0572-40F7-AAAC-EB47BE67D568}" type="datetime1">
               <a:rPr lang="it-IT" smtClean="0"/>
-              <a:t>08/02/2022</a:t>
+              <a:t>16/02/2022</a:t>
             </a:fld>
             <a:endParaRPr lang="it-IT"/>
           </a:p>
@@ -3072,7 +3615,7 @@
           <a:p>
             <a:fld id="{86ED2665-AD80-4F43-8A57-762F43D4FE9B}" type="datetime1">
               <a:rPr lang="it-IT" smtClean="0"/>
-              <a:t>08/02/2022</a:t>
+              <a:t>16/02/2022</a:t>
             </a:fld>
             <a:endParaRPr lang="it-IT"/>
           </a:p>
@@ -3460,7 +4003,7 @@
           <a:p>
             <a:fld id="{F371762F-2CCC-4BAF-A80C-89031DC3BF39}" type="datetime1">
               <a:rPr lang="it-IT" smtClean="0"/>
-              <a:t>08/02/2022</a:t>
+              <a:t>16/02/2022</a:t>
             </a:fld>
             <a:endParaRPr lang="it-IT"/>
           </a:p>
@@ -3738,7 +4281,7 @@
           <a:p>
             <a:fld id="{3D27D73A-FAD7-45A2-8ECB-1D172736BE66}" type="datetime1">
               <a:rPr lang="it-IT" smtClean="0"/>
-              <a:t>08/02/2022</a:t>
+              <a:t>16/02/2022</a:t>
             </a:fld>
             <a:endParaRPr lang="it-IT"/>
           </a:p>
@@ -4560,7 +5103,7 @@
           <p:nvPr/>
         </p:nvPicPr>
         <p:blipFill>
-          <a:blip r:embed="rId2">
+          <a:blip r:embed="rId3">
             <a:extLst>
               <a:ext uri="{28A0092B-C50C-407E-A947-70E740481C1C}">
                 <a14:useLocalDpi xmlns:a14="http://schemas.microsoft.com/office/drawing/2010/main" val="0"/>
@@ -4683,10 +5226,51 @@
             </a:r>
           </a:p>
           <a:p>
-            <a:pPr marL="530352" lvl="1" indent="0">
-              <a:buNone/>
-            </a:pPr>
-            <a:endParaRPr lang="it-IT" sz="1600" b="0" i="0" u="none" strike="noStrike" baseline="0" dirty="0"/>
+            <a:r>
+              <a:rPr lang="it-IT" sz="1600" dirty="0" err="1"/>
+              <a:t>As</a:t>
+            </a:r>
+            <a:r>
+              <a:rPr lang="it-IT" sz="1600" dirty="0"/>
+              <a:t> can be </a:t>
+            </a:r>
+            <a:r>
+              <a:rPr lang="it-IT" sz="1600" dirty="0" err="1"/>
+              <a:t>seen</a:t>
+            </a:r>
+            <a:r>
+              <a:rPr lang="it-IT" sz="1600" dirty="0"/>
+              <a:t>, </a:t>
+            </a:r>
+            <a:r>
+              <a:rPr lang="it-IT" sz="1600" dirty="0" err="1"/>
+              <a:t>discontinuities</a:t>
+            </a:r>
+            <a:r>
+              <a:rPr lang="it-IT" sz="1600" dirty="0"/>
+              <a:t> in the </a:t>
+            </a:r>
+            <a:r>
+              <a:rPr lang="it-IT" sz="1600" dirty="0" err="1"/>
+              <a:t>acceleration</a:t>
+            </a:r>
+            <a:r>
+              <a:rPr lang="it-IT" sz="1600" dirty="0"/>
+              <a:t> </a:t>
+            </a:r>
+            <a:r>
+              <a:rPr lang="it-IT" sz="1600" dirty="0" err="1"/>
+              <a:t>profile</a:t>
+            </a:r>
+            <a:r>
+              <a:rPr lang="it-IT" sz="1600" dirty="0"/>
+              <a:t> are </a:t>
+            </a:r>
+            <a:r>
+              <a:rPr lang="it-IT" sz="1600" dirty="0" err="1"/>
+              <a:t>present</a:t>
+            </a:r>
+            <a:endParaRPr lang="it-IT" sz="1600" i="0" dirty="0"/>
           </a:p>
         </p:txBody>
       </p:sp>
@@ -5776,7 +6360,7 @@
           <p:nvPr/>
         </p:nvPicPr>
         <p:blipFill>
-          <a:blip r:embed="rId2">
+          <a:blip r:embed="rId3">
             <a:extLst>
               <a:ext uri="{28A0092B-C50C-407E-A947-70E740481C1C}">
                 <a14:useLocalDpi xmlns:a14="http://schemas.microsoft.com/office/drawing/2010/main" val="0"/>
@@ -5797,149 +6381,299 @@
           </a:prstGeom>
         </p:spPr>
       </p:pic>
-      <p:sp>
-        <p:nvSpPr>
-          <p:cNvPr id="3" name="Segnaposto contenuto 2">
-            <a:extLst>
-              <a:ext uri="{FF2B5EF4-FFF2-40B4-BE49-F238E27FC236}">
-                <a16:creationId xmlns:a16="http://schemas.microsoft.com/office/drawing/2014/main" id="{E15FC3D4-7E07-472C-AC13-B45DEAD73EE5}"/>
-              </a:ext>
-            </a:extLst>
-          </p:cNvPr>
-          <p:cNvSpPr>
-            <a:spLocks noGrp="1"/>
-          </p:cNvSpPr>
-          <p:nvPr>
-            <p:ph idx="1"/>
-          </p:nvPr>
-        </p:nvSpPr>
-        <p:spPr>
-          <a:xfrm>
-            <a:off x="8471423" y="2286000"/>
-            <a:ext cx="3053039" cy="3931920"/>
-          </a:xfrm>
-        </p:spPr>
-        <p:txBody>
-          <a:bodyPr>
-            <a:normAutofit/>
-          </a:bodyPr>
-          <a:lstStyle/>
-          <a:p>
-            <a:endParaRPr lang="it-IT" sz="1600" dirty="0"/>
-          </a:p>
-          <a:p>
-            <a:r>
-              <a:rPr lang="it-IT" sz="1600"/>
-              <a:t>tc</a:t>
-            </a:r>
-            <a:r>
-              <a:rPr lang="it-IT" sz="1600" dirty="0"/>
-              <a:t> </a:t>
-            </a:r>
-            <a:r>
-              <a:rPr lang="it-IT" sz="1600"/>
-              <a:t>represents</a:t>
-            </a:r>
-            <a:r>
-              <a:rPr lang="it-IT" sz="1600" dirty="0"/>
-              <a:t> the duration of the </a:t>
-            </a:r>
-            <a:r>
-              <a:rPr lang="it-IT" sz="1600"/>
-              <a:t>acceleration</a:t>
-            </a:r>
-            <a:r>
-              <a:rPr lang="it-IT" sz="1600" dirty="0"/>
-              <a:t> and </a:t>
-            </a:r>
-            <a:r>
-              <a:rPr lang="it-IT" sz="1600"/>
-              <a:t>decelletation</a:t>
-            </a:r>
-            <a:r>
-              <a:rPr lang="it-IT" sz="1600" dirty="0"/>
-              <a:t> </a:t>
-            </a:r>
-            <a:r>
-              <a:rPr lang="it-IT" sz="1600"/>
-              <a:t>phases</a:t>
-            </a:r>
-            <a:endParaRPr lang="it-IT" sz="1600" dirty="0"/>
-          </a:p>
-          <a:p>
-            <a:r>
-              <a:rPr lang="it-IT" sz="1600"/>
-              <a:t>Inital</a:t>
-            </a:r>
-            <a:r>
-              <a:rPr lang="it-IT" sz="1600" dirty="0"/>
-              <a:t> and </a:t>
-            </a:r>
-            <a:r>
-              <a:rPr lang="it-IT" sz="1600"/>
-              <a:t>final</a:t>
-            </a:r>
-            <a:r>
-              <a:rPr lang="it-IT" sz="1600" dirty="0"/>
-              <a:t> </a:t>
-            </a:r>
-            <a:r>
-              <a:rPr lang="it-IT" sz="1600"/>
-              <a:t>conditions</a:t>
-            </a:r>
-            <a:r>
-              <a:rPr lang="it-IT" sz="1600" dirty="0"/>
-              <a:t>:</a:t>
-            </a:r>
-          </a:p>
-          <a:p>
-            <a:pPr lvl="1"/>
-            <a:r>
-              <a:rPr lang="it-IT" sz="1600" b="0" i="0" u="none" strike="noStrike" baseline="0"/>
-              <a:t>qi</a:t>
-            </a:r>
-            <a:r>
-              <a:rPr lang="it-IT" sz="1600" b="0" i="0" u="none" strike="noStrike" baseline="0" dirty="0"/>
-              <a:t>=5;	</a:t>
-            </a:r>
-            <a:r>
-              <a:rPr lang="it-IT" sz="1600" b="0" i="0" u="none" strike="noStrike" baseline="0"/>
-              <a:t>qf</a:t>
-            </a:r>
-            <a:r>
-              <a:rPr lang="it-IT" sz="1600" b="0" i="0" u="none" strike="noStrike" baseline="0" dirty="0"/>
-              <a:t>=2;</a:t>
-            </a:r>
-          </a:p>
-          <a:p>
-            <a:pPr lvl="1"/>
-            <a:r>
-              <a:rPr lang="it-IT" sz="1600" b="0" i="0" u="none" strike="noStrike" baseline="0" dirty="0"/>
-              <a:t>ti=1;	</a:t>
-            </a:r>
-            <a:r>
-              <a:rPr lang="it-IT" sz="1600" b="0" i="0" u="none" strike="noStrike" baseline="0"/>
-              <a:t>tf</a:t>
-            </a:r>
-            <a:r>
-              <a:rPr lang="it-IT" sz="1600" b="0" i="0" u="none" strike="noStrike" baseline="0" dirty="0"/>
-              <a:t>=6;</a:t>
-            </a:r>
-          </a:p>
-          <a:p>
-            <a:pPr lvl="1"/>
-            <a:r>
-              <a:rPr lang="it-IT" sz="1600" i="0"/>
-              <a:t>tc</a:t>
-            </a:r>
-            <a:r>
-              <a:rPr lang="it-IT" sz="1600" i="0" dirty="0"/>
-              <a:t>=2;</a:t>
-            </a:r>
-            <a:endParaRPr lang="it-IT" sz="1600" b="0" i="0" u="none" strike="noStrike" baseline="0" dirty="0"/>
-          </a:p>
-        </p:txBody>
-      </p:sp>
+      <mc:AlternateContent xmlns:mc="http://schemas.openxmlformats.org/markup-compatibility/2006" xmlns:a14="http://schemas.microsoft.com/office/drawing/2010/main">
+        <mc:Choice Requires="a14">
+          <p:sp>
+            <p:nvSpPr>
+              <p:cNvPr id="3" name="Segnaposto contenuto 2">
+                <a:extLst>
+                  <a:ext uri="{FF2B5EF4-FFF2-40B4-BE49-F238E27FC236}">
+                    <a16:creationId xmlns:a16="http://schemas.microsoft.com/office/drawing/2014/main" id="{E15FC3D4-7E07-472C-AC13-B45DEAD73EE5}"/>
+                  </a:ext>
+                </a:extLst>
+              </p:cNvPr>
+              <p:cNvSpPr>
+                <a:spLocks noGrp="1"/>
+              </p:cNvSpPr>
+              <p:nvPr>
+                <p:ph idx="1"/>
+              </p:nvPr>
+            </p:nvSpPr>
+            <p:spPr>
+              <a:xfrm>
+                <a:off x="8471423" y="2286000"/>
+                <a:ext cx="3053039" cy="3931920"/>
+              </a:xfrm>
+            </p:spPr>
+            <p:txBody>
+              <a:bodyPr>
+                <a:normAutofit/>
+              </a:bodyPr>
+              <a:lstStyle/>
+              <a:p>
+                <a:endParaRPr lang="it-IT" sz="1600" dirty="0"/>
+              </a:p>
+              <a:p>
+                <a:r>
+                  <a:rPr lang="it-IT" sz="1600" dirty="0" err="1"/>
+                  <a:t>tc</a:t>
+                </a:r>
+                <a:r>
+                  <a:rPr lang="it-IT" sz="1600" dirty="0"/>
+                  <a:t> </a:t>
+                </a:r>
+                <a:r>
+                  <a:rPr lang="it-IT" sz="1600" dirty="0" err="1"/>
+                  <a:t>represents</a:t>
+                </a:r>
+                <a:r>
+                  <a:rPr lang="it-IT" sz="1600" dirty="0"/>
+                  <a:t> the duration of the </a:t>
+                </a:r>
+                <a:r>
+                  <a:rPr lang="it-IT" sz="1600" dirty="0" err="1"/>
+                  <a:t>acceleration</a:t>
+                </a:r>
+                <a:r>
+                  <a:rPr lang="it-IT" sz="1600" dirty="0"/>
+                  <a:t> and </a:t>
+                </a:r>
+                <a:r>
+                  <a:rPr lang="it-IT" sz="1600" dirty="0" err="1"/>
+                  <a:t>decelleration</a:t>
+                </a:r>
+                <a:r>
+                  <a:rPr lang="it-IT" sz="1600" dirty="0"/>
+                  <a:t> </a:t>
+                </a:r>
+                <a:r>
+                  <a:rPr lang="it-IT" sz="1600" dirty="0" err="1"/>
+                  <a:t>phases</a:t>
+                </a:r>
+                <a:endParaRPr lang="it-IT" sz="1600" dirty="0"/>
+              </a:p>
+              <a:p>
+                <a:r>
+                  <a:rPr lang="it-IT" sz="1600" dirty="0"/>
+                  <a:t>Not </a:t>
+                </a:r>
+                <a:r>
+                  <a:rPr lang="it-IT" sz="1600" dirty="0" err="1"/>
+                  <a:t>all</a:t>
+                </a:r>
+                <a:r>
+                  <a:rPr lang="it-IT" sz="1600" dirty="0"/>
+                  <a:t> </a:t>
+                </a:r>
+                <a:r>
+                  <a:rPr lang="it-IT" sz="1600" dirty="0" err="1"/>
+                  <a:t>values</a:t>
+                </a:r>
+                <a:r>
+                  <a:rPr lang="it-IT" sz="1600" dirty="0"/>
+                  <a:t> for </a:t>
+                </a:r>
+                <a:r>
+                  <a:rPr lang="it-IT" sz="1600" dirty="0" err="1"/>
+                  <a:t>tc</a:t>
+                </a:r>
+                <a:r>
+                  <a:rPr lang="it-IT" sz="1600" dirty="0"/>
+                  <a:t> are </a:t>
+                </a:r>
+                <a:r>
+                  <a:rPr lang="it-IT" sz="1600" dirty="0" err="1"/>
+                  <a:t>fisible</a:t>
+                </a:r>
+                <a:r>
+                  <a:rPr lang="it-IT" sz="1600" dirty="0"/>
+                  <a:t>, must </a:t>
+                </a:r>
+                <a:r>
+                  <a:rPr lang="it-IT" sz="1600" dirty="0" err="1"/>
+                  <a:t>hold</a:t>
+                </a:r>
+                <a:r>
+                  <a:rPr lang="it-IT" sz="1600" dirty="0"/>
+                  <a:t>  </a:t>
+                </a:r>
+                <a14:m>
+                  <m:oMath xmlns:m="http://schemas.openxmlformats.org/officeDocument/2006/math">
+                    <m:r>
+                      <m:rPr>
+                        <m:sty m:val="p"/>
+                      </m:rPr>
+                      <a:rPr lang="it-IT" sz="1600" b="0" i="0" smtClean="0">
+                        <a:latin typeface="Cambria Math" panose="02040503050406030204" pitchFamily="18" charset="0"/>
+                      </a:rPr>
+                      <m:t>tc</m:t>
+                    </m:r>
+                    <m:r>
+                      <a:rPr lang="it-IT" sz="1600" b="0" i="1" smtClean="0">
+                        <a:latin typeface="Cambria Math" panose="02040503050406030204" pitchFamily="18" charset="0"/>
+                      </a:rPr>
+                      <m:t>≤</m:t>
+                    </m:r>
+                    <m:f>
+                      <m:fPr>
+                        <m:ctrlPr>
+                          <a:rPr lang="it-IT" sz="1600" i="1" smtClean="0">
+                            <a:latin typeface="Cambria Math" panose="02040503050406030204" pitchFamily="18" charset="0"/>
+                          </a:rPr>
+                        </m:ctrlPr>
+                      </m:fPr>
+                      <m:num>
+                        <m:r>
+                          <a:rPr lang="it-IT" sz="1600" b="0" i="1" smtClean="0">
+                            <a:latin typeface="Cambria Math" panose="02040503050406030204" pitchFamily="18" charset="0"/>
+                          </a:rPr>
+                          <m:t>𝑡𝑓</m:t>
+                        </m:r>
+                        <m:r>
+                          <a:rPr lang="it-IT" sz="1600" b="0" i="1" smtClean="0">
+                            <a:latin typeface="Cambria Math" panose="02040503050406030204" pitchFamily="18" charset="0"/>
+                          </a:rPr>
+                          <m:t>−</m:t>
+                        </m:r>
+                        <m:r>
+                          <a:rPr lang="it-IT" sz="1600" b="0" i="1" smtClean="0">
+                            <a:latin typeface="Cambria Math" panose="02040503050406030204" pitchFamily="18" charset="0"/>
+                          </a:rPr>
+                          <m:t>𝑡𝑖</m:t>
+                        </m:r>
+                      </m:num>
+                      <m:den>
+                        <m:r>
+                          <a:rPr lang="it-IT" sz="1600" b="0" i="1" smtClean="0">
+                            <a:latin typeface="Cambria Math" panose="02040503050406030204" pitchFamily="18" charset="0"/>
+                          </a:rPr>
+                          <m:t>2</m:t>
+                        </m:r>
+                      </m:den>
+                    </m:f>
+                  </m:oMath>
+                </a14:m>
+                <a:endParaRPr lang="it-IT" sz="1600" dirty="0"/>
+              </a:p>
+              <a:p>
+                <a:r>
+                  <a:rPr lang="it-IT" sz="1600" dirty="0" err="1"/>
+                  <a:t>Inital</a:t>
+                </a:r>
+                <a:r>
+                  <a:rPr lang="it-IT" sz="1600" dirty="0"/>
+                  <a:t> and </a:t>
+                </a:r>
+                <a:r>
+                  <a:rPr lang="it-IT" sz="1600" dirty="0" err="1"/>
+                  <a:t>final</a:t>
+                </a:r>
+                <a:r>
+                  <a:rPr lang="it-IT" sz="1600" dirty="0"/>
+                  <a:t> </a:t>
+                </a:r>
+                <a:r>
+                  <a:rPr lang="en-GB" sz="1600" dirty="0"/>
+                  <a:t>conditions</a:t>
+                </a:r>
+                <a:r>
+                  <a:rPr lang="it-IT" sz="1600" dirty="0"/>
+                  <a:t>:</a:t>
+                </a:r>
+              </a:p>
+              <a:p>
+                <a:pPr lvl="1"/>
+                <a:r>
+                  <a:rPr lang="it-IT" sz="1600" b="0" i="0" u="none" strike="noStrike" baseline="0" dirty="0" err="1"/>
+                  <a:t>qi</a:t>
+                </a:r>
+                <a:r>
+                  <a:rPr lang="it-IT" sz="1600" b="0" i="0" u="none" strike="noStrike" baseline="0" dirty="0"/>
+                  <a:t>=5;	</a:t>
+                </a:r>
+                <a:r>
+                  <a:rPr lang="it-IT" sz="1600" b="0" i="0" u="none" strike="noStrike" baseline="0" dirty="0" err="1"/>
+                  <a:t>qf</a:t>
+                </a:r>
+                <a:r>
+                  <a:rPr lang="it-IT" sz="1600" b="0" i="0" u="none" strike="noStrike" baseline="0" dirty="0"/>
+                  <a:t>=2;</a:t>
+                </a:r>
+              </a:p>
+              <a:p>
+                <a:pPr lvl="1"/>
+                <a:r>
+                  <a:rPr lang="it-IT" sz="1600" b="0" i="0" u="none" strike="noStrike" baseline="0" dirty="0"/>
+                  <a:t>ti=1;	</a:t>
+                </a:r>
+                <a:r>
+                  <a:rPr lang="it-IT" sz="1600" b="0" i="0" u="none" strike="noStrike" baseline="0" dirty="0" err="1"/>
+                  <a:t>tf</a:t>
+                </a:r>
+                <a:r>
+                  <a:rPr lang="it-IT" sz="1600" b="0" i="0" u="none" strike="noStrike" baseline="0" dirty="0"/>
+                  <a:t>=6;</a:t>
+                </a:r>
+              </a:p>
+              <a:p>
+                <a:pPr lvl="1"/>
+                <a:r>
+                  <a:rPr lang="it-IT" sz="1600" i="0" dirty="0" err="1"/>
+                  <a:t>tc</a:t>
+                </a:r>
+                <a:r>
+                  <a:rPr lang="it-IT" sz="1600" i="0" dirty="0"/>
+                  <a:t>=2;</a:t>
+                </a:r>
+                <a:endParaRPr lang="it-IT" sz="1600" b="0" i="0" u="none" strike="noStrike" baseline="0" dirty="0"/>
+              </a:p>
+            </p:txBody>
+          </p:sp>
+        </mc:Choice>
+        <mc:Fallback xmlns="">
+          <p:sp>
+            <p:nvSpPr>
+              <p:cNvPr id="3" name="Segnaposto contenuto 2">
+                <a:extLst>
+                  <a:ext uri="{FF2B5EF4-FFF2-40B4-BE49-F238E27FC236}">
+                    <a16:creationId xmlns:a16="http://schemas.microsoft.com/office/drawing/2014/main" id="{E15FC3D4-7E07-472C-AC13-B45DEAD73EE5}"/>
+                  </a:ext>
+                </a:extLst>
+              </p:cNvPr>
+              <p:cNvSpPr>
+                <a:spLocks noGrp="1" noRot="1" noChangeAspect="1" noMove="1" noResize="1" noEditPoints="1" noAdjustHandles="1" noChangeArrowheads="1" noChangeShapeType="1" noTextEdit="1"/>
+              </p:cNvSpPr>
+              <p:nvPr>
+                <p:ph idx="1"/>
+              </p:nvPr>
+            </p:nvSpPr>
+            <p:spPr>
+              <a:xfrm>
+                <a:off x="8471423" y="2286000"/>
+                <a:ext cx="3053039" cy="3931920"/>
+              </a:xfrm>
+              <a:blipFill>
+                <a:blip r:embed="rId4"/>
+                <a:stretch>
+                  <a:fillRect l="-800" r="-1400"/>
+                </a:stretch>
+              </a:blipFill>
+            </p:spPr>
+            <p:txBody>
+              <a:bodyPr/>
+              <a:lstStyle/>
+              <a:p>
+                <a:r>
+                  <a:rPr lang="it-IT">
+                    <a:noFill/>
+                  </a:rPr>
+                  <a:t> </a:t>
+                </a:r>
+              </a:p>
+            </p:txBody>
+          </p:sp>
+        </mc:Fallback>
+      </mc:AlternateContent>
       <p:sp>
         <p:nvSpPr>
           <p:cNvPr id="102" name="Freeform 6">
@@ -6812,6 +7546,14 @@
             </a:r>
             <a:r>
               <a:rPr lang="it-IT" sz="1600" dirty="0" err="1"/>
+              <a:t>constant</a:t>
+            </a:r>
+            <a:r>
+              <a:rPr lang="it-IT" sz="1600" dirty="0"/>
+              <a:t> </a:t>
+            </a:r>
+            <a:r>
+              <a:rPr lang="it-IT" sz="1600" dirty="0" err="1"/>
               <a:t>acceleration</a:t>
             </a:r>
             <a:r>
@@ -7346,6 +8088,14 @@
             </a:r>
             <a:r>
               <a:rPr lang="it-IT" sz="1600" dirty="0" err="1"/>
+              <a:t>constant</a:t>
+            </a:r>
+            <a:r>
+              <a:rPr lang="it-IT" sz="1600" dirty="0"/>
+              <a:t> </a:t>
+            </a:r>
+            <a:r>
+              <a:rPr lang="it-IT" sz="1600" dirty="0" err="1"/>
               <a:t>acceleration</a:t>
             </a:r>
             <a:r>
@@ -8433,7 +9183,7 @@
         </p:spPr>
         <p:txBody>
           <a:bodyPr>
-            <a:normAutofit/>
+            <a:normAutofit lnSpcReduction="10000"/>
           </a:bodyPr>
           <a:lstStyle/>
           <a:p>
@@ -8441,296 +9191,296 @@
           </a:p>
           <a:p>
             <a:r>
-              <a:rPr lang="it-IT" sz="1500" dirty="0" err="1">
+              <a:rPr lang="it-IT" sz="1600" dirty="0" err="1">
                 <a:ea typeface="Linux Biolinum G" panose="02000503000000000000" pitchFamily="2" charset="0"/>
                 <a:cs typeface="Linux Biolinum G" panose="02000503000000000000" pitchFamily="2" charset="0"/>
               </a:rPr>
               <a:t>dqcmax</a:t>
             </a:r>
             <a:r>
-              <a:rPr lang="it-IT" sz="1500" dirty="0">
+              <a:rPr lang="it-IT" sz="1600" dirty="0">
                 <a:ea typeface="Linux Biolinum G" panose="02000503000000000000" pitchFamily="2" charset="0"/>
                 <a:cs typeface="Linux Biolinum G" panose="02000503000000000000" pitchFamily="2" charset="0"/>
               </a:rPr>
               <a:t> </a:t>
             </a:r>
             <a:r>
-              <a:rPr lang="it-IT" sz="1500" dirty="0" err="1">
+              <a:rPr lang="it-IT" sz="1600" dirty="0" err="1">
                 <a:ea typeface="Linux Biolinum G" panose="02000503000000000000" pitchFamily="2" charset="0"/>
                 <a:cs typeface="Linux Biolinum G" panose="02000503000000000000" pitchFamily="2" charset="0"/>
               </a:rPr>
               <a:t>represents</a:t>
             </a:r>
             <a:r>
-              <a:rPr lang="it-IT" sz="1500" dirty="0">
+              <a:rPr lang="it-IT" sz="1600" dirty="0">
                 <a:ea typeface="Linux Biolinum G" panose="02000503000000000000" pitchFamily="2" charset="0"/>
                 <a:cs typeface="Linux Biolinum G" panose="02000503000000000000" pitchFamily="2" charset="0"/>
               </a:rPr>
               <a:t> the </a:t>
             </a:r>
             <a:r>
-              <a:rPr lang="it-IT" sz="1500" dirty="0" err="1">
+              <a:rPr lang="it-IT" sz="1600" dirty="0" err="1">
                 <a:ea typeface="Linux Biolinum G" panose="02000503000000000000" pitchFamily="2" charset="0"/>
                 <a:cs typeface="Linux Biolinum G" panose="02000503000000000000" pitchFamily="2" charset="0"/>
               </a:rPr>
               <a:t>preassigned</a:t>
             </a:r>
             <a:r>
-              <a:rPr lang="it-IT" sz="1500" dirty="0">
+              <a:rPr lang="it-IT" sz="1600" dirty="0">
                 <a:ea typeface="Linux Biolinum G" panose="02000503000000000000" pitchFamily="2" charset="0"/>
                 <a:cs typeface="Linux Biolinum G" panose="02000503000000000000" pitchFamily="2" charset="0"/>
               </a:rPr>
               <a:t> maximum </a:t>
             </a:r>
             <a:r>
-              <a:rPr lang="it-IT" sz="1500" dirty="0" err="1">
+              <a:rPr lang="it-IT" sz="1600" dirty="0" err="1">
                 <a:ea typeface="Linux Biolinum G" panose="02000503000000000000" pitchFamily="2" charset="0"/>
                 <a:cs typeface="Linux Biolinum G" panose="02000503000000000000" pitchFamily="2" charset="0"/>
               </a:rPr>
               <a:t>velocity</a:t>
             </a:r>
             <a:r>
-              <a:rPr lang="it-IT" sz="1500" dirty="0">
+              <a:rPr lang="it-IT" sz="1600" dirty="0">
                 <a:ea typeface="Linux Biolinum G" panose="02000503000000000000" pitchFamily="2" charset="0"/>
                 <a:cs typeface="Linux Biolinum G" panose="02000503000000000000" pitchFamily="2" charset="0"/>
               </a:rPr>
               <a:t> in the </a:t>
             </a:r>
             <a:r>
-              <a:rPr lang="it-IT" sz="1500" dirty="0" err="1">
+              <a:rPr lang="it-IT" sz="1600" dirty="0" err="1">
                 <a:ea typeface="Linux Biolinum G" panose="02000503000000000000" pitchFamily="2" charset="0"/>
                 <a:cs typeface="Linux Biolinum G" panose="02000503000000000000" pitchFamily="2" charset="0"/>
               </a:rPr>
               <a:t>acc</a:t>
             </a:r>
             <a:r>
-              <a:rPr lang="it-IT" sz="1500" dirty="0">
+              <a:rPr lang="it-IT" sz="1600" dirty="0">
                 <a:ea typeface="Linux Biolinum G" panose="02000503000000000000" pitchFamily="2" charset="0"/>
                 <a:cs typeface="Linux Biolinum G" panose="02000503000000000000" pitchFamily="2" charset="0"/>
               </a:rPr>
               <a:t>/</a:t>
             </a:r>
             <a:r>
-              <a:rPr lang="it-IT" sz="1500" dirty="0" err="1">
+              <a:rPr lang="it-IT" sz="1600" dirty="0" err="1">
                 <a:ea typeface="Linux Biolinum G" panose="02000503000000000000" pitchFamily="2" charset="0"/>
                 <a:cs typeface="Linux Biolinum G" panose="02000503000000000000" pitchFamily="2" charset="0"/>
               </a:rPr>
               <a:t>decc</a:t>
             </a:r>
             <a:r>
-              <a:rPr lang="it-IT" sz="1500" dirty="0">
+              <a:rPr lang="it-IT" sz="1600" dirty="0">
                 <a:ea typeface="Linux Biolinum G" panose="02000503000000000000" pitchFamily="2" charset="0"/>
                 <a:cs typeface="Linux Biolinum G" panose="02000503000000000000" pitchFamily="2" charset="0"/>
               </a:rPr>
               <a:t> </a:t>
             </a:r>
             <a:r>
-              <a:rPr lang="it-IT" sz="1500" dirty="0" err="1">
+              <a:rPr lang="it-IT" sz="1600" dirty="0" err="1">
                 <a:ea typeface="Linux Biolinum G" panose="02000503000000000000" pitchFamily="2" charset="0"/>
                 <a:cs typeface="Linux Biolinum G" panose="02000503000000000000" pitchFamily="2" charset="0"/>
               </a:rPr>
               <a:t>phases</a:t>
             </a:r>
-            <a:endParaRPr lang="it-IT" sz="1500" dirty="0">
+            <a:endParaRPr lang="it-IT" sz="1600" dirty="0">
               <a:ea typeface="Linux Biolinum G" panose="02000503000000000000" pitchFamily="2" charset="0"/>
               <a:cs typeface="Linux Biolinum G" panose="02000503000000000000" pitchFamily="2" charset="0"/>
             </a:endParaRPr>
           </a:p>
           <a:p>
             <a:r>
-              <a:rPr lang="it-IT" sz="1500" dirty="0" err="1">
+              <a:rPr lang="it-IT" sz="1600" dirty="0" err="1">
                 <a:ea typeface="Linux Biolinum G" panose="02000503000000000000" pitchFamily="2" charset="0"/>
                 <a:cs typeface="Linux Biolinum G" panose="02000503000000000000" pitchFamily="2" charset="0"/>
               </a:rPr>
               <a:t>ddqcmax</a:t>
             </a:r>
             <a:r>
-              <a:rPr lang="it-IT" sz="1500" dirty="0">
+              <a:rPr lang="it-IT" sz="1600" dirty="0">
                 <a:ea typeface="Linux Biolinum G" panose="02000503000000000000" pitchFamily="2" charset="0"/>
                 <a:cs typeface="Linux Biolinum G" panose="02000503000000000000" pitchFamily="2" charset="0"/>
               </a:rPr>
               <a:t> </a:t>
             </a:r>
             <a:r>
-              <a:rPr lang="it-IT" sz="1500" dirty="0" err="1">
+              <a:rPr lang="it-IT" sz="1600" dirty="0" err="1">
                 <a:ea typeface="Linux Biolinum G" panose="02000503000000000000" pitchFamily="2" charset="0"/>
                 <a:cs typeface="Linux Biolinum G" panose="02000503000000000000" pitchFamily="2" charset="0"/>
               </a:rPr>
               <a:t>represents</a:t>
             </a:r>
             <a:r>
-              <a:rPr lang="it-IT" sz="1500" dirty="0">
+              <a:rPr lang="it-IT" sz="1600" dirty="0">
                 <a:ea typeface="Linux Biolinum G" panose="02000503000000000000" pitchFamily="2" charset="0"/>
                 <a:cs typeface="Linux Biolinum G" panose="02000503000000000000" pitchFamily="2" charset="0"/>
               </a:rPr>
               <a:t> the </a:t>
             </a:r>
             <a:r>
-              <a:rPr lang="it-IT" sz="1500" dirty="0" err="1">
+              <a:rPr lang="it-IT" sz="1600" dirty="0" err="1">
                 <a:ea typeface="Linux Biolinum G" panose="02000503000000000000" pitchFamily="2" charset="0"/>
                 <a:cs typeface="Linux Biolinum G" panose="02000503000000000000" pitchFamily="2" charset="0"/>
               </a:rPr>
               <a:t>preassigned</a:t>
             </a:r>
             <a:r>
-              <a:rPr lang="it-IT" sz="1500" dirty="0">
+              <a:rPr lang="it-IT" sz="1600" dirty="0">
                 <a:ea typeface="Linux Biolinum G" panose="02000503000000000000" pitchFamily="2" charset="0"/>
                 <a:cs typeface="Linux Biolinum G" panose="02000503000000000000" pitchFamily="2" charset="0"/>
               </a:rPr>
               <a:t> maximum </a:t>
             </a:r>
             <a:r>
-              <a:rPr lang="it-IT" sz="1500" dirty="0" err="1">
+              <a:rPr lang="it-IT" sz="1600" dirty="0" err="1">
                 <a:ea typeface="Linux Biolinum G" panose="02000503000000000000" pitchFamily="2" charset="0"/>
                 <a:cs typeface="Linux Biolinum G" panose="02000503000000000000" pitchFamily="2" charset="0"/>
               </a:rPr>
               <a:t>velocity</a:t>
             </a:r>
             <a:r>
-              <a:rPr lang="it-IT" sz="1500" dirty="0">
+              <a:rPr lang="it-IT" sz="1600" dirty="0">
                 <a:ea typeface="Linux Biolinum G" panose="02000503000000000000" pitchFamily="2" charset="0"/>
                 <a:cs typeface="Linux Biolinum G" panose="02000503000000000000" pitchFamily="2" charset="0"/>
               </a:rPr>
               <a:t> in the </a:t>
             </a:r>
             <a:r>
-              <a:rPr lang="it-IT" sz="1500" dirty="0" err="1">
+              <a:rPr lang="it-IT" sz="1600" dirty="0" err="1">
                 <a:ea typeface="Linux Biolinum G" panose="02000503000000000000" pitchFamily="2" charset="0"/>
                 <a:cs typeface="Linux Biolinum G" panose="02000503000000000000" pitchFamily="2" charset="0"/>
               </a:rPr>
               <a:t>costant</a:t>
             </a:r>
             <a:r>
-              <a:rPr lang="it-IT" sz="1500" dirty="0">
+              <a:rPr lang="it-IT" sz="1600" dirty="0">
                 <a:ea typeface="Linux Biolinum G" panose="02000503000000000000" pitchFamily="2" charset="0"/>
                 <a:cs typeface="Linux Biolinum G" panose="02000503000000000000" pitchFamily="2" charset="0"/>
               </a:rPr>
               <a:t> </a:t>
             </a:r>
             <a:r>
-              <a:rPr lang="it-IT" sz="1500" dirty="0" err="1">
+              <a:rPr lang="it-IT" sz="1600" dirty="0" err="1">
                 <a:ea typeface="Linux Biolinum G" panose="02000503000000000000" pitchFamily="2" charset="0"/>
                 <a:cs typeface="Linux Biolinum G" panose="02000503000000000000" pitchFamily="2" charset="0"/>
               </a:rPr>
               <a:t>velocity</a:t>
             </a:r>
             <a:r>
-              <a:rPr lang="it-IT" sz="1500" dirty="0">
+              <a:rPr lang="it-IT" sz="1600" dirty="0">
                 <a:ea typeface="Linux Biolinum G" panose="02000503000000000000" pitchFamily="2" charset="0"/>
                 <a:cs typeface="Linux Biolinum G" panose="02000503000000000000" pitchFamily="2" charset="0"/>
               </a:rPr>
               <a:t> </a:t>
             </a:r>
             <a:r>
-              <a:rPr lang="it-IT" sz="1500" dirty="0" err="1">
+              <a:rPr lang="it-IT" sz="1600" dirty="0" err="1">
                 <a:ea typeface="Linux Biolinum G" panose="02000503000000000000" pitchFamily="2" charset="0"/>
                 <a:cs typeface="Linux Biolinum G" panose="02000503000000000000" pitchFamily="2" charset="0"/>
               </a:rPr>
               <a:t>phase</a:t>
             </a:r>
-            <a:endParaRPr lang="it-IT" sz="1500" dirty="0"/>
-          </a:p>
-          <a:p>
-            <a:r>
-              <a:rPr lang="it-IT" sz="1500" dirty="0" err="1"/>
+            <a:endParaRPr lang="it-IT" sz="1600" dirty="0"/>
+          </a:p>
+          <a:p>
+            <a:r>
+              <a:rPr lang="it-IT" sz="1600" dirty="0" err="1"/>
               <a:t>Inital</a:t>
             </a:r>
             <a:r>
-              <a:rPr lang="it-IT" sz="1500" dirty="0"/>
+              <a:rPr lang="it-IT" sz="1600" dirty="0"/>
               <a:t> and </a:t>
             </a:r>
             <a:r>
-              <a:rPr lang="it-IT" sz="1500" dirty="0" err="1"/>
+              <a:rPr lang="it-IT" sz="1600" dirty="0" err="1"/>
               <a:t>final</a:t>
             </a:r>
             <a:r>
-              <a:rPr lang="it-IT" sz="1500" dirty="0"/>
+              <a:rPr lang="it-IT" sz="1600" dirty="0"/>
               <a:t> </a:t>
             </a:r>
             <a:r>
-              <a:rPr lang="it-IT" sz="1500" dirty="0" err="1"/>
+              <a:rPr lang="it-IT" sz="1600" dirty="0" err="1"/>
               <a:t>conditions</a:t>
             </a:r>
             <a:r>
-              <a:rPr lang="it-IT" sz="1500" dirty="0"/>
+              <a:rPr lang="it-IT" sz="1600" dirty="0"/>
               <a:t>:</a:t>
             </a:r>
           </a:p>
           <a:p>
             <a:pPr lvl="1"/>
             <a:r>
-              <a:rPr lang="it-IT" sz="1500" b="0" i="0" u="none" strike="noStrike" baseline="0" dirty="0" err="1"/>
+              <a:rPr lang="it-IT" sz="1600" b="0" i="0" u="none" strike="noStrike" baseline="0" dirty="0" err="1"/>
               <a:t>qi</a:t>
             </a:r>
             <a:r>
-              <a:rPr lang="it-IT" sz="1500" b="0" i="0" u="none" strike="noStrike" baseline="0" dirty="0"/>
+              <a:rPr lang="it-IT" sz="1600" b="0" i="0" u="none" strike="noStrike" baseline="0" dirty="0"/>
               <a:t>=5;	</a:t>
             </a:r>
             <a:r>
-              <a:rPr lang="it-IT" sz="1500" b="0" i="0" u="none" strike="noStrike" baseline="0" dirty="0" err="1"/>
+              <a:rPr lang="it-IT" sz="1600" b="0" i="0" u="none" strike="noStrike" baseline="0" dirty="0" err="1"/>
               <a:t>qf</a:t>
             </a:r>
             <a:r>
-              <a:rPr lang="it-IT" sz="1500" b="0" i="0" u="none" strike="noStrike" baseline="0" dirty="0"/>
+              <a:rPr lang="it-IT" sz="1600" b="0" i="0" u="none" strike="noStrike" baseline="0" dirty="0"/>
               <a:t>=2; </a:t>
             </a:r>
           </a:p>
           <a:p>
             <a:pPr lvl="1"/>
             <a:r>
-              <a:rPr lang="it-IT" sz="1500" i="0" dirty="0" err="1"/>
+              <a:rPr lang="it-IT" sz="1600" i="0" dirty="0" err="1"/>
               <a:t>dqi</a:t>
             </a:r>
             <a:r>
-              <a:rPr lang="it-IT" sz="1500" i="0" dirty="0"/>
+              <a:rPr lang="it-IT" sz="1600" i="0" dirty="0"/>
               <a:t>=0;	</a:t>
             </a:r>
             <a:r>
-              <a:rPr lang="it-IT" sz="1500" i="0" dirty="0" err="1"/>
+              <a:rPr lang="it-IT" sz="1600" i="0" dirty="0" err="1"/>
               <a:t>dqf</a:t>
             </a:r>
             <a:r>
-              <a:rPr lang="it-IT" sz="1500" i="0" dirty="0"/>
+              <a:rPr lang="it-IT" sz="1600" i="0" dirty="0"/>
               <a:t>=1;</a:t>
             </a:r>
           </a:p>
           <a:p>
             <a:pPr lvl="1"/>
             <a:r>
-              <a:rPr lang="it-IT" sz="1500" i="0" dirty="0" err="1"/>
+              <a:rPr lang="it-IT" sz="1600" i="0" dirty="0" err="1"/>
               <a:t>dqcmax</a:t>
             </a:r>
             <a:r>
-              <a:rPr lang="it-IT" sz="1500" i="0" dirty="0"/>
+              <a:rPr lang="it-IT" sz="1600" i="0" dirty="0"/>
               <a:t>=10</a:t>
             </a:r>
           </a:p>
           <a:p>
             <a:pPr lvl="1"/>
             <a:r>
-              <a:rPr lang="it-IT" sz="1500" i="0" dirty="0" err="1"/>
+              <a:rPr lang="it-IT" sz="1600" i="0" dirty="0" err="1"/>
               <a:t>d</a:t>
             </a:r>
             <a:r>
-              <a:rPr lang="it-IT" sz="1500" b="0" i="0" u="none" strike="noStrike" baseline="0" dirty="0" err="1"/>
+              <a:rPr lang="it-IT" sz="1600" b="0" i="0" u="none" strike="noStrike" baseline="0" dirty="0" err="1"/>
               <a:t>dqcmax</a:t>
             </a:r>
             <a:r>
-              <a:rPr lang="it-IT" sz="1500" b="0" i="0" u="none" strike="noStrike" baseline="0" dirty="0"/>
+              <a:rPr lang="it-IT" sz="1600" b="0" i="0" u="none" strike="noStrike" baseline="0" dirty="0"/>
               <a:t>=</a:t>
             </a:r>
             <a:r>
-              <a:rPr lang="it-IT" sz="1500" b="0" i="0" u="sng" strike="noStrike" baseline="0" dirty="0"/>
+              <a:rPr lang="it-IT" sz="1600" b="0" i="0" u="sng" strike="noStrike" baseline="0" dirty="0"/>
               <a:t>40</a:t>
             </a:r>
             <a:r>
-              <a:rPr lang="it-IT" sz="1500" i="0" dirty="0"/>
+              <a:rPr lang="it-IT" sz="1600" i="0" dirty="0"/>
               <a:t>;</a:t>
             </a:r>
           </a:p>
           <a:p>
             <a:pPr lvl="1"/>
-            <a:endParaRPr lang="it-IT" sz="1500" b="0" i="0" u="none" strike="noStrike" baseline="0" dirty="0"/>
+            <a:endParaRPr lang="it-IT" sz="1600" b="0" i="0" u="none" strike="noStrike" baseline="0" dirty="0"/>
           </a:p>
         </p:txBody>
       </p:sp>
@@ -9126,7 +9876,23 @@
                   <a:schemeClr val="tx1"/>
                 </a:solidFill>
               </a:rPr>
-              <a:t>The jerk is characterized by a step profile instead of by an impulsive jerk profile as in the trapezoidal </a:t>
+              <a:t>The jerk is characterized by a step profile </a:t>
+            </a:r>
+            <a:r>
+              <a:rPr lang="en-US" sz="1800" i="0" dirty="0">
+                <a:solidFill>
+                  <a:schemeClr val="tx1"/>
+                </a:solidFill>
+              </a:rPr>
+              <a:t>and not by</a:t>
+            </a:r>
+            <a:r>
+              <a:rPr lang="en-US" sz="1800" b="0" i="0" u="none" strike="noStrike" baseline="0" dirty="0">
+                <a:solidFill>
+                  <a:schemeClr val="tx1"/>
+                </a:solidFill>
+              </a:rPr>
+              <a:t> an impulsive jerk profile as in the trapezoidal </a:t>
             </a:r>
             <a:r>
               <a:rPr lang="it-IT" sz="1800" b="0" i="0" u="none" strike="noStrike" baseline="0" dirty="0" err="1">
@@ -9197,7 +9963,7 @@
                   <a:schemeClr val="tx1"/>
                 </a:solidFill>
               </a:rPr>
-              <a:t>=</a:t>
+              <a:t> = </a:t>
             </a:r>
             <a:r>
               <a:rPr lang="it-IT" sz="1800" i="0" dirty="0" err="1">
@@ -9213,7 +9979,7 @@
                   <a:schemeClr val="tx1"/>
                 </a:solidFill>
               </a:rPr>
-              <a:t>, -</a:t>
+              <a:t>, </a:t>
             </a:r>
             <a:r>
               <a:rPr lang="it-IT" sz="1800" i="0" dirty="0" err="1">
@@ -9229,7 +9995,23 @@
                   <a:schemeClr val="tx1"/>
                 </a:solidFill>
               </a:rPr>
-              <a:t>=-</a:t>
+              <a:t> = - </a:t>
+            </a:r>
+            <a:r>
+              <a:rPr lang="it-IT" sz="1800" i="0" u="sng" dirty="0" err="1">
+                <a:solidFill>
+                  <a:schemeClr val="tx1"/>
+                </a:solidFill>
+              </a:rPr>
+              <a:t>ddqmin</a:t>
+            </a:r>
+            <a:r>
+              <a:rPr lang="it-IT" sz="1800" i="0" dirty="0">
+                <a:solidFill>
+                  <a:schemeClr val="tx1"/>
+                </a:solidFill>
+              </a:rPr>
+              <a:t>, </a:t>
             </a:r>
             <a:r>
               <a:rPr lang="it-IT" sz="1800" i="0" dirty="0" err="1">
@@ -9237,7 +10019,7 @@
                   <a:schemeClr val="tx1"/>
                 </a:solidFill>
               </a:rPr>
-              <a:t>ddqmin</a:t>
+              <a:t>dddqmax</a:t>
             </a:r>
             <a:r>
               <a:rPr lang="it-IT" sz="1800" i="0" dirty="0">
@@ -9245,6 +10027,22 @@
                   <a:schemeClr val="tx1"/>
                 </a:solidFill>
               </a:rPr>
+              <a:t> = - </a:t>
+            </a:r>
+            <a:r>
+              <a:rPr lang="it-IT" sz="1800" i="0" dirty="0" err="1">
+                <a:solidFill>
+                  <a:schemeClr val="tx1"/>
+                </a:solidFill>
+              </a:rPr>
+              <a:t>dddqmin</a:t>
+            </a:r>
+            <a:r>
+              <a:rPr lang="it-IT" sz="1800" i="0" dirty="0">
+                <a:solidFill>
+                  <a:schemeClr val="tx1"/>
+                </a:solidFill>
+              </a:rPr>
               <a:t>, </a:t>
             </a:r>
             <a:r>
@@ -9253,7 +10051,7 @@
                   <a:schemeClr val="tx1"/>
                 </a:solidFill>
               </a:rPr>
-              <a:t>dddqmax</a:t>
+              <a:t>ddqi</a:t>
             </a:r>
             <a:r>
               <a:rPr lang="it-IT" sz="1800" i="0" dirty="0">
@@ -9261,7 +10059,7 @@
                   <a:schemeClr val="tx1"/>
                 </a:solidFill>
               </a:rPr>
-              <a:t>=-</a:t>
+              <a:t> = </a:t>
             </a:r>
             <a:r>
               <a:rPr lang="it-IT" sz="1800" i="0" dirty="0" err="1">
@@ -9269,7 +10067,7 @@
                   <a:schemeClr val="tx1"/>
                 </a:solidFill>
               </a:rPr>
-              <a:t>dddqmin</a:t>
+              <a:t>ddqf</a:t>
             </a:r>
             <a:r>
               <a:rPr lang="it-IT" sz="1800" i="0" dirty="0">
@@ -9277,39 +10075,7 @@
                   <a:schemeClr val="tx1"/>
                 </a:solidFill>
               </a:rPr>
-              <a:t>, </a:t>
-            </a:r>
-            <a:r>
-              <a:rPr lang="it-IT" sz="1800" i="0" dirty="0" err="1">
-                <a:solidFill>
-                  <a:schemeClr val="tx1"/>
-                </a:solidFill>
-              </a:rPr>
-              <a:t>ddqi</a:t>
-            </a:r>
-            <a:r>
-              <a:rPr lang="it-IT" sz="1800" i="0" dirty="0">
-                <a:solidFill>
-                  <a:schemeClr val="tx1"/>
-                </a:solidFill>
-              </a:rPr>
-              <a:t>=</a:t>
-            </a:r>
-            <a:r>
-              <a:rPr lang="it-IT" sz="1800" i="0" dirty="0" err="1">
-                <a:solidFill>
-                  <a:schemeClr val="tx1"/>
-                </a:solidFill>
-              </a:rPr>
-              <a:t>ddqf</a:t>
-            </a:r>
-            <a:r>
-              <a:rPr lang="it-IT" sz="1800" i="0" dirty="0">
-                <a:solidFill>
-                  <a:schemeClr val="tx1"/>
-                </a:solidFill>
-              </a:rPr>
-              <a:t>=0</a:t>
+              <a:t> = 0</a:t>
             </a:r>
           </a:p>
           <a:p>
@@ -10023,7 +10789,7 @@
                   <a:schemeClr val="tx1"/>
                 </a:solidFill>
               </a:rPr>
-              <a:t>Tj1=time </a:t>
+              <a:t>Tj1 = time </a:t>
             </a:r>
             <a:r>
               <a:rPr lang="it-IT" sz="1800" dirty="0" err="1">
@@ -10159,7 +10925,7 @@
                   <a:schemeClr val="tx1"/>
                 </a:solidFill>
               </a:rPr>
-              <a:t>Tj2=time </a:t>
+              <a:t>Tj2 = time </a:t>
             </a:r>
             <a:r>
               <a:rPr lang="it-IT" sz="1800" dirty="0" err="1">
@@ -11148,7 +11914,7 @@
             </a:r>
             <a:r>
               <a:rPr lang="it-IT" sz="4000" b="0" i="0" u="none" strike="noStrike" baseline="0" dirty="0"/>
-              <a:t>: 5.0	 </a:t>
+              <a:t>: -5.0	 </a:t>
             </a:r>
           </a:p>
           <a:p>
@@ -11159,7 +11925,7 @@
             </a:r>
             <a:r>
               <a:rPr lang="it-IT" sz="4000" b="0" i="0" u="none" strike="noStrike" baseline="0" dirty="0"/>
-              <a:t>: -7.74</a:t>
+              <a:t>: 7.74</a:t>
             </a:r>
           </a:p>
           <a:p>
@@ -11170,7 +11936,7 @@
             </a:r>
             <a:r>
               <a:rPr lang="it-IT" sz="4000" b="0" i="0" u="none" strike="noStrike" baseline="0" dirty="0"/>
-              <a:t>: 10.00</a:t>
+              <a:t>: -10.00</a:t>
             </a:r>
           </a:p>
           <a:p>
@@ -11507,7 +12273,7 @@
         </p:spPr>
         <p:txBody>
           <a:bodyPr>
-            <a:normAutofit fontScale="92500" lnSpcReduction="10000"/>
+            <a:normAutofit/>
           </a:bodyPr>
           <a:lstStyle/>
           <a:p>
@@ -11678,43 +12444,6 @@
               <a:rPr lang="en-US" sz="1700" i="0" dirty="0"/>
               <a:t>: 105.47</a:t>
             </a:r>
-            <a:endParaRPr lang="en-US" sz="1700" b="0" i="0" u="none" strike="noStrike" baseline="0" dirty="0"/>
-          </a:p>
-          <a:p>
-            <a:pPr lvl="1"/>
-            <a:r>
-              <a:rPr lang="it-IT" sz="1700" b="0" i="0" u="none" strike="noStrike" baseline="0" dirty="0" err="1"/>
-              <a:t>dqlim</a:t>
-            </a:r>
-            <a:r>
-              <a:rPr lang="it-IT" sz="1700" b="0" i="0" u="none" strike="noStrike" baseline="0" dirty="0"/>
-              <a:t>: 7.50	 </a:t>
-            </a:r>
-          </a:p>
-          <a:p>
-            <a:pPr lvl="1"/>
-            <a:r>
-              <a:rPr lang="it-IT" sz="1700" b="0" i="0" u="none" strike="noStrike" baseline="0" dirty="0" err="1"/>
-              <a:t>ddqdlim</a:t>
-            </a:r>
-            <a:r>
-              <a:rPr lang="it-IT" sz="1700" b="0" i="0" u="none" strike="noStrike" baseline="0" dirty="0"/>
-              <a:t>: - 14.06</a:t>
-            </a:r>
-          </a:p>
-          <a:p>
-            <a:pPr lvl="1"/>
-            <a:r>
-              <a:rPr lang="it-IT" sz="1700" b="0" i="0" u="none" strike="noStrike" baseline="0" dirty="0" err="1"/>
-              <a:t>ddqalim</a:t>
-            </a:r>
-            <a:r>
-              <a:rPr lang="it-IT" sz="1700" b="0" i="0" u="none" strike="noStrike" baseline="0" dirty="0"/>
-              <a:t>: 14.06</a:t>
-            </a:r>
-          </a:p>
-          <a:p>
-            <a:pPr lvl="1"/>
             <a:endParaRPr lang="it-IT" sz="1100" b="0" i="0" u="none" strike="noStrike" baseline="0" dirty="0"/>
           </a:p>
         </p:txBody>
@@ -13023,15 +13752,6 @@
           </a:bodyPr>
           <a:lstStyle/>
           <a:p>
-            <a:pPr marL="0" indent="0">
-              <a:buNone/>
-            </a:pPr>
-            <a:endParaRPr lang="it-IT" sz="1600" dirty="0"/>
-          </a:p>
-          <a:p>
-            <a:pPr marL="0" indent="0">
-              <a:buNone/>
-            </a:pPr>
             <a:endParaRPr lang="it-IT" sz="1600" dirty="0"/>
           </a:p>
           <a:p>
@@ -13077,6 +13797,48 @@
               <a:rPr lang="it-IT" sz="1600" b="0" i="0" u="none" strike="noStrike" baseline="0" dirty="0"/>
               <a:t>=3;</a:t>
             </a:r>
+          </a:p>
+          <a:p>
+            <a:endParaRPr lang="it-IT" sz="1600" dirty="0"/>
+          </a:p>
+          <a:p>
+            <a:r>
+              <a:rPr lang="it-IT" sz="1600" dirty="0" err="1"/>
+              <a:t>Velocities</a:t>
+            </a:r>
+            <a:r>
+              <a:rPr lang="it-IT" sz="1600" dirty="0"/>
+              <a:t> </a:t>
+            </a:r>
+            <a:r>
+              <a:rPr lang="it-IT" sz="1600" dirty="0" err="1"/>
+              <a:t>computed</a:t>
+            </a:r>
+            <a:r>
+              <a:rPr lang="it-IT" sz="1600" dirty="0"/>
+              <a:t> from the </a:t>
+            </a:r>
+            <a:r>
+              <a:rPr lang="it-IT" sz="1600" dirty="0" err="1"/>
+              <a:t>constraint</a:t>
+            </a:r>
+            <a:r>
+              <a:rPr lang="it-IT" sz="1600" dirty="0"/>
+              <a:t> on the </a:t>
+            </a:r>
+            <a:r>
+              <a:rPr lang="it-IT" sz="1600" dirty="0" err="1"/>
+              <a:t>continuity</a:t>
+            </a:r>
+            <a:r>
+              <a:rPr lang="it-IT" sz="1600" dirty="0"/>
+              <a:t> of </a:t>
+            </a:r>
+            <a:r>
+              <a:rPr lang="it-IT" sz="1600" dirty="0" err="1"/>
+              <a:t>acceleration</a:t>
+            </a:r>
+            <a:endParaRPr lang="it-IT" sz="1600" b="0" i="0" u="none" strike="noStrike" baseline="0" dirty="0"/>
           </a:p>
           <a:p>
             <a:pPr lvl="1"/>
@@ -19506,7 +20268,7 @@
                   <a:schemeClr val="tx1"/>
                 </a:solidFill>
               </a:rPr>
-              <a:t>as initial orientation the orientation of th</a:t>
+              <a:t>as initial orientation the one of th</a:t>
             </a:r>
             <a:r>
               <a:rPr lang="en-US" sz="1800" dirty="0">
@@ -19514,7 +20276,7 @@
                   <a:schemeClr val="tx1"/>
                 </a:solidFill>
               </a:rPr>
-              <a:t>e first point the circular segment in </a:t>
+              <a:t>e first point  of the circular segment, computed by the corresponding </a:t>
             </a:r>
             <a:r>
               <a:rPr lang="en-US" sz="1800" dirty="0" err="1">
@@ -19522,7 +20284,7 @@
                   <a:schemeClr val="tx1"/>
                 </a:solidFill>
               </a:rPr>
-              <a:t>cosideration</a:t>
+              <a:t>Frenet</a:t>
             </a:r>
             <a:r>
               <a:rPr lang="en-US" sz="1800" dirty="0">
@@ -19530,7 +20292,23 @@
                   <a:schemeClr val="tx1"/>
                 </a:solidFill>
               </a:rPr>
-              <a:t>, computed by the corresponding </a:t>
+              <a:t> frame,</a:t>
+            </a:r>
+            <a:r>
+              <a:rPr lang="en-US" sz="1800" i="0" dirty="0">
+                <a:solidFill>
+                  <a:schemeClr val="tx1"/>
+                </a:solidFill>
+              </a:rPr>
+              <a:t> and as </a:t>
+            </a:r>
+            <a:r>
+              <a:rPr lang="en-US" sz="1800" dirty="0">
+                <a:solidFill>
+                  <a:schemeClr val="tx1"/>
+                </a:solidFill>
+              </a:rPr>
+              <a:t>final orientation the one given by the last point of the circular segment, always computed by the corresponding </a:t>
             </a:r>
             <a:r>
               <a:rPr lang="en-US" sz="1800" dirty="0" err="1">
@@ -19546,7 +20324,17 @@
                   <a:schemeClr val="tx1"/>
                 </a:solidFill>
               </a:rPr>
-              <a:t> frame,</a:t>
+              <a:t> frame.</a:t>
+            </a:r>
+          </a:p>
+          <a:p>
+            <a:r>
+              <a:rPr lang="en-US" sz="1800" dirty="0">
+                <a:solidFill>
+                  <a:schemeClr val="tx1"/>
+                </a:solidFill>
+              </a:rPr>
+              <a:t>The Trajectory related to the orientation has been computed using </a:t>
             </a:r>
             <a:r>
               <a:rPr lang="en-US" sz="1800" i="0" dirty="0">
@@ -19554,7 +20342,23 @@
                   <a:schemeClr val="tx1"/>
                 </a:solidFill>
               </a:rPr>
-              <a:t> and as </a:t>
+              <a:t>5</a:t>
+            </a:r>
+            <a:r>
+              <a:rPr lang="en-US" sz="1800" i="0" baseline="30000" dirty="0">
+                <a:solidFill>
+                  <a:schemeClr val="tx1"/>
+                </a:solidFill>
+              </a:rPr>
+              <a:t>th</a:t>
+            </a:r>
+            <a:r>
+              <a:rPr lang="en-US" sz="1800" i="0" dirty="0">
+                <a:solidFill>
+                  <a:schemeClr val="tx1"/>
+                </a:solidFill>
+              </a:rPr>
+              <a:t>_order_polynomials to obtain </a:t>
             </a:r>
             <a:r>
               <a:rPr lang="en-US" sz="1800" dirty="0">
@@ -19562,15 +20366,15 @@
                   <a:schemeClr val="tx1"/>
                 </a:solidFill>
               </a:rPr>
-              <a:t>final orientation the one given by the last point of the circular segment, always computed by the corresponding </a:t>
-            </a:r>
-            <a:r>
-              <a:rPr lang="en-US" sz="1800" dirty="0" err="1">
-                <a:solidFill>
-                  <a:schemeClr val="tx1"/>
-                </a:solidFill>
-              </a:rPr>
-              <a:t>Frenet</a:t>
+              <a:t>in each segment </a:t>
+            </a:r>
+            <a:r>
+              <a:rPr lang="en-US" sz="1800" i="0" dirty="0">
+                <a:solidFill>
+                  <a:schemeClr val="tx1"/>
+                </a:solidFill>
+              </a:rPr>
+              <a:t>initial and final angular </a:t>
             </a:r>
             <a:r>
               <a:rPr lang="en-US" sz="1800" dirty="0">
@@ -19578,49 +20382,7 @@
                   <a:schemeClr val="tx1"/>
                 </a:solidFill>
               </a:rPr>
-              <a:t> frame.</a:t>
-            </a:r>
-          </a:p>
-          <a:p>
-            <a:r>
-              <a:rPr lang="en-US" sz="1800" dirty="0">
-                <a:solidFill>
-                  <a:schemeClr val="tx1"/>
-                </a:solidFill>
-              </a:rPr>
-              <a:t>The Trajectory related to the orientation has been computed using </a:t>
-            </a:r>
-            <a:r>
-              <a:rPr lang="en-US" sz="1800" i="0" dirty="0">
-                <a:solidFill>
-                  <a:schemeClr val="tx1"/>
-                </a:solidFill>
-              </a:rPr>
-              <a:t>5</a:t>
-            </a:r>
-            <a:r>
-              <a:rPr lang="en-US" sz="1800" i="0" baseline="30000" dirty="0">
-                <a:solidFill>
-                  <a:schemeClr val="tx1"/>
-                </a:solidFill>
-              </a:rPr>
-              <a:t>th</a:t>
-            </a:r>
-            <a:r>
-              <a:rPr lang="en-US" sz="1800" i="0" dirty="0">
-                <a:solidFill>
-                  <a:schemeClr val="tx1"/>
-                </a:solidFill>
-              </a:rPr>
-              <a:t>_order_polynomials to obtain initial and final angular </a:t>
-            </a:r>
-            <a:r>
-              <a:rPr lang="en-US" sz="1800" dirty="0">
-                <a:solidFill>
-                  <a:schemeClr val="tx1"/>
-                </a:solidFill>
-              </a:rPr>
-              <a:t>velocity and acceleration in each segment.</a:t>
+              <a:t>velocity and acceleration equal to zero.</a:t>
             </a:r>
           </a:p>
           <a:p>
@@ -21236,7 +21998,7 @@
         </p:blipFill>
         <p:spPr>
           <a:xfrm>
-            <a:off x="2167800" y="480515"/>
+            <a:off x="2167799" y="358425"/>
             <a:ext cx="7856399" cy="5892302"/>
           </a:xfrm>
           <a:prstGeom prst="rect">
@@ -21295,6 +22057,113 @@
                 <a:srgbClr val="000000"/>
               </a:solidFill>
             </a:endParaRPr>
+          </a:p>
+        </p:txBody>
+      </p:sp>
+      <p:sp>
+        <p:nvSpPr>
+          <p:cNvPr id="2" name="CasellaDiTesto 1">
+            <a:extLst>
+              <a:ext uri="{FF2B5EF4-FFF2-40B4-BE49-F238E27FC236}">
+                <a16:creationId xmlns:a16="http://schemas.microsoft.com/office/drawing/2014/main" id="{8753D3C0-E8F0-4196-B90C-9FD7F5EA810B}"/>
+              </a:ext>
+            </a:extLst>
+          </p:cNvPr>
+          <p:cNvSpPr txBox="1"/>
+          <p:nvPr/>
+        </p:nvSpPr>
+        <p:spPr>
+          <a:xfrm>
+            <a:off x="1080554" y="6124993"/>
+            <a:ext cx="10030888" cy="369332"/>
+          </a:xfrm>
+          <a:prstGeom prst="rect">
+            <a:avLst/>
+          </a:prstGeom>
+          <a:noFill/>
+        </p:spPr>
+        <p:txBody>
+          <a:bodyPr wrap="none" rtlCol="0">
+            <a:spAutoFit/>
+          </a:bodyPr>
+          <a:lstStyle/>
+          <a:p>
+            <a:r>
+              <a:rPr lang="it-IT" dirty="0"/>
+              <a:t>Red </a:t>
+            </a:r>
+            <a:r>
+              <a:rPr lang="it-IT" dirty="0" err="1"/>
+              <a:t>inline</a:t>
+            </a:r>
+            <a:r>
+              <a:rPr lang="it-IT" dirty="0"/>
+              <a:t> </a:t>
+            </a:r>
+            <a:r>
+              <a:rPr lang="it-IT" dirty="0" err="1"/>
+              <a:t>visualize</a:t>
+            </a:r>
+            <a:r>
+              <a:rPr lang="it-IT" dirty="0"/>
+              <a:t> </a:t>
+            </a:r>
+            <a:r>
+              <a:rPr lang="it-IT" dirty="0" err="1"/>
+              <a:t>better</a:t>
+            </a:r>
+            <a:r>
+              <a:rPr lang="it-IT" dirty="0"/>
+              <a:t> start and </a:t>
+            </a:r>
+            <a:r>
+              <a:rPr lang="it-IT" dirty="0" err="1"/>
+              <a:t>initial</a:t>
+            </a:r>
+            <a:r>
+              <a:rPr lang="it-IT" dirty="0"/>
+              <a:t> of </a:t>
+            </a:r>
+            <a:r>
+              <a:rPr lang="it-IT" dirty="0" err="1"/>
+              <a:t>each</a:t>
+            </a:r>
+            <a:r>
+              <a:rPr lang="it-IT" dirty="0"/>
+              <a:t> </a:t>
+            </a:r>
+            <a:r>
+              <a:rPr lang="it-IT" dirty="0" err="1"/>
+              <a:t>segment</a:t>
+            </a:r>
+            <a:r>
+              <a:rPr lang="it-IT" dirty="0"/>
+              <a:t>, </a:t>
+            </a:r>
+            <a:r>
+              <a:rPr lang="it-IT" dirty="0" err="1"/>
+              <a:t>where</a:t>
+            </a:r>
+            <a:r>
+              <a:rPr lang="it-IT" dirty="0"/>
+              <a:t> </a:t>
+            </a:r>
+            <a:r>
+              <a:rPr lang="it-IT" dirty="0" err="1"/>
+              <a:t>velocity</a:t>
+            </a:r>
+            <a:r>
+              <a:rPr lang="it-IT" dirty="0"/>
+              <a:t> and </a:t>
+            </a:r>
+            <a:r>
+              <a:rPr lang="it-IT" dirty="0" err="1"/>
+              <a:t>acceleration</a:t>
+            </a:r>
+            <a:r>
+              <a:rPr lang="it-IT" dirty="0"/>
+              <a:t> are zero </a:t>
+            </a:r>
           </a:p>
         </p:txBody>
       </p:sp>
@@ -21799,7 +22668,7 @@
         </p:blipFill>
         <p:spPr>
           <a:xfrm>
-            <a:off x="2167800" y="480515"/>
+            <a:off x="2167797" y="361092"/>
             <a:ext cx="7856399" cy="5892302"/>
           </a:xfrm>
           <a:prstGeom prst="rect">
@@ -21858,6 +22727,113 @@
                 <a:srgbClr val="000000"/>
               </a:solidFill>
             </a:endParaRPr>
+          </a:p>
+        </p:txBody>
+      </p:sp>
+      <p:sp>
+        <p:nvSpPr>
+          <p:cNvPr id="12" name="CasellaDiTesto 11">
+            <a:extLst>
+              <a:ext uri="{FF2B5EF4-FFF2-40B4-BE49-F238E27FC236}">
+                <a16:creationId xmlns:a16="http://schemas.microsoft.com/office/drawing/2014/main" id="{7E22D0C7-1C63-4A44-A956-C24AA9A1A073}"/>
+              </a:ext>
+            </a:extLst>
+          </p:cNvPr>
+          <p:cNvSpPr txBox="1"/>
+          <p:nvPr/>
+        </p:nvSpPr>
+        <p:spPr>
+          <a:xfrm>
+            <a:off x="874068" y="6104347"/>
+            <a:ext cx="10443859" cy="369332"/>
+          </a:xfrm>
+          <a:prstGeom prst="rect">
+            <a:avLst/>
+          </a:prstGeom>
+          <a:noFill/>
+        </p:spPr>
+        <p:txBody>
+          <a:bodyPr wrap="square">
+            <a:spAutoFit/>
+          </a:bodyPr>
+          <a:lstStyle/>
+          <a:p>
+            <a:r>
+              <a:rPr lang="it-IT" dirty="0"/>
+              <a:t>Red </a:t>
+            </a:r>
+            <a:r>
+              <a:rPr lang="it-IT" dirty="0" err="1"/>
+              <a:t>inline</a:t>
+            </a:r>
+            <a:r>
+              <a:rPr lang="it-IT" dirty="0"/>
+              <a:t> </a:t>
+            </a:r>
+            <a:r>
+              <a:rPr lang="it-IT" dirty="0" err="1"/>
+              <a:t>visualize</a:t>
+            </a:r>
+            <a:r>
+              <a:rPr lang="it-IT" dirty="0"/>
+              <a:t> </a:t>
+            </a:r>
+            <a:r>
+              <a:rPr lang="it-IT" dirty="0" err="1"/>
+              <a:t>better</a:t>
+            </a:r>
+            <a:r>
+              <a:rPr lang="it-IT" dirty="0"/>
+              <a:t> start and </a:t>
+            </a:r>
+            <a:r>
+              <a:rPr lang="it-IT" dirty="0" err="1"/>
+              <a:t>initial</a:t>
+            </a:r>
+            <a:r>
+              <a:rPr lang="it-IT" dirty="0"/>
+              <a:t> of </a:t>
+            </a:r>
+            <a:r>
+              <a:rPr lang="it-IT" dirty="0" err="1"/>
+              <a:t>each</a:t>
+            </a:r>
+            <a:r>
+              <a:rPr lang="it-IT" dirty="0"/>
+              <a:t> </a:t>
+            </a:r>
+            <a:r>
+              <a:rPr lang="it-IT" dirty="0" err="1"/>
+              <a:t>segment</a:t>
+            </a:r>
+            <a:r>
+              <a:rPr lang="it-IT" dirty="0"/>
+              <a:t>, </a:t>
+            </a:r>
+            <a:r>
+              <a:rPr lang="it-IT" dirty="0" err="1"/>
+              <a:t>where</a:t>
+            </a:r>
+            <a:r>
+              <a:rPr lang="it-IT" dirty="0"/>
+              <a:t> </a:t>
+            </a:r>
+            <a:r>
+              <a:rPr lang="it-IT" dirty="0" err="1"/>
+              <a:t>velocity</a:t>
+            </a:r>
+            <a:r>
+              <a:rPr lang="it-IT" dirty="0"/>
+              <a:t> and </a:t>
+            </a:r>
+            <a:r>
+              <a:rPr lang="it-IT" dirty="0" err="1"/>
+              <a:t>acceleration</a:t>
+            </a:r>
+            <a:r>
+              <a:rPr lang="it-IT" dirty="0"/>
+              <a:t> are zero </a:t>
+            </a:r>
           </a:p>
         </p:txBody>
       </p:sp>
@@ -27766,199 +28742,199 @@
           </a:p>
           <a:p>
             <a:r>
-              <a:rPr lang="it-IT" sz="1600" u="sng" dirty="0" err="1"/>
+              <a:rPr lang="it-IT" sz="1600" dirty="0" err="1"/>
               <a:t>Trajectories</a:t>
             </a:r>
             <a:r>
-              <a:rPr lang="it-IT" sz="1600" u="sng" dirty="0"/>
+              <a:rPr lang="it-IT" sz="1600" dirty="0"/>
               <a:t> with </a:t>
             </a:r>
             <a:r>
-              <a:rPr lang="it-IT" sz="1600" u="sng" dirty="0" err="1"/>
+              <a:rPr lang="it-IT" sz="1600" dirty="0" err="1"/>
               <a:t>continuos</a:t>
             </a:r>
             <a:r>
-              <a:rPr lang="it-IT" sz="1600" u="sng" dirty="0"/>
+              <a:rPr lang="it-IT" sz="1600" dirty="0"/>
               <a:t> </a:t>
             </a:r>
             <a:r>
-              <a:rPr lang="it-IT" sz="1600" u="sng" dirty="0" err="1"/>
+              <a:rPr lang="it-IT" sz="1600" dirty="0" err="1"/>
               <a:t>velocity</a:t>
             </a:r>
             <a:r>
-              <a:rPr lang="it-IT" sz="1600" u="sng" dirty="0"/>
+              <a:rPr lang="it-IT" sz="1600" dirty="0"/>
               <a:t>, </a:t>
             </a:r>
             <a:r>
-              <a:rPr lang="it-IT" sz="1600" u="sng" dirty="0" err="1"/>
+              <a:rPr lang="it-IT" sz="1600" dirty="0" err="1"/>
               <a:t>acceleration</a:t>
             </a:r>
             <a:r>
-              <a:rPr lang="it-IT" sz="1600" u="sng" dirty="0"/>
+              <a:rPr lang="it-IT" sz="1600" dirty="0"/>
               <a:t> and </a:t>
             </a:r>
             <a:r>
-              <a:rPr lang="it-IT" sz="1600" u="sng" dirty="0" err="1"/>
+              <a:rPr lang="it-IT" sz="1600" dirty="0" err="1"/>
               <a:t>jerk</a:t>
             </a:r>
-            <a:endParaRPr lang="it-IT" sz="1600" u="sng" dirty="0"/>
+            <a:endParaRPr lang="it-IT" sz="1600" dirty="0"/>
           </a:p>
           <a:p>
             <a:pPr marL="0" indent="0">
               <a:buNone/>
             </a:pPr>
-            <a:endParaRPr lang="it-IT" sz="1600" u="sng" dirty="0"/>
-          </a:p>
-          <a:p>
-            <a:r>
-              <a:rPr lang="it-IT" sz="1600" b="1" u="sng" dirty="0">
+            <a:endParaRPr lang="it-IT" sz="1600" dirty="0"/>
+          </a:p>
+          <a:p>
+            <a:r>
+              <a:rPr lang="it-IT" sz="1600" b="1" dirty="0">
                 <a:ea typeface="DejaVu Math TeX Gyre" panose="02000503000000000000" pitchFamily="2" charset="0"/>
                 <a:cs typeface="DejaVu Math TeX Gyre" panose="02000503000000000000" pitchFamily="2" charset="0"/>
               </a:rPr>
               <a:t>ti-</a:t>
             </a:r>
             <a:r>
-              <a:rPr lang="it-IT" sz="1600" b="1" u="sng" dirty="0" err="1">
+              <a:rPr lang="it-IT" sz="1600" b="1" dirty="0" err="1">
                 <a:ea typeface="DejaVu Math TeX Gyre" panose="02000503000000000000" pitchFamily="2" charset="0"/>
                 <a:cs typeface="DejaVu Math TeX Gyre" panose="02000503000000000000" pitchFamily="2" charset="0"/>
               </a:rPr>
               <a:t>tf</a:t>
             </a:r>
             <a:r>
-              <a:rPr lang="it-IT" sz="1600" b="1" u="sng" dirty="0">
+              <a:rPr lang="it-IT" sz="1600" b="1" dirty="0">
                 <a:ea typeface="DejaVu Math TeX Gyre" panose="02000503000000000000" pitchFamily="2" charset="0"/>
                 <a:cs typeface="DejaVu Math TeX Gyre" panose="02000503000000000000" pitchFamily="2" charset="0"/>
               </a:rPr>
               <a:t> </a:t>
             </a:r>
             <a:r>
-              <a:rPr lang="it-IT" sz="1600" b="1" u="sng" dirty="0" err="1"/>
+              <a:rPr lang="it-IT" sz="1600" b="1" dirty="0" err="1"/>
               <a:t>Formulation</a:t>
             </a:r>
-            <a:endParaRPr lang="it-IT" sz="1600" b="1" u="sng" dirty="0"/>
-          </a:p>
-          <a:p>
-            <a:r>
-              <a:rPr lang="it-IT" sz="1600" u="sng" dirty="0" err="1"/>
+            <a:endParaRPr lang="it-IT" sz="1600" b="1" dirty="0"/>
+          </a:p>
+          <a:p>
+            <a:r>
+              <a:rPr lang="it-IT" sz="1600" dirty="0" err="1"/>
               <a:t>Inital</a:t>
             </a:r>
             <a:r>
-              <a:rPr lang="it-IT" sz="1600" u="sng" dirty="0"/>
+              <a:rPr lang="it-IT" sz="1600" dirty="0"/>
               <a:t> and </a:t>
             </a:r>
             <a:r>
-              <a:rPr lang="it-IT" sz="1600" u="sng" dirty="0" err="1"/>
+              <a:rPr lang="it-IT" sz="1600" dirty="0" err="1"/>
               <a:t>final</a:t>
             </a:r>
             <a:r>
-              <a:rPr lang="it-IT" sz="1600" u="sng" dirty="0"/>
+              <a:rPr lang="it-IT" sz="1600" dirty="0"/>
               <a:t> </a:t>
             </a:r>
             <a:r>
-              <a:rPr lang="it-IT" sz="1600" u="sng" dirty="0" err="1"/>
+              <a:rPr lang="it-IT" sz="1600" dirty="0" err="1"/>
               <a:t>conditions</a:t>
             </a:r>
             <a:r>
-              <a:rPr lang="it-IT" sz="1600" u="sng" dirty="0"/>
+              <a:rPr lang="it-IT" sz="1600" dirty="0"/>
               <a:t>:</a:t>
             </a:r>
           </a:p>
           <a:p>
             <a:pPr lvl="1"/>
             <a:r>
-              <a:rPr lang="it-IT" sz="1600" b="0" i="0" u="sng" strike="noStrike" baseline="0" dirty="0" err="1"/>
+              <a:rPr lang="it-IT" sz="1600" b="0" i="0" strike="noStrike" baseline="0" dirty="0" err="1"/>
               <a:t>qi</a:t>
             </a:r>
             <a:r>
-              <a:rPr lang="it-IT" sz="1600" b="0" i="0" u="sng" strike="noStrike" baseline="0" dirty="0"/>
+              <a:rPr lang="it-IT" sz="1600" b="0" i="0" strike="noStrike" baseline="0" dirty="0"/>
               <a:t>=4;   	</a:t>
             </a:r>
             <a:r>
-              <a:rPr lang="it-IT" sz="1600" b="0" i="0" u="sng" strike="noStrike" baseline="0" dirty="0" err="1"/>
+              <a:rPr lang="it-IT" sz="1600" b="0" i="0" strike="noStrike" baseline="0" dirty="0" err="1"/>
               <a:t>qf</a:t>
             </a:r>
             <a:r>
-              <a:rPr lang="it-IT" sz="1600" b="0" i="0" u="sng" strike="noStrike" baseline="0" dirty="0"/>
+              <a:rPr lang="it-IT" sz="1600" b="0" i="0" strike="noStrike" baseline="0" dirty="0"/>
               <a:t>=10;</a:t>
             </a:r>
           </a:p>
           <a:p>
             <a:pPr lvl="1"/>
             <a:r>
-              <a:rPr lang="it-IT" sz="1600" b="0" i="0" u="sng" strike="noStrike" baseline="0" dirty="0" err="1"/>
+              <a:rPr lang="it-IT" sz="1600" b="0" i="0" strike="noStrike" baseline="0" dirty="0" err="1"/>
               <a:t>dqi</a:t>
             </a:r>
             <a:r>
-              <a:rPr lang="it-IT" sz="1600" b="0" i="0" u="sng" strike="noStrike" baseline="0" dirty="0"/>
+              <a:rPr lang="it-IT" sz="1600" b="0" i="0" strike="noStrike" baseline="0" dirty="0"/>
               <a:t>=0;   	</a:t>
             </a:r>
             <a:r>
-              <a:rPr lang="it-IT" sz="1600" b="0" i="0" u="sng" strike="noStrike" baseline="0" dirty="0" err="1"/>
+              <a:rPr lang="it-IT" sz="1600" b="0" i="0" strike="noStrike" baseline="0" dirty="0" err="1"/>
               <a:t>dqf</a:t>
             </a:r>
             <a:r>
-              <a:rPr lang="it-IT" sz="1600" b="0" i="0" u="sng" strike="noStrike" baseline="0" dirty="0"/>
+              <a:rPr lang="it-IT" sz="1600" b="0" i="0" strike="noStrike" baseline="0" dirty="0"/>
               <a:t>=5;</a:t>
             </a:r>
           </a:p>
           <a:p>
             <a:pPr lvl="1"/>
             <a:r>
-              <a:rPr lang="it-IT" sz="1600" b="0" i="0" u="sng" strike="noStrike" baseline="0" dirty="0" err="1"/>
+              <a:rPr lang="it-IT" sz="1600" b="0" i="0" strike="noStrike" baseline="0" dirty="0" err="1"/>
               <a:t>ddqi</a:t>
             </a:r>
             <a:r>
-              <a:rPr lang="it-IT" sz="1600" b="0" i="0" u="sng" strike="noStrike" baseline="0" dirty="0"/>
+              <a:rPr lang="it-IT" sz="1600" b="0" i="0" strike="noStrike" baseline="0" dirty="0"/>
               <a:t>=0;	 </a:t>
             </a:r>
             <a:r>
-              <a:rPr lang="it-IT" sz="1600" b="0" i="0" u="sng" strike="noStrike" baseline="0" dirty="0" err="1"/>
+              <a:rPr lang="it-IT" sz="1600" b="0" i="0" strike="noStrike" baseline="0" dirty="0" err="1"/>
               <a:t>ddqf</a:t>
             </a:r>
             <a:r>
-              <a:rPr lang="it-IT" sz="1600" b="0" i="0" u="sng" strike="noStrike" baseline="0" dirty="0"/>
+              <a:rPr lang="it-IT" sz="1600" b="0" i="0" strike="noStrike" baseline="0" dirty="0"/>
               <a:t>=0;</a:t>
             </a:r>
           </a:p>
           <a:p>
             <a:pPr lvl="1"/>
             <a:r>
-              <a:rPr lang="it-IT" sz="1600" b="0" i="0" u="sng" strike="noStrike" baseline="0" dirty="0" err="1"/>
+              <a:rPr lang="it-IT" sz="1600" b="0" i="0" strike="noStrike" baseline="0" dirty="0" err="1"/>
               <a:t>ddqi</a:t>
             </a:r>
             <a:r>
-              <a:rPr lang="it-IT" sz="1600" b="0" i="0" u="sng" strike="noStrike" baseline="0" dirty="0"/>
+              <a:rPr lang="it-IT" sz="1600" b="0" i="0" strike="noStrike" baseline="0" dirty="0"/>
               <a:t>=0;	 </a:t>
             </a:r>
             <a:r>
-              <a:rPr lang="it-IT" sz="1600" b="0" i="0" u="sng" strike="noStrike" baseline="0" dirty="0" err="1"/>
+              <a:rPr lang="it-IT" sz="1600" b="0" i="0" strike="noStrike" baseline="0" dirty="0" err="1"/>
               <a:t>ddqf</a:t>
             </a:r>
             <a:r>
-              <a:rPr lang="it-IT" sz="1600" b="0" i="0" u="sng" strike="noStrike" baseline="0" dirty="0"/>
+              <a:rPr lang="it-IT" sz="1600" b="0" i="0" strike="noStrike" baseline="0" dirty="0"/>
               <a:t>=5;</a:t>
             </a:r>
           </a:p>
           <a:p>
             <a:pPr lvl="1"/>
             <a:r>
-              <a:rPr lang="it-IT" sz="1600" b="0" i="0" u="sng" strike="noStrike" baseline="0" dirty="0"/>
+              <a:rPr lang="it-IT" sz="1600" b="0" i="0" strike="noStrike" baseline="0" dirty="0"/>
               <a:t>ti=</a:t>
             </a:r>
             <a:r>
-              <a:rPr lang="it-IT" sz="1600" i="0" u="sng" dirty="0"/>
+              <a:rPr lang="it-IT" sz="1600" i="0" dirty="0"/>
               <a:t>5;</a:t>
             </a:r>
             <a:r>
-              <a:rPr lang="it-IT" sz="1600" b="0" i="0" u="sng" strike="noStrike" baseline="0" dirty="0"/>
+              <a:rPr lang="it-IT" sz="1600" b="0" i="0" strike="noStrike" baseline="0" dirty="0"/>
               <a:t> 	</a:t>
             </a:r>
             <a:r>
-              <a:rPr lang="it-IT" sz="1600" b="0" i="0" u="sng" strike="noStrike" baseline="0" dirty="0" err="1"/>
+              <a:rPr lang="it-IT" sz="1600" b="0" i="0" strike="noStrike" baseline="0" dirty="0" err="1"/>
               <a:t>tf</a:t>
             </a:r>
             <a:r>
-              <a:rPr lang="it-IT" sz="1600" b="0" i="0" u="sng" strike="noStrike" baseline="0" dirty="0"/>
+              <a:rPr lang="it-IT" sz="1600" b="0" i="0" strike="noStrike" baseline="0" dirty="0"/>
               <a:t>=10</a:t>
             </a:r>
           </a:p>

</xml_diff>